<commit_message>
Finished Intro to Knitr.  Switched to Intro to git.
</commit_message>
<xml_diff>
--- a/PresentationFigures.pptx
+++ b/PresentationFigures.pptx
@@ -8,6 +8,9 @@
     <p:sldId id="256" r:id="rId2"/>
     <p:sldId id="258" r:id="rId3"/>
     <p:sldId id="257" r:id="rId4"/>
+    <p:sldId id="259" r:id="rId5"/>
+    <p:sldId id="261" r:id="rId6"/>
+    <p:sldId id="260" r:id="rId7"/>
   </p:sldIdLst>
   <p:sldSz cx="9144000" cy="6858000" type="screen4x3"/>
   <p:notesSz cx="6858000" cy="9144000"/>
@@ -290,7 +293,7 @@
           <a:p>
             <a:fld id="{7994C1FB-CE8E-40E4-8ACC-D4C1ED389937}" type="datetimeFigureOut">
               <a:rPr lang="en-CA" smtClean="0"/>
-              <a:t>12/04/2013</a:t>
+              <a:t>12/08/2013</a:t>
             </a:fld>
             <a:endParaRPr lang="en-CA"/>
           </a:p>
@@ -460,7 +463,7 @@
           <a:p>
             <a:fld id="{7994C1FB-CE8E-40E4-8ACC-D4C1ED389937}" type="datetimeFigureOut">
               <a:rPr lang="en-CA" smtClean="0"/>
-              <a:t>12/04/2013</a:t>
+              <a:t>12/08/2013</a:t>
             </a:fld>
             <a:endParaRPr lang="en-CA"/>
           </a:p>
@@ -640,7 +643,7 @@
           <a:p>
             <a:fld id="{7994C1FB-CE8E-40E4-8ACC-D4C1ED389937}" type="datetimeFigureOut">
               <a:rPr lang="en-CA" smtClean="0"/>
-              <a:t>12/04/2013</a:t>
+              <a:t>12/08/2013</a:t>
             </a:fld>
             <a:endParaRPr lang="en-CA"/>
           </a:p>
@@ -810,7 +813,7 @@
           <a:p>
             <a:fld id="{7994C1FB-CE8E-40E4-8ACC-D4C1ED389937}" type="datetimeFigureOut">
               <a:rPr lang="en-CA" smtClean="0"/>
-              <a:t>12/04/2013</a:t>
+              <a:t>12/08/2013</a:t>
             </a:fld>
             <a:endParaRPr lang="en-CA"/>
           </a:p>
@@ -1056,7 +1059,7 @@
           <a:p>
             <a:fld id="{7994C1FB-CE8E-40E4-8ACC-D4C1ED389937}" type="datetimeFigureOut">
               <a:rPr lang="en-CA" smtClean="0"/>
-              <a:t>12/04/2013</a:t>
+              <a:t>12/08/2013</a:t>
             </a:fld>
             <a:endParaRPr lang="en-CA"/>
           </a:p>
@@ -1344,7 +1347,7 @@
           <a:p>
             <a:fld id="{7994C1FB-CE8E-40E4-8ACC-D4C1ED389937}" type="datetimeFigureOut">
               <a:rPr lang="en-CA" smtClean="0"/>
-              <a:t>12/04/2013</a:t>
+              <a:t>12/08/2013</a:t>
             </a:fld>
             <a:endParaRPr lang="en-CA"/>
           </a:p>
@@ -1766,7 +1769,7 @@
           <a:p>
             <a:fld id="{7994C1FB-CE8E-40E4-8ACC-D4C1ED389937}" type="datetimeFigureOut">
               <a:rPr lang="en-CA" smtClean="0"/>
-              <a:t>12/04/2013</a:t>
+              <a:t>12/08/2013</a:t>
             </a:fld>
             <a:endParaRPr lang="en-CA"/>
           </a:p>
@@ -1884,7 +1887,7 @@
           <a:p>
             <a:fld id="{7994C1FB-CE8E-40E4-8ACC-D4C1ED389937}" type="datetimeFigureOut">
               <a:rPr lang="en-CA" smtClean="0"/>
-              <a:t>12/04/2013</a:t>
+              <a:t>12/08/2013</a:t>
             </a:fld>
             <a:endParaRPr lang="en-CA"/>
           </a:p>
@@ -1979,7 +1982,7 @@
           <a:p>
             <a:fld id="{7994C1FB-CE8E-40E4-8ACC-D4C1ED389937}" type="datetimeFigureOut">
               <a:rPr lang="en-CA" smtClean="0"/>
-              <a:t>12/04/2013</a:t>
+              <a:t>12/08/2013</a:t>
             </a:fld>
             <a:endParaRPr lang="en-CA"/>
           </a:p>
@@ -2256,7 +2259,7 @@
           <a:p>
             <a:fld id="{7994C1FB-CE8E-40E4-8ACC-D4C1ED389937}" type="datetimeFigureOut">
               <a:rPr lang="en-CA" smtClean="0"/>
-              <a:t>12/04/2013</a:t>
+              <a:t>12/08/2013</a:t>
             </a:fld>
             <a:endParaRPr lang="en-CA"/>
           </a:p>
@@ -2509,7 +2512,7 @@
           <a:p>
             <a:fld id="{7994C1FB-CE8E-40E4-8ACC-D4C1ED389937}" type="datetimeFigureOut">
               <a:rPr lang="en-CA" smtClean="0"/>
-              <a:t>12/04/2013</a:t>
+              <a:t>12/08/2013</a:t>
             </a:fld>
             <a:endParaRPr lang="en-CA"/>
           </a:p>
@@ -2722,7 +2725,7 @@
           <a:p>
             <a:fld id="{7994C1FB-CE8E-40E4-8ACC-D4C1ED389937}" type="datetimeFigureOut">
               <a:rPr lang="en-CA" smtClean="0"/>
-              <a:t>12/04/2013</a:t>
+              <a:t>12/08/2013</a:t>
             </a:fld>
             <a:endParaRPr lang="en-CA"/>
           </a:p>
@@ -5602,6 +5605,1244 @@
     <p:extLst>
       <p:ext uri="{BB962C8B-B14F-4D97-AF65-F5344CB8AC3E}">
         <p14:creationId xmlns:p14="http://schemas.microsoft.com/office/powerpoint/2010/main" val="3081552747"/>
+      </p:ext>
+    </p:extLst>
+  </p:cSld>
+  <p:clrMapOvr>
+    <a:masterClrMapping/>
+  </p:clrMapOvr>
+</p:sld>
+</file>
+
+<file path=ppt/slides/slide4.xml><?xml version="1.0" encoding="utf-8"?>
+<p:sld xmlns:a="http://schemas.openxmlformats.org/drawingml/2006/main" xmlns:r="http://schemas.openxmlformats.org/officeDocument/2006/relationships" xmlns:p="http://schemas.openxmlformats.org/presentationml/2006/main">
+  <p:cSld>
+    <p:spTree>
+      <p:nvGrpSpPr>
+        <p:cNvPr id="1" name=""/>
+        <p:cNvGrpSpPr/>
+        <p:nvPr/>
+      </p:nvGrpSpPr>
+      <p:grpSpPr>
+        <a:xfrm>
+          <a:off x="0" y="0"/>
+          <a:ext cx="0" cy="0"/>
+          <a:chOff x="0" y="0"/>
+          <a:chExt cx="0" cy="0"/>
+        </a:xfrm>
+      </p:grpSpPr>
+      <p:sp>
+        <p:nvSpPr>
+          <p:cNvPr id="4" name="Rounded Rectangle 3"/>
+          <p:cNvSpPr/>
+          <p:nvPr/>
+        </p:nvSpPr>
+        <p:spPr>
+          <a:xfrm>
+            <a:off x="323528" y="1160748"/>
+            <a:ext cx="1728192" cy="1296144"/>
+          </a:xfrm>
+          <a:prstGeom prst="roundRect">
+            <a:avLst/>
+          </a:prstGeom>
+          <a:solidFill>
+            <a:schemeClr val="accent1">
+              <a:lumMod val="40000"/>
+              <a:lumOff val="60000"/>
+            </a:schemeClr>
+          </a:solidFill>
+        </p:spPr>
+        <p:style>
+          <a:lnRef idx="2">
+            <a:schemeClr val="accent1">
+              <a:shade val="50000"/>
+            </a:schemeClr>
+          </a:lnRef>
+          <a:fillRef idx="1">
+            <a:schemeClr val="accent1"/>
+          </a:fillRef>
+          <a:effectRef idx="0">
+            <a:schemeClr val="accent1"/>
+          </a:effectRef>
+          <a:fontRef idx="minor">
+            <a:schemeClr val="lt1"/>
+          </a:fontRef>
+        </p:style>
+        <p:txBody>
+          <a:bodyPr rtlCol="0" anchor="ctr"/>
+          <a:lstStyle/>
+          <a:p>
+            <a:pPr algn="ctr"/>
+            <a:r>
+              <a:rPr lang="en-CA" b="1" dirty="0" smtClean="0">
+                <a:solidFill>
+                  <a:schemeClr val="tx1"/>
+                </a:solidFill>
+                <a:latin typeface="Courier New" panose="02070309020205020404" pitchFamily="49" charset="0"/>
+                <a:cs typeface="Courier New" panose="02070309020205020404" pitchFamily="49" charset="0"/>
+              </a:rPr>
+              <a:t>*.</a:t>
+            </a:r>
+            <a:r>
+              <a:rPr lang="en-CA" b="1" dirty="0" err="1" smtClean="0">
+                <a:solidFill>
+                  <a:schemeClr val="tx1"/>
+                </a:solidFill>
+                <a:latin typeface="Courier New" panose="02070309020205020404" pitchFamily="49" charset="0"/>
+                <a:cs typeface="Courier New" panose="02070309020205020404" pitchFamily="49" charset="0"/>
+              </a:rPr>
+              <a:t>rnw</a:t>
+            </a:r>
+            <a:endParaRPr lang="en-CA" b="1" dirty="0">
+              <a:solidFill>
+                <a:schemeClr val="tx1"/>
+              </a:solidFill>
+              <a:latin typeface="Courier New" panose="02070309020205020404" pitchFamily="49" charset="0"/>
+              <a:cs typeface="Courier New" panose="02070309020205020404" pitchFamily="49" charset="0"/>
+            </a:endParaRPr>
+          </a:p>
+        </p:txBody>
+      </p:sp>
+      <p:sp>
+        <p:nvSpPr>
+          <p:cNvPr id="5" name="Rounded Rectangle 4"/>
+          <p:cNvSpPr/>
+          <p:nvPr/>
+        </p:nvSpPr>
+        <p:spPr>
+          <a:xfrm>
+            <a:off x="3707904" y="1160748"/>
+            <a:ext cx="1728192" cy="1296144"/>
+          </a:xfrm>
+          <a:prstGeom prst="roundRect">
+            <a:avLst/>
+          </a:prstGeom>
+          <a:solidFill>
+            <a:schemeClr val="accent1">
+              <a:lumMod val="40000"/>
+              <a:lumOff val="60000"/>
+            </a:schemeClr>
+          </a:solidFill>
+        </p:spPr>
+        <p:style>
+          <a:lnRef idx="2">
+            <a:schemeClr val="accent1">
+              <a:shade val="50000"/>
+            </a:schemeClr>
+          </a:lnRef>
+          <a:fillRef idx="1">
+            <a:schemeClr val="accent1"/>
+          </a:fillRef>
+          <a:effectRef idx="0">
+            <a:schemeClr val="accent1"/>
+          </a:effectRef>
+          <a:fontRef idx="minor">
+            <a:schemeClr val="lt1"/>
+          </a:fontRef>
+        </p:style>
+        <p:txBody>
+          <a:bodyPr rtlCol="0" anchor="ctr"/>
+          <a:lstStyle/>
+          <a:p>
+            <a:pPr algn="ctr"/>
+            <a:r>
+              <a:rPr lang="en-CA" b="1" dirty="0" smtClean="0">
+                <a:solidFill>
+                  <a:schemeClr val="tx1"/>
+                </a:solidFill>
+                <a:latin typeface="Courier New" panose="02070309020205020404" pitchFamily="49" charset="0"/>
+                <a:cs typeface="Courier New" panose="02070309020205020404" pitchFamily="49" charset="0"/>
+              </a:rPr>
+              <a:t>*.</a:t>
+            </a:r>
+            <a:r>
+              <a:rPr lang="en-CA" b="1" dirty="0" err="1" smtClean="0">
+                <a:solidFill>
+                  <a:schemeClr val="tx1"/>
+                </a:solidFill>
+                <a:latin typeface="Courier New" panose="02070309020205020404" pitchFamily="49" charset="0"/>
+                <a:cs typeface="Courier New" panose="02070309020205020404" pitchFamily="49" charset="0"/>
+              </a:rPr>
+              <a:t>tex</a:t>
+            </a:r>
+            <a:endParaRPr lang="en-CA" b="1" dirty="0">
+              <a:solidFill>
+                <a:schemeClr val="tx1"/>
+              </a:solidFill>
+              <a:latin typeface="Courier New" panose="02070309020205020404" pitchFamily="49" charset="0"/>
+              <a:cs typeface="Courier New" panose="02070309020205020404" pitchFamily="49" charset="0"/>
+            </a:endParaRPr>
+          </a:p>
+        </p:txBody>
+      </p:sp>
+      <p:sp>
+        <p:nvSpPr>
+          <p:cNvPr id="6" name="Rounded Rectangle 5"/>
+          <p:cNvSpPr/>
+          <p:nvPr/>
+        </p:nvSpPr>
+        <p:spPr>
+          <a:xfrm>
+            <a:off x="7092280" y="1160748"/>
+            <a:ext cx="1728192" cy="1296144"/>
+          </a:xfrm>
+          <a:prstGeom prst="roundRect">
+            <a:avLst/>
+          </a:prstGeom>
+          <a:solidFill>
+            <a:schemeClr val="accent1">
+              <a:lumMod val="40000"/>
+              <a:lumOff val="60000"/>
+            </a:schemeClr>
+          </a:solidFill>
+        </p:spPr>
+        <p:style>
+          <a:lnRef idx="2">
+            <a:schemeClr val="accent1">
+              <a:shade val="50000"/>
+            </a:schemeClr>
+          </a:lnRef>
+          <a:fillRef idx="1">
+            <a:schemeClr val="accent1"/>
+          </a:fillRef>
+          <a:effectRef idx="0">
+            <a:schemeClr val="accent1"/>
+          </a:effectRef>
+          <a:fontRef idx="minor">
+            <a:schemeClr val="lt1"/>
+          </a:fontRef>
+        </p:style>
+        <p:txBody>
+          <a:bodyPr rtlCol="0" anchor="ctr"/>
+          <a:lstStyle/>
+          <a:p>
+            <a:pPr algn="ctr"/>
+            <a:r>
+              <a:rPr lang="en-CA" b="1" dirty="0" smtClean="0">
+                <a:solidFill>
+                  <a:schemeClr val="tx1"/>
+                </a:solidFill>
+                <a:latin typeface="Courier New" panose="02070309020205020404" pitchFamily="49" charset="0"/>
+                <a:cs typeface="Courier New" panose="02070309020205020404" pitchFamily="49" charset="0"/>
+              </a:rPr>
+              <a:t>*.pdf</a:t>
+            </a:r>
+            <a:endParaRPr lang="en-CA" b="1" dirty="0">
+              <a:solidFill>
+                <a:schemeClr val="tx1"/>
+              </a:solidFill>
+              <a:latin typeface="Courier New" panose="02070309020205020404" pitchFamily="49" charset="0"/>
+              <a:cs typeface="Courier New" panose="02070309020205020404" pitchFamily="49" charset="0"/>
+            </a:endParaRPr>
+          </a:p>
+        </p:txBody>
+      </p:sp>
+      <p:sp>
+        <p:nvSpPr>
+          <p:cNvPr id="7" name="Right Arrow 6"/>
+          <p:cNvSpPr/>
+          <p:nvPr/>
+        </p:nvSpPr>
+        <p:spPr>
+          <a:xfrm>
+            <a:off x="2195736" y="1628800"/>
+            <a:ext cx="1368152" cy="432048"/>
+          </a:xfrm>
+          <a:prstGeom prst="rightArrow">
+            <a:avLst/>
+          </a:prstGeom>
+        </p:spPr>
+        <p:style>
+          <a:lnRef idx="2">
+            <a:schemeClr val="accent1">
+              <a:shade val="50000"/>
+            </a:schemeClr>
+          </a:lnRef>
+          <a:fillRef idx="1">
+            <a:schemeClr val="accent1"/>
+          </a:fillRef>
+          <a:effectRef idx="0">
+            <a:schemeClr val="accent1"/>
+          </a:effectRef>
+          <a:fontRef idx="minor">
+            <a:schemeClr val="lt1"/>
+          </a:fontRef>
+        </p:style>
+        <p:txBody>
+          <a:bodyPr rtlCol="0" anchor="ctr"/>
+          <a:lstStyle/>
+          <a:p>
+            <a:pPr algn="ctr"/>
+            <a:endParaRPr lang="en-CA"/>
+          </a:p>
+        </p:txBody>
+      </p:sp>
+      <p:sp>
+        <p:nvSpPr>
+          <p:cNvPr id="8" name="Right Arrow 7"/>
+          <p:cNvSpPr/>
+          <p:nvPr/>
+        </p:nvSpPr>
+        <p:spPr>
+          <a:xfrm>
+            <a:off x="5580112" y="1628800"/>
+            <a:ext cx="1368152" cy="432048"/>
+          </a:xfrm>
+          <a:prstGeom prst="rightArrow">
+            <a:avLst/>
+          </a:prstGeom>
+        </p:spPr>
+        <p:style>
+          <a:lnRef idx="2">
+            <a:schemeClr val="accent1">
+              <a:shade val="50000"/>
+            </a:schemeClr>
+          </a:lnRef>
+          <a:fillRef idx="1">
+            <a:schemeClr val="accent1"/>
+          </a:fillRef>
+          <a:effectRef idx="0">
+            <a:schemeClr val="accent1"/>
+          </a:effectRef>
+          <a:fontRef idx="minor">
+            <a:schemeClr val="lt1"/>
+          </a:fontRef>
+        </p:style>
+        <p:txBody>
+          <a:bodyPr rtlCol="0" anchor="ctr"/>
+          <a:lstStyle/>
+          <a:p>
+            <a:pPr algn="ctr"/>
+            <a:endParaRPr lang="en-CA"/>
+          </a:p>
+        </p:txBody>
+      </p:sp>
+      <p:sp>
+        <p:nvSpPr>
+          <p:cNvPr id="9" name="TextBox 8"/>
+          <p:cNvSpPr txBox="1"/>
+          <p:nvPr/>
+        </p:nvSpPr>
+        <p:spPr>
+          <a:xfrm>
+            <a:off x="2267744" y="1187460"/>
+            <a:ext cx="1368152" cy="369332"/>
+          </a:xfrm>
+          <a:prstGeom prst="rect">
+            <a:avLst/>
+          </a:prstGeom>
+          <a:noFill/>
+        </p:spPr>
+        <p:txBody>
+          <a:bodyPr wrap="square" rtlCol="0">
+            <a:spAutoFit/>
+          </a:bodyPr>
+          <a:lstStyle/>
+          <a:p>
+            <a:r>
+              <a:rPr lang="en-CA" dirty="0" err="1" smtClean="0"/>
+              <a:t>knitr</a:t>
+            </a:r>
+            <a:r>
+              <a:rPr lang="en-CA" dirty="0" smtClean="0"/>
+              <a:t>(</a:t>
+            </a:r>
+            <a:r>
+              <a:rPr lang="en-CA" dirty="0" err="1" smtClean="0"/>
+              <a:t>rnw</a:t>
+            </a:r>
+            <a:r>
+              <a:rPr lang="en-CA" dirty="0" smtClean="0"/>
+              <a:t>)</a:t>
+            </a:r>
+            <a:endParaRPr lang="en-CA" dirty="0"/>
+          </a:p>
+        </p:txBody>
+      </p:sp>
+      <p:sp>
+        <p:nvSpPr>
+          <p:cNvPr id="10" name="TextBox 9"/>
+          <p:cNvSpPr txBox="1"/>
+          <p:nvPr/>
+        </p:nvSpPr>
+        <p:spPr>
+          <a:xfrm>
+            <a:off x="5652120" y="1187460"/>
+            <a:ext cx="1368152" cy="369332"/>
+          </a:xfrm>
+          <a:prstGeom prst="rect">
+            <a:avLst/>
+          </a:prstGeom>
+          <a:noFill/>
+        </p:spPr>
+        <p:txBody>
+          <a:bodyPr wrap="square" rtlCol="0">
+            <a:spAutoFit/>
+          </a:bodyPr>
+          <a:lstStyle/>
+          <a:p>
+            <a:r>
+              <a:rPr lang="en-CA" dirty="0"/>
+              <a:t>l</a:t>
+            </a:r>
+            <a:r>
+              <a:rPr lang="en-CA" dirty="0" smtClean="0"/>
+              <a:t>atex(</a:t>
+            </a:r>
+            <a:r>
+              <a:rPr lang="en-CA" dirty="0" err="1" smtClean="0"/>
+              <a:t>tex</a:t>
+            </a:r>
+            <a:r>
+              <a:rPr lang="en-CA" dirty="0" smtClean="0"/>
+              <a:t>)</a:t>
+            </a:r>
+            <a:endParaRPr lang="en-CA" dirty="0"/>
+          </a:p>
+        </p:txBody>
+      </p:sp>
+    </p:spTree>
+    <p:extLst>
+      <p:ext uri="{BB962C8B-B14F-4D97-AF65-F5344CB8AC3E}">
+        <p14:creationId xmlns:p14="http://schemas.microsoft.com/office/powerpoint/2010/main" val="2871405602"/>
+      </p:ext>
+    </p:extLst>
+  </p:cSld>
+  <p:clrMapOvr>
+    <a:masterClrMapping/>
+  </p:clrMapOvr>
+</p:sld>
+</file>
+
+<file path=ppt/slides/slide5.xml><?xml version="1.0" encoding="utf-8"?>
+<p:sld xmlns:a="http://schemas.openxmlformats.org/drawingml/2006/main" xmlns:r="http://schemas.openxmlformats.org/officeDocument/2006/relationships" xmlns:p="http://schemas.openxmlformats.org/presentationml/2006/main">
+  <p:cSld>
+    <p:spTree>
+      <p:nvGrpSpPr>
+        <p:cNvPr id="1" name=""/>
+        <p:cNvGrpSpPr/>
+        <p:nvPr/>
+      </p:nvGrpSpPr>
+      <p:grpSpPr>
+        <a:xfrm>
+          <a:off x="0" y="0"/>
+          <a:ext cx="0" cy="0"/>
+          <a:chOff x="0" y="0"/>
+          <a:chExt cx="0" cy="0"/>
+        </a:xfrm>
+      </p:grpSpPr>
+      <p:sp>
+        <p:nvSpPr>
+          <p:cNvPr id="4" name="Rounded Rectangle 3"/>
+          <p:cNvSpPr/>
+          <p:nvPr/>
+        </p:nvSpPr>
+        <p:spPr>
+          <a:xfrm>
+            <a:off x="323528" y="1160748"/>
+            <a:ext cx="1728192" cy="1296144"/>
+          </a:xfrm>
+          <a:prstGeom prst="roundRect">
+            <a:avLst/>
+          </a:prstGeom>
+          <a:solidFill>
+            <a:schemeClr val="accent1">
+              <a:lumMod val="40000"/>
+              <a:lumOff val="60000"/>
+            </a:schemeClr>
+          </a:solidFill>
+        </p:spPr>
+        <p:style>
+          <a:lnRef idx="2">
+            <a:schemeClr val="accent1">
+              <a:shade val="50000"/>
+            </a:schemeClr>
+          </a:lnRef>
+          <a:fillRef idx="1">
+            <a:schemeClr val="accent1"/>
+          </a:fillRef>
+          <a:effectRef idx="0">
+            <a:schemeClr val="accent1"/>
+          </a:effectRef>
+          <a:fontRef idx="minor">
+            <a:schemeClr val="lt1"/>
+          </a:fontRef>
+        </p:style>
+        <p:txBody>
+          <a:bodyPr rtlCol="0" anchor="ctr"/>
+          <a:lstStyle/>
+          <a:p>
+            <a:pPr algn="ctr"/>
+            <a:r>
+              <a:rPr lang="en-CA" b="1" dirty="0" smtClean="0">
+                <a:solidFill>
+                  <a:schemeClr val="tx1"/>
+                </a:solidFill>
+                <a:latin typeface="Courier New" panose="02070309020205020404" pitchFamily="49" charset="0"/>
+                <a:cs typeface="Courier New" panose="02070309020205020404" pitchFamily="49" charset="0"/>
+              </a:rPr>
+              <a:t>*.</a:t>
+            </a:r>
+            <a:r>
+              <a:rPr lang="en-CA" b="1" dirty="0" err="1" smtClean="0">
+                <a:solidFill>
+                  <a:schemeClr val="tx1"/>
+                </a:solidFill>
+                <a:latin typeface="Courier New" panose="02070309020205020404" pitchFamily="49" charset="0"/>
+                <a:cs typeface="Courier New" panose="02070309020205020404" pitchFamily="49" charset="0"/>
+              </a:rPr>
+              <a:t>rnw</a:t>
+            </a:r>
+            <a:endParaRPr lang="en-CA" b="1" dirty="0">
+              <a:solidFill>
+                <a:schemeClr val="tx1"/>
+              </a:solidFill>
+              <a:latin typeface="Courier New" panose="02070309020205020404" pitchFamily="49" charset="0"/>
+              <a:cs typeface="Courier New" panose="02070309020205020404" pitchFamily="49" charset="0"/>
+            </a:endParaRPr>
+          </a:p>
+        </p:txBody>
+      </p:sp>
+      <p:sp>
+        <p:nvSpPr>
+          <p:cNvPr id="5" name="Rounded Rectangle 4"/>
+          <p:cNvSpPr/>
+          <p:nvPr/>
+        </p:nvSpPr>
+        <p:spPr>
+          <a:xfrm>
+            <a:off x="3707904" y="1160748"/>
+            <a:ext cx="1728192" cy="1296144"/>
+          </a:xfrm>
+          <a:prstGeom prst="roundRect">
+            <a:avLst/>
+          </a:prstGeom>
+          <a:solidFill>
+            <a:schemeClr val="accent1">
+              <a:lumMod val="40000"/>
+              <a:lumOff val="60000"/>
+            </a:schemeClr>
+          </a:solidFill>
+        </p:spPr>
+        <p:style>
+          <a:lnRef idx="2">
+            <a:schemeClr val="accent1">
+              <a:shade val="50000"/>
+            </a:schemeClr>
+          </a:lnRef>
+          <a:fillRef idx="1">
+            <a:schemeClr val="accent1"/>
+          </a:fillRef>
+          <a:effectRef idx="0">
+            <a:schemeClr val="accent1"/>
+          </a:effectRef>
+          <a:fontRef idx="minor">
+            <a:schemeClr val="lt1"/>
+          </a:fontRef>
+        </p:style>
+        <p:txBody>
+          <a:bodyPr rtlCol="0" anchor="ctr"/>
+          <a:lstStyle/>
+          <a:p>
+            <a:pPr algn="ctr"/>
+            <a:r>
+              <a:rPr lang="en-CA" b="1" dirty="0" smtClean="0">
+                <a:solidFill>
+                  <a:schemeClr val="tx1"/>
+                </a:solidFill>
+                <a:latin typeface="Courier New" panose="02070309020205020404" pitchFamily="49" charset="0"/>
+                <a:cs typeface="Courier New" panose="02070309020205020404" pitchFamily="49" charset="0"/>
+              </a:rPr>
+              <a:t>*.</a:t>
+            </a:r>
+            <a:r>
+              <a:rPr lang="en-CA" b="1" dirty="0" err="1" smtClean="0">
+                <a:solidFill>
+                  <a:schemeClr val="tx1"/>
+                </a:solidFill>
+                <a:latin typeface="Courier New" panose="02070309020205020404" pitchFamily="49" charset="0"/>
+                <a:cs typeface="Courier New" panose="02070309020205020404" pitchFamily="49" charset="0"/>
+              </a:rPr>
+              <a:t>tex</a:t>
+            </a:r>
+            <a:endParaRPr lang="en-CA" b="1" dirty="0">
+              <a:solidFill>
+                <a:schemeClr val="tx1"/>
+              </a:solidFill>
+              <a:latin typeface="Courier New" panose="02070309020205020404" pitchFamily="49" charset="0"/>
+              <a:cs typeface="Courier New" panose="02070309020205020404" pitchFamily="49" charset="0"/>
+            </a:endParaRPr>
+          </a:p>
+        </p:txBody>
+      </p:sp>
+      <p:sp>
+        <p:nvSpPr>
+          <p:cNvPr id="6" name="Rounded Rectangle 5"/>
+          <p:cNvSpPr/>
+          <p:nvPr/>
+        </p:nvSpPr>
+        <p:spPr>
+          <a:xfrm>
+            <a:off x="7092280" y="1160748"/>
+            <a:ext cx="1728192" cy="1296144"/>
+          </a:xfrm>
+          <a:prstGeom prst="roundRect">
+            <a:avLst/>
+          </a:prstGeom>
+          <a:solidFill>
+            <a:schemeClr val="accent1">
+              <a:lumMod val="40000"/>
+              <a:lumOff val="60000"/>
+            </a:schemeClr>
+          </a:solidFill>
+        </p:spPr>
+        <p:style>
+          <a:lnRef idx="2">
+            <a:schemeClr val="accent1">
+              <a:shade val="50000"/>
+            </a:schemeClr>
+          </a:lnRef>
+          <a:fillRef idx="1">
+            <a:schemeClr val="accent1"/>
+          </a:fillRef>
+          <a:effectRef idx="0">
+            <a:schemeClr val="accent1"/>
+          </a:effectRef>
+          <a:fontRef idx="minor">
+            <a:schemeClr val="lt1"/>
+          </a:fontRef>
+        </p:style>
+        <p:txBody>
+          <a:bodyPr rtlCol="0" anchor="ctr"/>
+          <a:lstStyle/>
+          <a:p>
+            <a:pPr algn="ctr"/>
+            <a:r>
+              <a:rPr lang="en-CA" b="1" dirty="0" smtClean="0">
+                <a:solidFill>
+                  <a:schemeClr val="tx1"/>
+                </a:solidFill>
+                <a:latin typeface="Courier New" panose="02070309020205020404" pitchFamily="49" charset="0"/>
+                <a:cs typeface="Courier New" panose="02070309020205020404" pitchFamily="49" charset="0"/>
+              </a:rPr>
+              <a:t>*.pdf</a:t>
+            </a:r>
+            <a:endParaRPr lang="en-CA" b="1" dirty="0">
+              <a:solidFill>
+                <a:schemeClr val="tx1"/>
+              </a:solidFill>
+              <a:latin typeface="Courier New" panose="02070309020205020404" pitchFamily="49" charset="0"/>
+              <a:cs typeface="Courier New" panose="02070309020205020404" pitchFamily="49" charset="0"/>
+            </a:endParaRPr>
+          </a:p>
+        </p:txBody>
+      </p:sp>
+      <p:sp>
+        <p:nvSpPr>
+          <p:cNvPr id="7" name="Right Arrow 6"/>
+          <p:cNvSpPr/>
+          <p:nvPr/>
+        </p:nvSpPr>
+        <p:spPr>
+          <a:xfrm>
+            <a:off x="2195736" y="1628800"/>
+            <a:ext cx="1368152" cy="432048"/>
+          </a:xfrm>
+          <a:prstGeom prst="rightArrow">
+            <a:avLst/>
+          </a:prstGeom>
+        </p:spPr>
+        <p:style>
+          <a:lnRef idx="2">
+            <a:schemeClr val="accent1">
+              <a:shade val="50000"/>
+            </a:schemeClr>
+          </a:lnRef>
+          <a:fillRef idx="1">
+            <a:schemeClr val="accent1"/>
+          </a:fillRef>
+          <a:effectRef idx="0">
+            <a:schemeClr val="accent1"/>
+          </a:effectRef>
+          <a:fontRef idx="minor">
+            <a:schemeClr val="lt1"/>
+          </a:fontRef>
+        </p:style>
+        <p:txBody>
+          <a:bodyPr rtlCol="0" anchor="ctr"/>
+          <a:lstStyle/>
+          <a:p>
+            <a:pPr algn="ctr"/>
+            <a:endParaRPr lang="en-CA"/>
+          </a:p>
+        </p:txBody>
+      </p:sp>
+      <p:sp>
+        <p:nvSpPr>
+          <p:cNvPr id="8" name="Right Arrow 7"/>
+          <p:cNvSpPr/>
+          <p:nvPr/>
+        </p:nvSpPr>
+        <p:spPr>
+          <a:xfrm>
+            <a:off x="5580112" y="1628800"/>
+            <a:ext cx="1368152" cy="432048"/>
+          </a:xfrm>
+          <a:prstGeom prst="rightArrow">
+            <a:avLst/>
+          </a:prstGeom>
+        </p:spPr>
+        <p:style>
+          <a:lnRef idx="2">
+            <a:schemeClr val="accent1">
+              <a:shade val="50000"/>
+            </a:schemeClr>
+          </a:lnRef>
+          <a:fillRef idx="1">
+            <a:schemeClr val="accent1"/>
+          </a:fillRef>
+          <a:effectRef idx="0">
+            <a:schemeClr val="accent1"/>
+          </a:effectRef>
+          <a:fontRef idx="minor">
+            <a:schemeClr val="lt1"/>
+          </a:fontRef>
+        </p:style>
+        <p:txBody>
+          <a:bodyPr rtlCol="0" anchor="ctr"/>
+          <a:lstStyle/>
+          <a:p>
+            <a:pPr algn="ctr"/>
+            <a:endParaRPr lang="en-CA"/>
+          </a:p>
+        </p:txBody>
+      </p:sp>
+      <p:sp>
+        <p:nvSpPr>
+          <p:cNvPr id="9" name="TextBox 8"/>
+          <p:cNvSpPr txBox="1"/>
+          <p:nvPr/>
+        </p:nvSpPr>
+        <p:spPr>
+          <a:xfrm>
+            <a:off x="2267744" y="1187460"/>
+            <a:ext cx="1368152" cy="369332"/>
+          </a:xfrm>
+          <a:prstGeom prst="rect">
+            <a:avLst/>
+          </a:prstGeom>
+          <a:noFill/>
+        </p:spPr>
+        <p:txBody>
+          <a:bodyPr wrap="square" rtlCol="0">
+            <a:spAutoFit/>
+          </a:bodyPr>
+          <a:lstStyle/>
+          <a:p>
+            <a:r>
+              <a:rPr lang="en-CA" dirty="0" err="1" smtClean="0"/>
+              <a:t>knitr</a:t>
+            </a:r>
+            <a:r>
+              <a:rPr lang="en-CA" dirty="0" smtClean="0"/>
+              <a:t>(</a:t>
+            </a:r>
+            <a:r>
+              <a:rPr lang="en-CA" dirty="0" err="1" smtClean="0"/>
+              <a:t>rnw</a:t>
+            </a:r>
+            <a:r>
+              <a:rPr lang="en-CA" dirty="0" smtClean="0"/>
+              <a:t>)</a:t>
+            </a:r>
+            <a:endParaRPr lang="en-CA" dirty="0"/>
+          </a:p>
+        </p:txBody>
+      </p:sp>
+      <p:sp>
+        <p:nvSpPr>
+          <p:cNvPr id="10" name="TextBox 9"/>
+          <p:cNvSpPr txBox="1"/>
+          <p:nvPr/>
+        </p:nvSpPr>
+        <p:spPr>
+          <a:xfrm>
+            <a:off x="5652120" y="1187460"/>
+            <a:ext cx="1368152" cy="369332"/>
+          </a:xfrm>
+          <a:prstGeom prst="rect">
+            <a:avLst/>
+          </a:prstGeom>
+          <a:noFill/>
+        </p:spPr>
+        <p:txBody>
+          <a:bodyPr wrap="square" rtlCol="0">
+            <a:spAutoFit/>
+          </a:bodyPr>
+          <a:lstStyle/>
+          <a:p>
+            <a:r>
+              <a:rPr lang="en-CA" dirty="0"/>
+              <a:t>l</a:t>
+            </a:r>
+            <a:r>
+              <a:rPr lang="en-CA" dirty="0" smtClean="0"/>
+              <a:t>atex(</a:t>
+            </a:r>
+            <a:r>
+              <a:rPr lang="en-CA" dirty="0" err="1" smtClean="0"/>
+              <a:t>tex</a:t>
+            </a:r>
+            <a:r>
+              <a:rPr lang="en-CA" dirty="0" smtClean="0"/>
+              <a:t>)</a:t>
+            </a:r>
+            <a:endParaRPr lang="en-CA" dirty="0"/>
+          </a:p>
+        </p:txBody>
+      </p:sp>
+      <p:sp>
+        <p:nvSpPr>
+          <p:cNvPr id="11" name="Rounded Rectangle 10"/>
+          <p:cNvSpPr/>
+          <p:nvPr/>
+        </p:nvSpPr>
+        <p:spPr>
+          <a:xfrm>
+            <a:off x="251520" y="4581128"/>
+            <a:ext cx="1728192" cy="1296144"/>
+          </a:xfrm>
+          <a:prstGeom prst="roundRect">
+            <a:avLst/>
+          </a:prstGeom>
+          <a:solidFill>
+            <a:schemeClr val="accent1">
+              <a:lumMod val="40000"/>
+              <a:lumOff val="60000"/>
+            </a:schemeClr>
+          </a:solidFill>
+        </p:spPr>
+        <p:style>
+          <a:lnRef idx="2">
+            <a:schemeClr val="accent1">
+              <a:shade val="50000"/>
+            </a:schemeClr>
+          </a:lnRef>
+          <a:fillRef idx="1">
+            <a:schemeClr val="accent1"/>
+          </a:fillRef>
+          <a:effectRef idx="0">
+            <a:schemeClr val="accent1"/>
+          </a:effectRef>
+          <a:fontRef idx="minor">
+            <a:schemeClr val="lt1"/>
+          </a:fontRef>
+        </p:style>
+        <p:txBody>
+          <a:bodyPr rtlCol="0" anchor="ctr"/>
+          <a:lstStyle/>
+          <a:p>
+            <a:pPr algn="ctr"/>
+            <a:r>
+              <a:rPr lang="en-CA" b="1" dirty="0" smtClean="0">
+                <a:solidFill>
+                  <a:schemeClr val="tx1"/>
+                </a:solidFill>
+                <a:latin typeface="Courier New" panose="02070309020205020404" pitchFamily="49" charset="0"/>
+                <a:cs typeface="Courier New" panose="02070309020205020404" pitchFamily="49" charset="0"/>
+              </a:rPr>
+              <a:t>*.</a:t>
+            </a:r>
+            <a:r>
+              <a:rPr lang="en-CA" b="1" dirty="0" err="1" smtClean="0">
+                <a:solidFill>
+                  <a:schemeClr val="tx1"/>
+                </a:solidFill>
+                <a:latin typeface="Courier New" panose="02070309020205020404" pitchFamily="49" charset="0"/>
+                <a:cs typeface="Courier New" panose="02070309020205020404" pitchFamily="49" charset="0"/>
+              </a:rPr>
+              <a:t>tpl</a:t>
+            </a:r>
+            <a:endParaRPr lang="en-CA" b="1" dirty="0">
+              <a:solidFill>
+                <a:schemeClr val="tx1"/>
+              </a:solidFill>
+              <a:latin typeface="Courier New" panose="02070309020205020404" pitchFamily="49" charset="0"/>
+              <a:cs typeface="Courier New" panose="02070309020205020404" pitchFamily="49" charset="0"/>
+            </a:endParaRPr>
+          </a:p>
+        </p:txBody>
+      </p:sp>
+      <p:sp>
+        <p:nvSpPr>
+          <p:cNvPr id="12" name="Rounded Rectangle 11"/>
+          <p:cNvSpPr/>
+          <p:nvPr/>
+        </p:nvSpPr>
+        <p:spPr>
+          <a:xfrm>
+            <a:off x="3635896" y="4581128"/>
+            <a:ext cx="1728192" cy="1296144"/>
+          </a:xfrm>
+          <a:prstGeom prst="roundRect">
+            <a:avLst/>
+          </a:prstGeom>
+          <a:solidFill>
+            <a:schemeClr val="accent1">
+              <a:lumMod val="40000"/>
+              <a:lumOff val="60000"/>
+            </a:schemeClr>
+          </a:solidFill>
+        </p:spPr>
+        <p:style>
+          <a:lnRef idx="2">
+            <a:schemeClr val="accent1">
+              <a:shade val="50000"/>
+            </a:schemeClr>
+          </a:lnRef>
+          <a:fillRef idx="1">
+            <a:schemeClr val="accent1"/>
+          </a:fillRef>
+          <a:effectRef idx="0">
+            <a:schemeClr val="accent1"/>
+          </a:effectRef>
+          <a:fontRef idx="minor">
+            <a:schemeClr val="lt1"/>
+          </a:fontRef>
+        </p:style>
+        <p:txBody>
+          <a:bodyPr rtlCol="0" anchor="ctr"/>
+          <a:lstStyle/>
+          <a:p>
+            <a:pPr algn="ctr"/>
+            <a:r>
+              <a:rPr lang="en-CA" b="1" dirty="0" smtClean="0">
+                <a:solidFill>
+                  <a:schemeClr val="tx1"/>
+                </a:solidFill>
+                <a:latin typeface="Courier New" panose="02070309020205020404" pitchFamily="49" charset="0"/>
+                <a:cs typeface="Courier New" panose="02070309020205020404" pitchFamily="49" charset="0"/>
+              </a:rPr>
+              <a:t>*.</a:t>
+            </a:r>
+            <a:r>
+              <a:rPr lang="en-CA" b="1" dirty="0" err="1" smtClean="0">
+                <a:solidFill>
+                  <a:schemeClr val="tx1"/>
+                </a:solidFill>
+                <a:latin typeface="Courier New" panose="02070309020205020404" pitchFamily="49" charset="0"/>
+                <a:cs typeface="Courier New" panose="02070309020205020404" pitchFamily="49" charset="0"/>
+              </a:rPr>
+              <a:t>cpp</a:t>
+            </a:r>
+            <a:endParaRPr lang="en-CA" b="1" dirty="0">
+              <a:solidFill>
+                <a:schemeClr val="tx1"/>
+              </a:solidFill>
+              <a:latin typeface="Courier New" panose="02070309020205020404" pitchFamily="49" charset="0"/>
+              <a:cs typeface="Courier New" panose="02070309020205020404" pitchFamily="49" charset="0"/>
+            </a:endParaRPr>
+          </a:p>
+        </p:txBody>
+      </p:sp>
+      <p:sp>
+        <p:nvSpPr>
+          <p:cNvPr id="13" name="Rounded Rectangle 12"/>
+          <p:cNvSpPr/>
+          <p:nvPr/>
+        </p:nvSpPr>
+        <p:spPr>
+          <a:xfrm>
+            <a:off x="7020272" y="4581128"/>
+            <a:ext cx="1728192" cy="1296144"/>
+          </a:xfrm>
+          <a:prstGeom prst="roundRect">
+            <a:avLst/>
+          </a:prstGeom>
+          <a:solidFill>
+            <a:schemeClr val="accent1">
+              <a:lumMod val="40000"/>
+              <a:lumOff val="60000"/>
+            </a:schemeClr>
+          </a:solidFill>
+        </p:spPr>
+        <p:style>
+          <a:lnRef idx="2">
+            <a:schemeClr val="accent1">
+              <a:shade val="50000"/>
+            </a:schemeClr>
+          </a:lnRef>
+          <a:fillRef idx="1">
+            <a:schemeClr val="accent1"/>
+          </a:fillRef>
+          <a:effectRef idx="0">
+            <a:schemeClr val="accent1"/>
+          </a:effectRef>
+          <a:fontRef idx="minor">
+            <a:schemeClr val="lt1"/>
+          </a:fontRef>
+        </p:style>
+        <p:txBody>
+          <a:bodyPr rtlCol="0" anchor="ctr"/>
+          <a:lstStyle/>
+          <a:p>
+            <a:pPr algn="ctr"/>
+            <a:r>
+              <a:rPr lang="en-CA" b="1" dirty="0" smtClean="0">
+                <a:solidFill>
+                  <a:schemeClr val="tx1"/>
+                </a:solidFill>
+                <a:latin typeface="Courier New" panose="02070309020205020404" pitchFamily="49" charset="0"/>
+                <a:cs typeface="Courier New" panose="02070309020205020404" pitchFamily="49" charset="0"/>
+              </a:rPr>
+              <a:t>*.exe</a:t>
+            </a:r>
+            <a:endParaRPr lang="en-CA" b="1" dirty="0">
+              <a:solidFill>
+                <a:schemeClr val="tx1"/>
+              </a:solidFill>
+              <a:latin typeface="Courier New" panose="02070309020205020404" pitchFamily="49" charset="0"/>
+              <a:cs typeface="Courier New" panose="02070309020205020404" pitchFamily="49" charset="0"/>
+            </a:endParaRPr>
+          </a:p>
+        </p:txBody>
+      </p:sp>
+      <p:sp>
+        <p:nvSpPr>
+          <p:cNvPr id="14" name="Right Arrow 13"/>
+          <p:cNvSpPr/>
+          <p:nvPr/>
+        </p:nvSpPr>
+        <p:spPr>
+          <a:xfrm>
+            <a:off x="2123728" y="5049180"/>
+            <a:ext cx="1368152" cy="432048"/>
+          </a:xfrm>
+          <a:prstGeom prst="rightArrow">
+            <a:avLst/>
+          </a:prstGeom>
+        </p:spPr>
+        <p:style>
+          <a:lnRef idx="2">
+            <a:schemeClr val="accent1">
+              <a:shade val="50000"/>
+            </a:schemeClr>
+          </a:lnRef>
+          <a:fillRef idx="1">
+            <a:schemeClr val="accent1"/>
+          </a:fillRef>
+          <a:effectRef idx="0">
+            <a:schemeClr val="accent1"/>
+          </a:effectRef>
+          <a:fontRef idx="minor">
+            <a:schemeClr val="lt1"/>
+          </a:fontRef>
+        </p:style>
+        <p:txBody>
+          <a:bodyPr rtlCol="0" anchor="ctr"/>
+          <a:lstStyle/>
+          <a:p>
+            <a:pPr algn="ctr"/>
+            <a:endParaRPr lang="en-CA"/>
+          </a:p>
+        </p:txBody>
+      </p:sp>
+      <p:sp>
+        <p:nvSpPr>
+          <p:cNvPr id="15" name="Right Arrow 14"/>
+          <p:cNvSpPr/>
+          <p:nvPr/>
+        </p:nvSpPr>
+        <p:spPr>
+          <a:xfrm>
+            <a:off x="5508104" y="5049180"/>
+            <a:ext cx="1368152" cy="432048"/>
+          </a:xfrm>
+          <a:prstGeom prst="rightArrow">
+            <a:avLst/>
+          </a:prstGeom>
+        </p:spPr>
+        <p:style>
+          <a:lnRef idx="2">
+            <a:schemeClr val="accent1">
+              <a:shade val="50000"/>
+            </a:schemeClr>
+          </a:lnRef>
+          <a:fillRef idx="1">
+            <a:schemeClr val="accent1"/>
+          </a:fillRef>
+          <a:effectRef idx="0">
+            <a:schemeClr val="accent1"/>
+          </a:effectRef>
+          <a:fontRef idx="minor">
+            <a:schemeClr val="lt1"/>
+          </a:fontRef>
+        </p:style>
+        <p:txBody>
+          <a:bodyPr rtlCol="0" anchor="ctr"/>
+          <a:lstStyle/>
+          <a:p>
+            <a:pPr algn="ctr"/>
+            <a:endParaRPr lang="en-CA"/>
+          </a:p>
+        </p:txBody>
+      </p:sp>
+      <p:sp>
+        <p:nvSpPr>
+          <p:cNvPr id="16" name="TextBox 15"/>
+          <p:cNvSpPr txBox="1"/>
+          <p:nvPr/>
+        </p:nvSpPr>
+        <p:spPr>
+          <a:xfrm>
+            <a:off x="2195736" y="4607840"/>
+            <a:ext cx="1368152" cy="369332"/>
+          </a:xfrm>
+          <a:prstGeom prst="rect">
+            <a:avLst/>
+          </a:prstGeom>
+          <a:noFill/>
+        </p:spPr>
+        <p:txBody>
+          <a:bodyPr wrap="square" rtlCol="0">
+            <a:spAutoFit/>
+          </a:bodyPr>
+          <a:lstStyle/>
+          <a:p>
+            <a:r>
+              <a:rPr lang="en-CA" dirty="0" smtClean="0"/>
+              <a:t>tpl2cpp</a:t>
+            </a:r>
+            <a:endParaRPr lang="en-CA" dirty="0"/>
+          </a:p>
+        </p:txBody>
+      </p:sp>
+      <p:sp>
+        <p:nvSpPr>
+          <p:cNvPr id="17" name="TextBox 16"/>
+          <p:cNvSpPr txBox="1"/>
+          <p:nvPr/>
+        </p:nvSpPr>
+        <p:spPr>
+          <a:xfrm>
+            <a:off x="5580112" y="4607840"/>
+            <a:ext cx="1368152" cy="369332"/>
+          </a:xfrm>
+          <a:prstGeom prst="rect">
+            <a:avLst/>
+          </a:prstGeom>
+          <a:noFill/>
+        </p:spPr>
+        <p:txBody>
+          <a:bodyPr wrap="square" rtlCol="0">
+            <a:spAutoFit/>
+          </a:bodyPr>
+          <a:lstStyle/>
+          <a:p>
+            <a:r>
+              <a:rPr lang="en-CA" dirty="0" smtClean="0"/>
+              <a:t>compile</a:t>
+            </a:r>
+            <a:endParaRPr lang="en-CA" dirty="0"/>
+          </a:p>
+        </p:txBody>
+      </p:sp>
+    </p:spTree>
+    <p:extLst>
+      <p:ext uri="{BB962C8B-B14F-4D97-AF65-F5344CB8AC3E}">
+        <p14:creationId xmlns:p14="http://schemas.microsoft.com/office/powerpoint/2010/main" val="1831359606"/>
+      </p:ext>
+    </p:extLst>
+  </p:cSld>
+  <p:clrMapOvr>
+    <a:masterClrMapping/>
+  </p:clrMapOvr>
+</p:sld>
+</file>
+
+<file path=ppt/slides/slide6.xml><?xml version="1.0" encoding="utf-8"?>
+<p:sld xmlns:a="http://schemas.openxmlformats.org/drawingml/2006/main" xmlns:r="http://schemas.openxmlformats.org/officeDocument/2006/relationships" xmlns:p="http://schemas.openxmlformats.org/presentationml/2006/main">
+  <p:cSld>
+    <p:spTree>
+      <p:nvGrpSpPr>
+        <p:cNvPr id="1" name=""/>
+        <p:cNvGrpSpPr/>
+        <p:nvPr/>
+      </p:nvGrpSpPr>
+      <p:grpSpPr>
+        <a:xfrm>
+          <a:off x="0" y="0"/>
+          <a:ext cx="0" cy="0"/>
+          <a:chOff x="0" y="0"/>
+          <a:chExt cx="0" cy="0"/>
+        </a:xfrm>
+      </p:grpSpPr>
+      <p:pic>
+        <p:nvPicPr>
+          <p:cNvPr id="1026" name="Picture 2"/>
+          <p:cNvPicPr>
+            <a:picLocks noChangeAspect="1" noChangeArrowheads="1"/>
+          </p:cNvPicPr>
+          <p:nvPr/>
+        </p:nvPicPr>
+        <p:blipFill rotWithShape="1">
+          <a:blip r:embed="rId2">
+            <a:extLst>
+              <a:ext uri="{28A0092B-C50C-407E-A947-70E740481C1C}">
+                <a14:useLocalDpi xmlns:a14="http://schemas.microsoft.com/office/drawing/2010/main" val="0"/>
+              </a:ext>
+            </a:extLst>
+          </a:blip>
+          <a:srcRect l="3662" t="6341" r="25851" b="6250"/>
+          <a:stretch/>
+        </p:blipFill>
+        <p:spPr bwMode="auto">
+          <a:xfrm>
+            <a:off x="24273" y="23191"/>
+            <a:ext cx="9171065" cy="6394174"/>
+          </a:xfrm>
+          <a:prstGeom prst="rect">
+            <a:avLst/>
+          </a:prstGeom>
+          <a:noFill/>
+          <a:ln>
+            <a:noFill/>
+          </a:ln>
+          <a:effectLst/>
+          <a:extLst>
+            <a:ext uri="{909E8E84-426E-40DD-AFC4-6F175D3DCCD1}">
+              <a14:hiddenFill xmlns:a14="http://schemas.microsoft.com/office/drawing/2010/main">
+                <a:solidFill>
+                  <a:schemeClr val="accent1"/>
+                </a:solidFill>
+              </a14:hiddenFill>
+            </a:ext>
+            <a:ext uri="{91240B29-F687-4F45-9708-019B960494DF}">
+              <a14:hiddenLine xmlns:a14="http://schemas.microsoft.com/office/drawing/2010/main" w="9525">
+                <a:solidFill>
+                  <a:schemeClr val="tx1"/>
+                </a:solidFill>
+                <a:miter lim="800000"/>
+                <a:headEnd/>
+                <a:tailEnd/>
+              </a14:hiddenLine>
+            </a:ext>
+            <a:ext uri="{AF507438-7753-43E0-B8FC-AC1667EBCBE1}">
+              <a14:hiddenEffects xmlns:a14="http://schemas.microsoft.com/office/drawing/2010/main">
+                <a:effectLst>
+                  <a:outerShdw dist="35921" dir="2700000" algn="ctr" rotWithShape="0">
+                    <a:schemeClr val="bg2"/>
+                  </a:outerShdw>
+                </a:effectLst>
+              </a14:hiddenEffects>
+            </a:ext>
+          </a:extLst>
+        </p:spPr>
+      </p:pic>
+    </p:spTree>
+    <p:extLst>
+      <p:ext uri="{BB962C8B-B14F-4D97-AF65-F5344CB8AC3E}">
+        <p14:creationId xmlns:p14="http://schemas.microsoft.com/office/powerpoint/2010/main" val="2473560943"/>
       </p:ext>
     </p:extLst>
   </p:cSld>

</xml_diff>

<commit_message>
Flushed out Intro to git.
Still rough in places, but much closer.
</commit_message>
<xml_diff>
--- a/PresentationFigures.pptx
+++ b/PresentationFigures.pptx
@@ -11,6 +11,8 @@
     <p:sldId id="259" r:id="rId5"/>
     <p:sldId id="261" r:id="rId6"/>
     <p:sldId id="260" r:id="rId7"/>
+    <p:sldId id="262" r:id="rId8"/>
+    <p:sldId id="263" r:id="rId9"/>
   </p:sldIdLst>
   <p:sldSz cx="9144000" cy="6858000" type="screen4x3"/>
   <p:notesSz cx="6858000" cy="9144000"/>
@@ -6852,6 +6854,976 @@
 </p:sld>
 </file>
 
+<file path=ppt/slides/slide7.xml><?xml version="1.0" encoding="utf-8"?>
+<p:sld xmlns:a="http://schemas.openxmlformats.org/drawingml/2006/main" xmlns:r="http://schemas.openxmlformats.org/officeDocument/2006/relationships" xmlns:p="http://schemas.openxmlformats.org/presentationml/2006/main">
+  <p:cSld>
+    <p:spTree>
+      <p:nvGrpSpPr>
+        <p:cNvPr id="1" name=""/>
+        <p:cNvGrpSpPr/>
+        <p:nvPr/>
+      </p:nvGrpSpPr>
+      <p:grpSpPr>
+        <a:xfrm>
+          <a:off x="0" y="0"/>
+          <a:ext cx="0" cy="0"/>
+          <a:chOff x="0" y="0"/>
+          <a:chExt cx="0" cy="0"/>
+        </a:xfrm>
+      </p:grpSpPr>
+      <p:sp>
+        <p:nvSpPr>
+          <p:cNvPr id="4" name="Rounded Rectangle 3"/>
+          <p:cNvSpPr/>
+          <p:nvPr/>
+        </p:nvSpPr>
+        <p:spPr>
+          <a:xfrm>
+            <a:off x="323528" y="3158970"/>
+            <a:ext cx="1152128" cy="828092"/>
+          </a:xfrm>
+          <a:prstGeom prst="roundRect">
+            <a:avLst/>
+          </a:prstGeom>
+          <a:solidFill>
+            <a:schemeClr val="accent1">
+              <a:lumMod val="40000"/>
+              <a:lumOff val="60000"/>
+            </a:schemeClr>
+          </a:solidFill>
+        </p:spPr>
+        <p:style>
+          <a:lnRef idx="2">
+            <a:schemeClr val="accent1">
+              <a:shade val="50000"/>
+            </a:schemeClr>
+          </a:lnRef>
+          <a:fillRef idx="1">
+            <a:schemeClr val="accent1"/>
+          </a:fillRef>
+          <a:effectRef idx="0">
+            <a:schemeClr val="accent1"/>
+          </a:effectRef>
+          <a:fontRef idx="minor">
+            <a:schemeClr val="lt1"/>
+          </a:fontRef>
+        </p:style>
+        <p:txBody>
+          <a:bodyPr rtlCol="0" anchor="ctr"/>
+          <a:lstStyle/>
+          <a:p>
+            <a:pPr algn="ctr"/>
+            <a:r>
+              <a:rPr lang="en-CA" sz="1400" b="1" dirty="0" smtClean="0">
+                <a:solidFill>
+                  <a:schemeClr val="tx1"/>
+                </a:solidFill>
+                <a:latin typeface="Courier New" panose="02070309020205020404" pitchFamily="49" charset="0"/>
+                <a:cs typeface="Courier New" panose="02070309020205020404" pitchFamily="49" charset="0"/>
+              </a:rPr>
+              <a:t>2eabdd2</a:t>
+            </a:r>
+            <a:endParaRPr lang="en-CA" sz="1400" b="1" dirty="0">
+              <a:solidFill>
+                <a:schemeClr val="tx1"/>
+              </a:solidFill>
+              <a:latin typeface="Courier New" panose="02070309020205020404" pitchFamily="49" charset="0"/>
+              <a:cs typeface="Courier New" panose="02070309020205020404" pitchFamily="49" charset="0"/>
+            </a:endParaRPr>
+          </a:p>
+        </p:txBody>
+      </p:sp>
+      <p:sp>
+        <p:nvSpPr>
+          <p:cNvPr id="5" name="Rounded Rectangle 4"/>
+          <p:cNvSpPr/>
+          <p:nvPr/>
+        </p:nvSpPr>
+        <p:spPr>
+          <a:xfrm>
+            <a:off x="2231740" y="3158970"/>
+            <a:ext cx="1152128" cy="828092"/>
+          </a:xfrm>
+          <a:prstGeom prst="roundRect">
+            <a:avLst/>
+          </a:prstGeom>
+          <a:solidFill>
+            <a:schemeClr val="accent1">
+              <a:lumMod val="40000"/>
+              <a:lumOff val="60000"/>
+            </a:schemeClr>
+          </a:solidFill>
+        </p:spPr>
+        <p:style>
+          <a:lnRef idx="2">
+            <a:schemeClr val="accent1">
+              <a:shade val="50000"/>
+            </a:schemeClr>
+          </a:lnRef>
+          <a:fillRef idx="1">
+            <a:schemeClr val="accent1"/>
+          </a:fillRef>
+          <a:effectRef idx="0">
+            <a:schemeClr val="accent1"/>
+          </a:effectRef>
+          <a:fontRef idx="minor">
+            <a:schemeClr val="lt1"/>
+          </a:fontRef>
+        </p:style>
+        <p:txBody>
+          <a:bodyPr rtlCol="0" anchor="ctr"/>
+          <a:lstStyle/>
+          <a:p>
+            <a:pPr algn="ctr"/>
+            <a:r>
+              <a:rPr lang="en-CA" sz="1400" b="1" dirty="0" smtClean="0">
+                <a:solidFill>
+                  <a:schemeClr val="tx1"/>
+                </a:solidFill>
+                <a:latin typeface="Courier New" panose="02070309020205020404" pitchFamily="49" charset="0"/>
+                <a:cs typeface="Courier New" panose="02070309020205020404" pitchFamily="49" charset="0"/>
+              </a:rPr>
+              <a:t>fef4257</a:t>
+            </a:r>
+            <a:endParaRPr lang="en-CA" sz="1400" b="1" dirty="0">
+              <a:solidFill>
+                <a:schemeClr val="tx1"/>
+              </a:solidFill>
+              <a:latin typeface="Courier New" panose="02070309020205020404" pitchFamily="49" charset="0"/>
+              <a:cs typeface="Courier New" panose="02070309020205020404" pitchFamily="49" charset="0"/>
+            </a:endParaRPr>
+          </a:p>
+        </p:txBody>
+      </p:sp>
+      <p:sp>
+        <p:nvSpPr>
+          <p:cNvPr id="6" name="Rounded Rectangle 5"/>
+          <p:cNvSpPr/>
+          <p:nvPr/>
+        </p:nvSpPr>
+        <p:spPr>
+          <a:xfrm>
+            <a:off x="4139952" y="3158970"/>
+            <a:ext cx="1152128" cy="828092"/>
+          </a:xfrm>
+          <a:prstGeom prst="roundRect">
+            <a:avLst/>
+          </a:prstGeom>
+          <a:solidFill>
+            <a:schemeClr val="accent1">
+              <a:lumMod val="40000"/>
+              <a:lumOff val="60000"/>
+            </a:schemeClr>
+          </a:solidFill>
+        </p:spPr>
+        <p:style>
+          <a:lnRef idx="2">
+            <a:schemeClr val="accent1">
+              <a:shade val="50000"/>
+            </a:schemeClr>
+          </a:lnRef>
+          <a:fillRef idx="1">
+            <a:schemeClr val="accent1"/>
+          </a:fillRef>
+          <a:effectRef idx="0">
+            <a:schemeClr val="accent1"/>
+          </a:effectRef>
+          <a:fontRef idx="minor">
+            <a:schemeClr val="lt1"/>
+          </a:fontRef>
+        </p:style>
+        <p:txBody>
+          <a:bodyPr rtlCol="0" anchor="ctr"/>
+          <a:lstStyle/>
+          <a:p>
+            <a:pPr algn="ctr"/>
+            <a:r>
+              <a:rPr lang="en-CA" sz="1400" b="1" dirty="0" smtClean="0">
+                <a:solidFill>
+                  <a:schemeClr val="tx1"/>
+                </a:solidFill>
+                <a:latin typeface="Courier New" panose="02070309020205020404" pitchFamily="49" charset="0"/>
+                <a:cs typeface="Courier New" panose="02070309020205020404" pitchFamily="49" charset="0"/>
+              </a:rPr>
+              <a:t>d448487</a:t>
+            </a:r>
+            <a:endParaRPr lang="en-CA" sz="1400" b="1" dirty="0">
+              <a:solidFill>
+                <a:schemeClr val="tx1"/>
+              </a:solidFill>
+              <a:latin typeface="Courier New" panose="02070309020205020404" pitchFamily="49" charset="0"/>
+              <a:cs typeface="Courier New" panose="02070309020205020404" pitchFamily="49" charset="0"/>
+            </a:endParaRPr>
+          </a:p>
+        </p:txBody>
+      </p:sp>
+      <p:sp>
+        <p:nvSpPr>
+          <p:cNvPr id="7" name="Rounded Rectangle 6"/>
+          <p:cNvSpPr/>
+          <p:nvPr/>
+        </p:nvSpPr>
+        <p:spPr>
+          <a:xfrm>
+            <a:off x="6048164" y="3158970"/>
+            <a:ext cx="1152128" cy="828092"/>
+          </a:xfrm>
+          <a:prstGeom prst="roundRect">
+            <a:avLst/>
+          </a:prstGeom>
+          <a:solidFill>
+            <a:schemeClr val="accent1">
+              <a:lumMod val="40000"/>
+              <a:lumOff val="60000"/>
+            </a:schemeClr>
+          </a:solidFill>
+        </p:spPr>
+        <p:style>
+          <a:lnRef idx="2">
+            <a:schemeClr val="accent1">
+              <a:shade val="50000"/>
+            </a:schemeClr>
+          </a:lnRef>
+          <a:fillRef idx="1">
+            <a:schemeClr val="accent1"/>
+          </a:fillRef>
+          <a:effectRef idx="0">
+            <a:schemeClr val="accent1"/>
+          </a:effectRef>
+          <a:fontRef idx="minor">
+            <a:schemeClr val="lt1"/>
+          </a:fontRef>
+        </p:style>
+        <p:txBody>
+          <a:bodyPr rtlCol="0" anchor="ctr"/>
+          <a:lstStyle/>
+          <a:p>
+            <a:pPr algn="ctr"/>
+            <a:r>
+              <a:rPr lang="en-CA" sz="1400" b="1" dirty="0" smtClean="0">
+                <a:solidFill>
+                  <a:schemeClr val="tx1"/>
+                </a:solidFill>
+                <a:latin typeface="Courier New" panose="02070309020205020404" pitchFamily="49" charset="0"/>
+                <a:cs typeface="Courier New" panose="02070309020205020404" pitchFamily="49" charset="0"/>
+              </a:rPr>
+              <a:t>5565a92</a:t>
+            </a:r>
+            <a:endParaRPr lang="en-CA" sz="1400" b="1" dirty="0">
+              <a:solidFill>
+                <a:schemeClr val="tx1"/>
+              </a:solidFill>
+              <a:latin typeface="Courier New" panose="02070309020205020404" pitchFamily="49" charset="0"/>
+              <a:cs typeface="Courier New" panose="02070309020205020404" pitchFamily="49" charset="0"/>
+            </a:endParaRPr>
+          </a:p>
+        </p:txBody>
+      </p:sp>
+      <p:sp>
+        <p:nvSpPr>
+          <p:cNvPr id="8" name="Rounded Rectangle 7"/>
+          <p:cNvSpPr/>
+          <p:nvPr/>
+        </p:nvSpPr>
+        <p:spPr>
+          <a:xfrm>
+            <a:off x="4139952" y="1808820"/>
+            <a:ext cx="1152128" cy="828092"/>
+          </a:xfrm>
+          <a:prstGeom prst="roundRect">
+            <a:avLst/>
+          </a:prstGeom>
+          <a:solidFill>
+            <a:schemeClr val="accent1">
+              <a:lumMod val="40000"/>
+              <a:lumOff val="60000"/>
+            </a:schemeClr>
+          </a:solidFill>
+        </p:spPr>
+        <p:style>
+          <a:lnRef idx="2">
+            <a:schemeClr val="accent1">
+              <a:shade val="50000"/>
+            </a:schemeClr>
+          </a:lnRef>
+          <a:fillRef idx="1">
+            <a:schemeClr val="accent1"/>
+          </a:fillRef>
+          <a:effectRef idx="0">
+            <a:schemeClr val="accent1"/>
+          </a:effectRef>
+          <a:fontRef idx="minor">
+            <a:schemeClr val="lt1"/>
+          </a:fontRef>
+        </p:style>
+        <p:txBody>
+          <a:bodyPr rtlCol="0" anchor="ctr"/>
+          <a:lstStyle/>
+          <a:p>
+            <a:pPr algn="ctr"/>
+            <a:r>
+              <a:rPr lang="en-CA" sz="1400" b="1" dirty="0" smtClean="0">
+                <a:solidFill>
+                  <a:schemeClr val="tx1"/>
+                </a:solidFill>
+                <a:latin typeface="Courier New" panose="02070309020205020404" pitchFamily="49" charset="0"/>
+                <a:cs typeface="Courier New" panose="02070309020205020404" pitchFamily="49" charset="0"/>
+              </a:rPr>
+              <a:t>a5c64ca</a:t>
+            </a:r>
+            <a:endParaRPr lang="en-CA" sz="1400" b="1" dirty="0">
+              <a:solidFill>
+                <a:schemeClr val="tx1"/>
+              </a:solidFill>
+              <a:latin typeface="Courier New" panose="02070309020205020404" pitchFamily="49" charset="0"/>
+              <a:cs typeface="Courier New" panose="02070309020205020404" pitchFamily="49" charset="0"/>
+            </a:endParaRPr>
+          </a:p>
+        </p:txBody>
+      </p:sp>
+      <p:sp>
+        <p:nvSpPr>
+          <p:cNvPr id="9" name="Rounded Rectangle 8"/>
+          <p:cNvSpPr/>
+          <p:nvPr/>
+        </p:nvSpPr>
+        <p:spPr>
+          <a:xfrm>
+            <a:off x="6012160" y="1808820"/>
+            <a:ext cx="1152128" cy="828092"/>
+          </a:xfrm>
+          <a:prstGeom prst="roundRect">
+            <a:avLst/>
+          </a:prstGeom>
+          <a:solidFill>
+            <a:schemeClr val="accent1">
+              <a:lumMod val="40000"/>
+              <a:lumOff val="60000"/>
+            </a:schemeClr>
+          </a:solidFill>
+        </p:spPr>
+        <p:style>
+          <a:lnRef idx="2">
+            <a:schemeClr val="accent1">
+              <a:shade val="50000"/>
+            </a:schemeClr>
+          </a:lnRef>
+          <a:fillRef idx="1">
+            <a:schemeClr val="accent1"/>
+          </a:fillRef>
+          <a:effectRef idx="0">
+            <a:schemeClr val="accent1"/>
+          </a:effectRef>
+          <a:fontRef idx="minor">
+            <a:schemeClr val="lt1"/>
+          </a:fontRef>
+        </p:style>
+        <p:txBody>
+          <a:bodyPr rtlCol="0" anchor="ctr"/>
+          <a:lstStyle/>
+          <a:p>
+            <a:pPr algn="ctr"/>
+            <a:r>
+              <a:rPr lang="en-CA" sz="1400" b="1" dirty="0" smtClean="0">
+                <a:solidFill>
+                  <a:schemeClr val="tx1"/>
+                </a:solidFill>
+                <a:latin typeface="Courier New" panose="02070309020205020404" pitchFamily="49" charset="0"/>
+                <a:cs typeface="Courier New" panose="02070309020205020404" pitchFamily="49" charset="0"/>
+              </a:rPr>
+              <a:t>fb0e936</a:t>
+            </a:r>
+            <a:endParaRPr lang="en-CA" sz="1400" b="1" dirty="0">
+              <a:solidFill>
+                <a:schemeClr val="tx1"/>
+              </a:solidFill>
+              <a:latin typeface="Courier New" panose="02070309020205020404" pitchFamily="49" charset="0"/>
+              <a:cs typeface="Courier New" panose="02070309020205020404" pitchFamily="49" charset="0"/>
+            </a:endParaRPr>
+          </a:p>
+        </p:txBody>
+      </p:sp>
+      <p:sp>
+        <p:nvSpPr>
+          <p:cNvPr id="10" name="Rounded Rectangle 9"/>
+          <p:cNvSpPr/>
+          <p:nvPr/>
+        </p:nvSpPr>
+        <p:spPr>
+          <a:xfrm>
+            <a:off x="7956376" y="3158970"/>
+            <a:ext cx="1152128" cy="828092"/>
+          </a:xfrm>
+          <a:prstGeom prst="roundRect">
+            <a:avLst/>
+          </a:prstGeom>
+          <a:solidFill>
+            <a:schemeClr val="accent1">
+              <a:lumMod val="40000"/>
+              <a:lumOff val="60000"/>
+            </a:schemeClr>
+          </a:solidFill>
+        </p:spPr>
+        <p:style>
+          <a:lnRef idx="2">
+            <a:schemeClr val="accent1">
+              <a:shade val="50000"/>
+            </a:schemeClr>
+          </a:lnRef>
+          <a:fillRef idx="1">
+            <a:schemeClr val="accent1"/>
+          </a:fillRef>
+          <a:effectRef idx="0">
+            <a:schemeClr val="accent1"/>
+          </a:effectRef>
+          <a:fontRef idx="minor">
+            <a:schemeClr val="lt1"/>
+          </a:fontRef>
+        </p:style>
+        <p:txBody>
+          <a:bodyPr rtlCol="0" anchor="ctr"/>
+          <a:lstStyle/>
+          <a:p>
+            <a:pPr algn="ctr"/>
+            <a:r>
+              <a:rPr lang="en-CA" sz="1400" b="1" dirty="0" smtClean="0">
+                <a:solidFill>
+                  <a:schemeClr val="tx1"/>
+                </a:solidFill>
+                <a:latin typeface="Courier New" panose="02070309020205020404" pitchFamily="49" charset="0"/>
+                <a:cs typeface="Courier New" panose="02070309020205020404" pitchFamily="49" charset="0"/>
+              </a:rPr>
+              <a:t>96e1c1b</a:t>
+            </a:r>
+            <a:endParaRPr lang="en-CA" sz="1400" b="1" dirty="0">
+              <a:solidFill>
+                <a:schemeClr val="tx1"/>
+              </a:solidFill>
+              <a:latin typeface="Courier New" panose="02070309020205020404" pitchFamily="49" charset="0"/>
+              <a:cs typeface="Courier New" panose="02070309020205020404" pitchFamily="49" charset="0"/>
+            </a:endParaRPr>
+          </a:p>
+        </p:txBody>
+      </p:sp>
+      <p:sp>
+        <p:nvSpPr>
+          <p:cNvPr id="11" name="Right Arrow 10"/>
+          <p:cNvSpPr/>
+          <p:nvPr/>
+        </p:nvSpPr>
+        <p:spPr>
+          <a:xfrm>
+            <a:off x="1619672" y="3429000"/>
+            <a:ext cx="504056" cy="216024"/>
+          </a:xfrm>
+          <a:prstGeom prst="rightArrow">
+            <a:avLst/>
+          </a:prstGeom>
+        </p:spPr>
+        <p:style>
+          <a:lnRef idx="2">
+            <a:schemeClr val="accent1">
+              <a:shade val="50000"/>
+            </a:schemeClr>
+          </a:lnRef>
+          <a:fillRef idx="1">
+            <a:schemeClr val="accent1"/>
+          </a:fillRef>
+          <a:effectRef idx="0">
+            <a:schemeClr val="accent1"/>
+          </a:effectRef>
+          <a:fontRef idx="minor">
+            <a:schemeClr val="lt1"/>
+          </a:fontRef>
+        </p:style>
+        <p:txBody>
+          <a:bodyPr rtlCol="0" anchor="ctr"/>
+          <a:lstStyle/>
+          <a:p>
+            <a:pPr algn="ctr"/>
+            <a:endParaRPr lang="en-CA"/>
+          </a:p>
+        </p:txBody>
+      </p:sp>
+      <p:sp>
+        <p:nvSpPr>
+          <p:cNvPr id="12" name="Right Arrow 11"/>
+          <p:cNvSpPr/>
+          <p:nvPr/>
+        </p:nvSpPr>
+        <p:spPr>
+          <a:xfrm>
+            <a:off x="3491880" y="3429000"/>
+            <a:ext cx="504056" cy="216024"/>
+          </a:xfrm>
+          <a:prstGeom prst="rightArrow">
+            <a:avLst/>
+          </a:prstGeom>
+        </p:spPr>
+        <p:style>
+          <a:lnRef idx="2">
+            <a:schemeClr val="accent1">
+              <a:shade val="50000"/>
+            </a:schemeClr>
+          </a:lnRef>
+          <a:fillRef idx="1">
+            <a:schemeClr val="accent1"/>
+          </a:fillRef>
+          <a:effectRef idx="0">
+            <a:schemeClr val="accent1"/>
+          </a:effectRef>
+          <a:fontRef idx="minor">
+            <a:schemeClr val="lt1"/>
+          </a:fontRef>
+        </p:style>
+        <p:txBody>
+          <a:bodyPr rtlCol="0" anchor="ctr"/>
+          <a:lstStyle/>
+          <a:p>
+            <a:pPr algn="ctr"/>
+            <a:endParaRPr lang="en-CA"/>
+          </a:p>
+        </p:txBody>
+      </p:sp>
+      <p:sp>
+        <p:nvSpPr>
+          <p:cNvPr id="13" name="Right Arrow 12"/>
+          <p:cNvSpPr/>
+          <p:nvPr/>
+        </p:nvSpPr>
+        <p:spPr>
+          <a:xfrm>
+            <a:off x="5436096" y="3501008"/>
+            <a:ext cx="504056" cy="216024"/>
+          </a:xfrm>
+          <a:prstGeom prst="rightArrow">
+            <a:avLst/>
+          </a:prstGeom>
+        </p:spPr>
+        <p:style>
+          <a:lnRef idx="2">
+            <a:schemeClr val="accent1">
+              <a:shade val="50000"/>
+            </a:schemeClr>
+          </a:lnRef>
+          <a:fillRef idx="1">
+            <a:schemeClr val="accent1"/>
+          </a:fillRef>
+          <a:effectRef idx="0">
+            <a:schemeClr val="accent1"/>
+          </a:effectRef>
+          <a:fontRef idx="minor">
+            <a:schemeClr val="lt1"/>
+          </a:fontRef>
+        </p:style>
+        <p:txBody>
+          <a:bodyPr rtlCol="0" anchor="ctr"/>
+          <a:lstStyle/>
+          <a:p>
+            <a:pPr algn="ctr"/>
+            <a:endParaRPr lang="en-CA"/>
+          </a:p>
+        </p:txBody>
+      </p:sp>
+      <p:sp>
+        <p:nvSpPr>
+          <p:cNvPr id="14" name="Right Arrow 13"/>
+          <p:cNvSpPr/>
+          <p:nvPr/>
+        </p:nvSpPr>
+        <p:spPr>
+          <a:xfrm>
+            <a:off x="7380312" y="3501008"/>
+            <a:ext cx="504056" cy="216024"/>
+          </a:xfrm>
+          <a:prstGeom prst="rightArrow">
+            <a:avLst/>
+          </a:prstGeom>
+        </p:spPr>
+        <p:style>
+          <a:lnRef idx="2">
+            <a:schemeClr val="accent1">
+              <a:shade val="50000"/>
+            </a:schemeClr>
+          </a:lnRef>
+          <a:fillRef idx="1">
+            <a:schemeClr val="accent1"/>
+          </a:fillRef>
+          <a:effectRef idx="0">
+            <a:schemeClr val="accent1"/>
+          </a:effectRef>
+          <a:fontRef idx="minor">
+            <a:schemeClr val="lt1"/>
+          </a:fontRef>
+        </p:style>
+        <p:txBody>
+          <a:bodyPr rtlCol="0" anchor="ctr"/>
+          <a:lstStyle/>
+          <a:p>
+            <a:pPr algn="ctr"/>
+            <a:endParaRPr lang="en-CA"/>
+          </a:p>
+        </p:txBody>
+      </p:sp>
+      <p:sp>
+        <p:nvSpPr>
+          <p:cNvPr id="15" name="Right Arrow 14"/>
+          <p:cNvSpPr/>
+          <p:nvPr/>
+        </p:nvSpPr>
+        <p:spPr>
+          <a:xfrm>
+            <a:off x="5436096" y="2168860"/>
+            <a:ext cx="504056" cy="216024"/>
+          </a:xfrm>
+          <a:prstGeom prst="rightArrow">
+            <a:avLst/>
+          </a:prstGeom>
+        </p:spPr>
+        <p:style>
+          <a:lnRef idx="2">
+            <a:schemeClr val="accent1">
+              <a:shade val="50000"/>
+            </a:schemeClr>
+          </a:lnRef>
+          <a:fillRef idx="1">
+            <a:schemeClr val="accent1"/>
+          </a:fillRef>
+          <a:effectRef idx="0">
+            <a:schemeClr val="accent1"/>
+          </a:effectRef>
+          <a:fontRef idx="minor">
+            <a:schemeClr val="lt1"/>
+          </a:fontRef>
+        </p:style>
+        <p:txBody>
+          <a:bodyPr rtlCol="0" anchor="ctr"/>
+          <a:lstStyle/>
+          <a:p>
+            <a:pPr algn="ctr"/>
+            <a:endParaRPr lang="en-CA"/>
+          </a:p>
+        </p:txBody>
+      </p:sp>
+      <p:sp>
+        <p:nvSpPr>
+          <p:cNvPr id="16" name="Right Arrow 15"/>
+          <p:cNvSpPr/>
+          <p:nvPr/>
+        </p:nvSpPr>
+        <p:spPr>
+          <a:xfrm rot="19044843">
+            <a:off x="3413249" y="2638868"/>
+            <a:ext cx="504056" cy="216024"/>
+          </a:xfrm>
+          <a:prstGeom prst="rightArrow">
+            <a:avLst/>
+          </a:prstGeom>
+        </p:spPr>
+        <p:style>
+          <a:lnRef idx="2">
+            <a:schemeClr val="accent1">
+              <a:shade val="50000"/>
+            </a:schemeClr>
+          </a:lnRef>
+          <a:fillRef idx="1">
+            <a:schemeClr val="accent1"/>
+          </a:fillRef>
+          <a:effectRef idx="0">
+            <a:schemeClr val="accent1"/>
+          </a:effectRef>
+          <a:fontRef idx="minor">
+            <a:schemeClr val="lt1"/>
+          </a:fontRef>
+        </p:style>
+        <p:txBody>
+          <a:bodyPr rtlCol="0" anchor="ctr"/>
+          <a:lstStyle/>
+          <a:p>
+            <a:pPr algn="ctr"/>
+            <a:endParaRPr lang="en-CA"/>
+          </a:p>
+        </p:txBody>
+      </p:sp>
+      <p:sp>
+        <p:nvSpPr>
+          <p:cNvPr id="17" name="Right Arrow 16"/>
+          <p:cNvSpPr/>
+          <p:nvPr/>
+        </p:nvSpPr>
+        <p:spPr>
+          <a:xfrm rot="2912051">
+            <a:off x="7448118" y="2645265"/>
+            <a:ext cx="504056" cy="216024"/>
+          </a:xfrm>
+          <a:prstGeom prst="rightArrow">
+            <a:avLst/>
+          </a:prstGeom>
+        </p:spPr>
+        <p:style>
+          <a:lnRef idx="2">
+            <a:schemeClr val="accent1">
+              <a:shade val="50000"/>
+            </a:schemeClr>
+          </a:lnRef>
+          <a:fillRef idx="1">
+            <a:schemeClr val="accent1"/>
+          </a:fillRef>
+          <a:effectRef idx="0">
+            <a:schemeClr val="accent1"/>
+          </a:effectRef>
+          <a:fontRef idx="minor">
+            <a:schemeClr val="lt1"/>
+          </a:fontRef>
+        </p:style>
+        <p:txBody>
+          <a:bodyPr rtlCol="0" anchor="ctr"/>
+          <a:lstStyle/>
+          <a:p>
+            <a:pPr algn="ctr"/>
+            <a:endParaRPr lang="en-CA"/>
+          </a:p>
+        </p:txBody>
+      </p:sp>
+      <p:sp>
+        <p:nvSpPr>
+          <p:cNvPr id="18" name="TextBox 17"/>
+          <p:cNvSpPr txBox="1"/>
+          <p:nvPr/>
+        </p:nvSpPr>
+        <p:spPr>
+          <a:xfrm>
+            <a:off x="7812360" y="2195572"/>
+            <a:ext cx="1192334" cy="369332"/>
+          </a:xfrm>
+          <a:prstGeom prst="rect">
+            <a:avLst/>
+          </a:prstGeom>
+          <a:noFill/>
+        </p:spPr>
+        <p:txBody>
+          <a:bodyPr wrap="square" rtlCol="0">
+            <a:spAutoFit/>
+          </a:bodyPr>
+          <a:lstStyle/>
+          <a:p>
+            <a:r>
+              <a:rPr lang="en-CA" b="1" dirty="0" smtClean="0"/>
+              <a:t>merge</a:t>
+            </a:r>
+            <a:endParaRPr lang="en-CA" b="1" dirty="0"/>
+          </a:p>
+        </p:txBody>
+      </p:sp>
+      <p:sp>
+        <p:nvSpPr>
+          <p:cNvPr id="19" name="TextBox 18"/>
+          <p:cNvSpPr txBox="1"/>
+          <p:nvPr/>
+        </p:nvSpPr>
+        <p:spPr>
+          <a:xfrm>
+            <a:off x="2699792" y="2204864"/>
+            <a:ext cx="1192334" cy="369332"/>
+          </a:xfrm>
+          <a:prstGeom prst="rect">
+            <a:avLst/>
+          </a:prstGeom>
+          <a:noFill/>
+        </p:spPr>
+        <p:txBody>
+          <a:bodyPr wrap="square" rtlCol="0">
+            <a:spAutoFit/>
+          </a:bodyPr>
+          <a:lstStyle/>
+          <a:p>
+            <a:r>
+              <a:rPr lang="en-CA" b="1" dirty="0" smtClean="0"/>
+              <a:t>branch</a:t>
+            </a:r>
+            <a:endParaRPr lang="en-CA" b="1" dirty="0"/>
+          </a:p>
+        </p:txBody>
+      </p:sp>
+      <p:sp>
+        <p:nvSpPr>
+          <p:cNvPr id="21" name="TextBox 20"/>
+          <p:cNvSpPr txBox="1"/>
+          <p:nvPr/>
+        </p:nvSpPr>
+        <p:spPr>
+          <a:xfrm>
+            <a:off x="8276210" y="4149080"/>
+            <a:ext cx="760286" cy="369332"/>
+          </a:xfrm>
+          <a:prstGeom prst="rect">
+            <a:avLst/>
+          </a:prstGeom>
+          <a:noFill/>
+        </p:spPr>
+        <p:txBody>
+          <a:bodyPr wrap="square" rtlCol="0">
+            <a:spAutoFit/>
+          </a:bodyPr>
+          <a:lstStyle/>
+          <a:p>
+            <a:r>
+              <a:rPr lang="en-CA" b="1" dirty="0" smtClean="0"/>
+              <a:t>HEAD</a:t>
+            </a:r>
+            <a:endParaRPr lang="en-CA" b="1" dirty="0"/>
+          </a:p>
+        </p:txBody>
+      </p:sp>
+    </p:spTree>
+    <p:extLst>
+      <p:ext uri="{BB962C8B-B14F-4D97-AF65-F5344CB8AC3E}">
+        <p14:creationId xmlns:p14="http://schemas.microsoft.com/office/powerpoint/2010/main" val="2865281940"/>
+      </p:ext>
+    </p:extLst>
+  </p:cSld>
+  <p:clrMapOvr>
+    <a:masterClrMapping/>
+  </p:clrMapOvr>
+  <p:timing>
+    <p:tnLst>
+      <p:par>
+        <p:cTn id="1" dur="indefinite" restart="never" nodeType="tmRoot"/>
+      </p:par>
+    </p:tnLst>
+  </p:timing>
+</p:sld>
+</file>
+
+<file path=ppt/slides/slide8.xml><?xml version="1.0" encoding="utf-8"?>
+<p:sld xmlns:a="http://schemas.openxmlformats.org/drawingml/2006/main" xmlns:r="http://schemas.openxmlformats.org/officeDocument/2006/relationships" xmlns:p="http://schemas.openxmlformats.org/presentationml/2006/main">
+  <p:cSld>
+    <p:spTree>
+      <p:nvGrpSpPr>
+        <p:cNvPr id="1" name=""/>
+        <p:cNvGrpSpPr/>
+        <p:nvPr/>
+      </p:nvGrpSpPr>
+      <p:grpSpPr>
+        <a:xfrm>
+          <a:off x="0" y="0"/>
+          <a:ext cx="0" cy="0"/>
+          <a:chOff x="0" y="0"/>
+          <a:chExt cx="0" cy="0"/>
+        </a:xfrm>
+      </p:grpSpPr>
+      <p:sp>
+        <p:nvSpPr>
+          <p:cNvPr id="4" name="Rounded Rectangle 3"/>
+          <p:cNvSpPr/>
+          <p:nvPr/>
+        </p:nvSpPr>
+        <p:spPr>
+          <a:xfrm>
+            <a:off x="323528" y="3158970"/>
+            <a:ext cx="1152128" cy="828092"/>
+          </a:xfrm>
+          <a:prstGeom prst="roundRect">
+            <a:avLst/>
+          </a:prstGeom>
+          <a:solidFill>
+            <a:schemeClr val="accent1">
+              <a:lumMod val="40000"/>
+              <a:lumOff val="60000"/>
+            </a:schemeClr>
+          </a:solidFill>
+        </p:spPr>
+        <p:style>
+          <a:lnRef idx="2">
+            <a:schemeClr val="accent1">
+              <a:shade val="50000"/>
+            </a:schemeClr>
+          </a:lnRef>
+          <a:fillRef idx="1">
+            <a:schemeClr val="accent1"/>
+          </a:fillRef>
+          <a:effectRef idx="0">
+            <a:schemeClr val="accent1"/>
+          </a:effectRef>
+          <a:fontRef idx="minor">
+            <a:schemeClr val="lt1"/>
+          </a:fontRef>
+        </p:style>
+        <p:txBody>
+          <a:bodyPr rtlCol="0" anchor="ctr"/>
+          <a:lstStyle/>
+          <a:p>
+            <a:pPr algn="ctr"/>
+            <a:r>
+              <a:rPr lang="en-CA" sz="1400" b="1" dirty="0" smtClean="0">
+                <a:solidFill>
+                  <a:schemeClr val="tx1"/>
+                </a:solidFill>
+                <a:latin typeface="Courier New" panose="02070309020205020404" pitchFamily="49" charset="0"/>
+                <a:cs typeface="Courier New" panose="02070309020205020404" pitchFamily="49" charset="0"/>
+              </a:rPr>
+              <a:t>2eabdd2</a:t>
+            </a:r>
+            <a:endParaRPr lang="en-CA" sz="1400" b="1" dirty="0">
+              <a:solidFill>
+                <a:schemeClr val="tx1"/>
+              </a:solidFill>
+              <a:latin typeface="Courier New" panose="02070309020205020404" pitchFamily="49" charset="0"/>
+              <a:cs typeface="Courier New" panose="02070309020205020404" pitchFamily="49" charset="0"/>
+            </a:endParaRPr>
+          </a:p>
+        </p:txBody>
+      </p:sp>
+      <p:sp>
+        <p:nvSpPr>
+          <p:cNvPr id="21" name="TextBox 20"/>
+          <p:cNvSpPr txBox="1"/>
+          <p:nvPr/>
+        </p:nvSpPr>
+        <p:spPr>
+          <a:xfrm>
+            <a:off x="519449" y="4149080"/>
+            <a:ext cx="760286" cy="369332"/>
+          </a:xfrm>
+          <a:prstGeom prst="rect">
+            <a:avLst/>
+          </a:prstGeom>
+          <a:noFill/>
+        </p:spPr>
+        <p:txBody>
+          <a:bodyPr wrap="square" rtlCol="0">
+            <a:spAutoFit/>
+          </a:bodyPr>
+          <a:lstStyle/>
+          <a:p>
+            <a:r>
+              <a:rPr lang="en-CA" b="1" dirty="0" smtClean="0"/>
+              <a:t>HEAD</a:t>
+            </a:r>
+            <a:endParaRPr lang="en-CA" b="1" dirty="0"/>
+          </a:p>
+        </p:txBody>
+      </p:sp>
+    </p:spTree>
+    <p:extLst>
+      <p:ext uri="{BB962C8B-B14F-4D97-AF65-F5344CB8AC3E}">
+        <p14:creationId xmlns:p14="http://schemas.microsoft.com/office/powerpoint/2010/main" val="1623644418"/>
+      </p:ext>
+    </p:extLst>
+  </p:cSld>
+  <p:clrMapOvr>
+    <a:masterClrMapping/>
+  </p:clrMapOvr>
+  <p:timing>
+    <p:tnLst>
+      <p:par>
+        <p:cTn id="1" dur="indefinite" restart="never" nodeType="tmRoot"/>
+      </p:par>
+    </p:tnLst>
+  </p:timing>
+</p:sld>
+</file>
+
 <file path=ppt/theme/theme1.xml><?xml version="1.0" encoding="utf-8"?>
 <a:theme xmlns:a="http://schemas.openxmlformats.org/drawingml/2006/main" name="Office Theme">
   <a:themeElements>

</xml_diff>

<commit_message>
Final changes to Intro to Git
The presentation will never be done, but it's at least presentable
now.  Small corrections to git_hooks and outline.org as well.
</commit_message>
<xml_diff>
--- a/PresentationFigures.pptx
+++ b/PresentationFigures.pptx
@@ -11,8 +11,14 @@
     <p:sldId id="259" r:id="rId5"/>
     <p:sldId id="261" r:id="rId6"/>
     <p:sldId id="260" r:id="rId7"/>
-    <p:sldId id="262" r:id="rId8"/>
-    <p:sldId id="263" r:id="rId9"/>
+    <p:sldId id="263" r:id="rId8"/>
+    <p:sldId id="264" r:id="rId9"/>
+    <p:sldId id="267" r:id="rId10"/>
+    <p:sldId id="265" r:id="rId11"/>
+    <p:sldId id="266" r:id="rId12"/>
+    <p:sldId id="268" r:id="rId13"/>
+    <p:sldId id="269" r:id="rId14"/>
+    <p:sldId id="262" r:id="rId15"/>
   </p:sldIdLst>
   <p:sldSz cx="9144000" cy="6858000" type="screen4x3"/>
   <p:notesSz cx="6858000" cy="9144000"/>
@@ -4436,6 +4442,2896 @@
 </p:sld>
 </file>
 
+<file path=ppt/slides/slide10.xml><?xml version="1.0" encoding="utf-8"?>
+<p:sld xmlns:a="http://schemas.openxmlformats.org/drawingml/2006/main" xmlns:r="http://schemas.openxmlformats.org/officeDocument/2006/relationships" xmlns:p="http://schemas.openxmlformats.org/presentationml/2006/main">
+  <p:cSld>
+    <p:spTree>
+      <p:nvGrpSpPr>
+        <p:cNvPr id="1" name=""/>
+        <p:cNvGrpSpPr/>
+        <p:nvPr/>
+      </p:nvGrpSpPr>
+      <p:grpSpPr>
+        <a:xfrm>
+          <a:off x="0" y="0"/>
+          <a:ext cx="0" cy="0"/>
+          <a:chOff x="0" y="0"/>
+          <a:chExt cx="0" cy="0"/>
+        </a:xfrm>
+      </p:grpSpPr>
+      <p:sp>
+        <p:nvSpPr>
+          <p:cNvPr id="4" name="Rounded Rectangle 3"/>
+          <p:cNvSpPr/>
+          <p:nvPr/>
+        </p:nvSpPr>
+        <p:spPr>
+          <a:xfrm>
+            <a:off x="323528" y="3158970"/>
+            <a:ext cx="1152128" cy="828092"/>
+          </a:xfrm>
+          <a:prstGeom prst="roundRect">
+            <a:avLst/>
+          </a:prstGeom>
+          <a:solidFill>
+            <a:schemeClr val="accent1">
+              <a:lumMod val="40000"/>
+              <a:lumOff val="60000"/>
+            </a:schemeClr>
+          </a:solidFill>
+        </p:spPr>
+        <p:style>
+          <a:lnRef idx="2">
+            <a:schemeClr val="accent1">
+              <a:shade val="50000"/>
+            </a:schemeClr>
+          </a:lnRef>
+          <a:fillRef idx="1">
+            <a:schemeClr val="accent1"/>
+          </a:fillRef>
+          <a:effectRef idx="0">
+            <a:schemeClr val="accent1"/>
+          </a:effectRef>
+          <a:fontRef idx="minor">
+            <a:schemeClr val="lt1"/>
+          </a:fontRef>
+        </p:style>
+        <p:txBody>
+          <a:bodyPr rtlCol="0" anchor="ctr"/>
+          <a:lstStyle/>
+          <a:p>
+            <a:pPr algn="ctr"/>
+            <a:r>
+              <a:rPr lang="en-CA" sz="1400" b="1" dirty="0" smtClean="0">
+                <a:solidFill>
+                  <a:schemeClr val="tx1"/>
+                </a:solidFill>
+                <a:latin typeface="Courier New" panose="02070309020205020404" pitchFamily="49" charset="0"/>
+                <a:cs typeface="Courier New" panose="02070309020205020404" pitchFamily="49" charset="0"/>
+              </a:rPr>
+              <a:t>2eabdd2</a:t>
+            </a:r>
+            <a:endParaRPr lang="en-CA" sz="1400" b="1" dirty="0">
+              <a:solidFill>
+                <a:schemeClr val="tx1"/>
+              </a:solidFill>
+              <a:latin typeface="Courier New" panose="02070309020205020404" pitchFamily="49" charset="0"/>
+              <a:cs typeface="Courier New" panose="02070309020205020404" pitchFamily="49" charset="0"/>
+            </a:endParaRPr>
+          </a:p>
+        </p:txBody>
+      </p:sp>
+      <p:sp>
+        <p:nvSpPr>
+          <p:cNvPr id="5" name="Rounded Rectangle 4"/>
+          <p:cNvSpPr/>
+          <p:nvPr/>
+        </p:nvSpPr>
+        <p:spPr>
+          <a:xfrm>
+            <a:off x="2231740" y="3158970"/>
+            <a:ext cx="1152128" cy="828092"/>
+          </a:xfrm>
+          <a:prstGeom prst="roundRect">
+            <a:avLst/>
+          </a:prstGeom>
+          <a:solidFill>
+            <a:schemeClr val="accent1">
+              <a:lumMod val="40000"/>
+              <a:lumOff val="60000"/>
+            </a:schemeClr>
+          </a:solidFill>
+        </p:spPr>
+        <p:style>
+          <a:lnRef idx="2">
+            <a:schemeClr val="accent1">
+              <a:shade val="50000"/>
+            </a:schemeClr>
+          </a:lnRef>
+          <a:fillRef idx="1">
+            <a:schemeClr val="accent1"/>
+          </a:fillRef>
+          <a:effectRef idx="0">
+            <a:schemeClr val="accent1"/>
+          </a:effectRef>
+          <a:fontRef idx="minor">
+            <a:schemeClr val="lt1"/>
+          </a:fontRef>
+        </p:style>
+        <p:txBody>
+          <a:bodyPr rtlCol="0" anchor="ctr"/>
+          <a:lstStyle/>
+          <a:p>
+            <a:pPr algn="ctr"/>
+            <a:r>
+              <a:rPr lang="en-CA" sz="1400" b="1" dirty="0" smtClean="0">
+                <a:solidFill>
+                  <a:schemeClr val="tx1"/>
+                </a:solidFill>
+                <a:latin typeface="Courier New" panose="02070309020205020404" pitchFamily="49" charset="0"/>
+                <a:cs typeface="Courier New" panose="02070309020205020404" pitchFamily="49" charset="0"/>
+              </a:rPr>
+              <a:t>fef4257</a:t>
+            </a:r>
+            <a:endParaRPr lang="en-CA" sz="1400" b="1" dirty="0">
+              <a:solidFill>
+                <a:schemeClr val="tx1"/>
+              </a:solidFill>
+              <a:latin typeface="Courier New" panose="02070309020205020404" pitchFamily="49" charset="0"/>
+              <a:cs typeface="Courier New" panose="02070309020205020404" pitchFamily="49" charset="0"/>
+            </a:endParaRPr>
+          </a:p>
+        </p:txBody>
+      </p:sp>
+      <p:sp>
+        <p:nvSpPr>
+          <p:cNvPr id="6" name="Rounded Rectangle 5"/>
+          <p:cNvSpPr/>
+          <p:nvPr/>
+        </p:nvSpPr>
+        <p:spPr>
+          <a:xfrm>
+            <a:off x="4139952" y="3158970"/>
+            <a:ext cx="1152128" cy="828092"/>
+          </a:xfrm>
+          <a:prstGeom prst="roundRect">
+            <a:avLst/>
+          </a:prstGeom>
+          <a:solidFill>
+            <a:schemeClr val="accent1">
+              <a:lumMod val="40000"/>
+              <a:lumOff val="60000"/>
+            </a:schemeClr>
+          </a:solidFill>
+        </p:spPr>
+        <p:style>
+          <a:lnRef idx="2">
+            <a:schemeClr val="accent1">
+              <a:shade val="50000"/>
+            </a:schemeClr>
+          </a:lnRef>
+          <a:fillRef idx="1">
+            <a:schemeClr val="accent1"/>
+          </a:fillRef>
+          <a:effectRef idx="0">
+            <a:schemeClr val="accent1"/>
+          </a:effectRef>
+          <a:fontRef idx="minor">
+            <a:schemeClr val="lt1"/>
+          </a:fontRef>
+        </p:style>
+        <p:txBody>
+          <a:bodyPr rtlCol="0" anchor="ctr"/>
+          <a:lstStyle/>
+          <a:p>
+            <a:pPr algn="ctr"/>
+            <a:r>
+              <a:rPr lang="en-CA" sz="1400" b="1" dirty="0" smtClean="0">
+                <a:solidFill>
+                  <a:schemeClr val="tx1"/>
+                </a:solidFill>
+                <a:latin typeface="Courier New" panose="02070309020205020404" pitchFamily="49" charset="0"/>
+                <a:cs typeface="Courier New" panose="02070309020205020404" pitchFamily="49" charset="0"/>
+              </a:rPr>
+              <a:t>d448487</a:t>
+            </a:r>
+            <a:endParaRPr lang="en-CA" sz="1400" b="1" dirty="0">
+              <a:solidFill>
+                <a:schemeClr val="tx1"/>
+              </a:solidFill>
+              <a:latin typeface="Courier New" panose="02070309020205020404" pitchFamily="49" charset="0"/>
+              <a:cs typeface="Courier New" panose="02070309020205020404" pitchFamily="49" charset="0"/>
+            </a:endParaRPr>
+          </a:p>
+        </p:txBody>
+      </p:sp>
+      <p:sp>
+        <p:nvSpPr>
+          <p:cNvPr id="11" name="Right Arrow 10"/>
+          <p:cNvSpPr/>
+          <p:nvPr/>
+        </p:nvSpPr>
+        <p:spPr>
+          <a:xfrm>
+            <a:off x="1619672" y="3429000"/>
+            <a:ext cx="504056" cy="216024"/>
+          </a:xfrm>
+          <a:prstGeom prst="rightArrow">
+            <a:avLst/>
+          </a:prstGeom>
+        </p:spPr>
+        <p:style>
+          <a:lnRef idx="2">
+            <a:schemeClr val="accent1">
+              <a:shade val="50000"/>
+            </a:schemeClr>
+          </a:lnRef>
+          <a:fillRef idx="1">
+            <a:schemeClr val="accent1"/>
+          </a:fillRef>
+          <a:effectRef idx="0">
+            <a:schemeClr val="accent1"/>
+          </a:effectRef>
+          <a:fontRef idx="minor">
+            <a:schemeClr val="lt1"/>
+          </a:fontRef>
+        </p:style>
+        <p:txBody>
+          <a:bodyPr rtlCol="0" anchor="ctr"/>
+          <a:lstStyle/>
+          <a:p>
+            <a:pPr algn="ctr"/>
+            <a:endParaRPr lang="en-CA"/>
+          </a:p>
+        </p:txBody>
+      </p:sp>
+      <p:sp>
+        <p:nvSpPr>
+          <p:cNvPr id="12" name="Right Arrow 11"/>
+          <p:cNvSpPr/>
+          <p:nvPr/>
+        </p:nvSpPr>
+        <p:spPr>
+          <a:xfrm>
+            <a:off x="3491880" y="3429000"/>
+            <a:ext cx="504056" cy="216024"/>
+          </a:xfrm>
+          <a:prstGeom prst="rightArrow">
+            <a:avLst/>
+          </a:prstGeom>
+        </p:spPr>
+        <p:style>
+          <a:lnRef idx="2">
+            <a:schemeClr val="accent1">
+              <a:shade val="50000"/>
+            </a:schemeClr>
+          </a:lnRef>
+          <a:fillRef idx="1">
+            <a:schemeClr val="accent1"/>
+          </a:fillRef>
+          <a:effectRef idx="0">
+            <a:schemeClr val="accent1"/>
+          </a:effectRef>
+          <a:fontRef idx="minor">
+            <a:schemeClr val="lt1"/>
+          </a:fontRef>
+        </p:style>
+        <p:txBody>
+          <a:bodyPr rtlCol="0" anchor="ctr"/>
+          <a:lstStyle/>
+          <a:p>
+            <a:pPr algn="ctr"/>
+            <a:endParaRPr lang="en-CA"/>
+          </a:p>
+        </p:txBody>
+      </p:sp>
+      <p:sp>
+        <p:nvSpPr>
+          <p:cNvPr id="21" name="TextBox 20"/>
+          <p:cNvSpPr txBox="1"/>
+          <p:nvPr/>
+        </p:nvSpPr>
+        <p:spPr>
+          <a:xfrm>
+            <a:off x="2427661" y="4149080"/>
+            <a:ext cx="760286" cy="369332"/>
+          </a:xfrm>
+          <a:prstGeom prst="rect">
+            <a:avLst/>
+          </a:prstGeom>
+          <a:noFill/>
+        </p:spPr>
+        <p:txBody>
+          <a:bodyPr wrap="square" rtlCol="0">
+            <a:spAutoFit/>
+          </a:bodyPr>
+          <a:lstStyle/>
+          <a:p>
+            <a:r>
+              <a:rPr lang="en-CA" b="1" dirty="0" smtClean="0"/>
+              <a:t>HEAD</a:t>
+            </a:r>
+            <a:endParaRPr lang="en-CA" b="1" dirty="0"/>
+          </a:p>
+        </p:txBody>
+      </p:sp>
+    </p:spTree>
+    <p:extLst>
+      <p:ext uri="{BB962C8B-B14F-4D97-AF65-F5344CB8AC3E}">
+        <p14:creationId xmlns:p14="http://schemas.microsoft.com/office/powerpoint/2010/main" val="1834010701"/>
+      </p:ext>
+    </p:extLst>
+  </p:cSld>
+  <p:clrMapOvr>
+    <a:masterClrMapping/>
+  </p:clrMapOvr>
+  <p:timing>
+    <p:tnLst>
+      <p:par>
+        <p:cTn id="1" dur="indefinite" restart="never" nodeType="tmRoot"/>
+      </p:par>
+    </p:tnLst>
+  </p:timing>
+</p:sld>
+</file>
+
+<file path=ppt/slides/slide11.xml><?xml version="1.0" encoding="utf-8"?>
+<p:sld xmlns:a="http://schemas.openxmlformats.org/drawingml/2006/main" xmlns:r="http://schemas.openxmlformats.org/officeDocument/2006/relationships" xmlns:p="http://schemas.openxmlformats.org/presentationml/2006/main">
+  <p:cSld>
+    <p:spTree>
+      <p:nvGrpSpPr>
+        <p:cNvPr id="1" name=""/>
+        <p:cNvGrpSpPr/>
+        <p:nvPr/>
+      </p:nvGrpSpPr>
+      <p:grpSpPr>
+        <a:xfrm>
+          <a:off x="0" y="0"/>
+          <a:ext cx="0" cy="0"/>
+          <a:chOff x="0" y="0"/>
+          <a:chExt cx="0" cy="0"/>
+        </a:xfrm>
+      </p:grpSpPr>
+      <p:sp>
+        <p:nvSpPr>
+          <p:cNvPr id="4" name="Rounded Rectangle 3"/>
+          <p:cNvSpPr/>
+          <p:nvPr/>
+        </p:nvSpPr>
+        <p:spPr>
+          <a:xfrm>
+            <a:off x="323528" y="3158970"/>
+            <a:ext cx="1152128" cy="828092"/>
+          </a:xfrm>
+          <a:prstGeom prst="roundRect">
+            <a:avLst/>
+          </a:prstGeom>
+          <a:solidFill>
+            <a:schemeClr val="accent1">
+              <a:lumMod val="40000"/>
+              <a:lumOff val="60000"/>
+            </a:schemeClr>
+          </a:solidFill>
+        </p:spPr>
+        <p:style>
+          <a:lnRef idx="2">
+            <a:schemeClr val="accent1">
+              <a:shade val="50000"/>
+            </a:schemeClr>
+          </a:lnRef>
+          <a:fillRef idx="1">
+            <a:schemeClr val="accent1"/>
+          </a:fillRef>
+          <a:effectRef idx="0">
+            <a:schemeClr val="accent1"/>
+          </a:effectRef>
+          <a:fontRef idx="minor">
+            <a:schemeClr val="lt1"/>
+          </a:fontRef>
+        </p:style>
+        <p:txBody>
+          <a:bodyPr rtlCol="0" anchor="ctr"/>
+          <a:lstStyle/>
+          <a:p>
+            <a:pPr algn="ctr"/>
+            <a:r>
+              <a:rPr lang="en-CA" sz="1400" b="1" dirty="0" smtClean="0">
+                <a:solidFill>
+                  <a:schemeClr val="tx1"/>
+                </a:solidFill>
+                <a:latin typeface="Courier New" panose="02070309020205020404" pitchFamily="49" charset="0"/>
+                <a:cs typeface="Courier New" panose="02070309020205020404" pitchFamily="49" charset="0"/>
+              </a:rPr>
+              <a:t>2eabdd2</a:t>
+            </a:r>
+            <a:endParaRPr lang="en-CA" sz="1400" b="1" dirty="0">
+              <a:solidFill>
+                <a:schemeClr val="tx1"/>
+              </a:solidFill>
+              <a:latin typeface="Courier New" panose="02070309020205020404" pitchFamily="49" charset="0"/>
+              <a:cs typeface="Courier New" panose="02070309020205020404" pitchFamily="49" charset="0"/>
+            </a:endParaRPr>
+          </a:p>
+        </p:txBody>
+      </p:sp>
+      <p:sp>
+        <p:nvSpPr>
+          <p:cNvPr id="5" name="Rounded Rectangle 4"/>
+          <p:cNvSpPr/>
+          <p:nvPr/>
+        </p:nvSpPr>
+        <p:spPr>
+          <a:xfrm>
+            <a:off x="2231740" y="3158970"/>
+            <a:ext cx="1152128" cy="828092"/>
+          </a:xfrm>
+          <a:prstGeom prst="roundRect">
+            <a:avLst/>
+          </a:prstGeom>
+          <a:solidFill>
+            <a:schemeClr val="accent1">
+              <a:lumMod val="40000"/>
+              <a:lumOff val="60000"/>
+            </a:schemeClr>
+          </a:solidFill>
+        </p:spPr>
+        <p:style>
+          <a:lnRef idx="2">
+            <a:schemeClr val="accent1">
+              <a:shade val="50000"/>
+            </a:schemeClr>
+          </a:lnRef>
+          <a:fillRef idx="1">
+            <a:schemeClr val="accent1"/>
+          </a:fillRef>
+          <a:effectRef idx="0">
+            <a:schemeClr val="accent1"/>
+          </a:effectRef>
+          <a:fontRef idx="minor">
+            <a:schemeClr val="lt1"/>
+          </a:fontRef>
+        </p:style>
+        <p:txBody>
+          <a:bodyPr rtlCol="0" anchor="ctr"/>
+          <a:lstStyle/>
+          <a:p>
+            <a:pPr algn="ctr"/>
+            <a:r>
+              <a:rPr lang="en-CA" sz="1400" b="1" dirty="0" smtClean="0">
+                <a:solidFill>
+                  <a:schemeClr val="tx1"/>
+                </a:solidFill>
+                <a:latin typeface="Courier New" panose="02070309020205020404" pitchFamily="49" charset="0"/>
+                <a:cs typeface="Courier New" panose="02070309020205020404" pitchFamily="49" charset="0"/>
+              </a:rPr>
+              <a:t>fef4257</a:t>
+            </a:r>
+            <a:endParaRPr lang="en-CA" sz="1400" b="1" dirty="0">
+              <a:solidFill>
+                <a:schemeClr val="tx1"/>
+              </a:solidFill>
+              <a:latin typeface="Courier New" panose="02070309020205020404" pitchFamily="49" charset="0"/>
+              <a:cs typeface="Courier New" panose="02070309020205020404" pitchFamily="49" charset="0"/>
+            </a:endParaRPr>
+          </a:p>
+        </p:txBody>
+      </p:sp>
+      <p:sp>
+        <p:nvSpPr>
+          <p:cNvPr id="11" name="Right Arrow 10"/>
+          <p:cNvSpPr/>
+          <p:nvPr/>
+        </p:nvSpPr>
+        <p:spPr>
+          <a:xfrm>
+            <a:off x="1619672" y="3429000"/>
+            <a:ext cx="504056" cy="216024"/>
+          </a:xfrm>
+          <a:prstGeom prst="rightArrow">
+            <a:avLst/>
+          </a:prstGeom>
+        </p:spPr>
+        <p:style>
+          <a:lnRef idx="2">
+            <a:schemeClr val="accent1">
+              <a:shade val="50000"/>
+            </a:schemeClr>
+          </a:lnRef>
+          <a:fillRef idx="1">
+            <a:schemeClr val="accent1"/>
+          </a:fillRef>
+          <a:effectRef idx="0">
+            <a:schemeClr val="accent1"/>
+          </a:effectRef>
+          <a:fontRef idx="minor">
+            <a:schemeClr val="lt1"/>
+          </a:fontRef>
+        </p:style>
+        <p:txBody>
+          <a:bodyPr rtlCol="0" anchor="ctr"/>
+          <a:lstStyle/>
+          <a:p>
+            <a:pPr algn="ctr"/>
+            <a:endParaRPr lang="en-CA"/>
+          </a:p>
+        </p:txBody>
+      </p:sp>
+      <p:grpSp>
+        <p:nvGrpSpPr>
+          <p:cNvPr id="2" name="Group 1"/>
+          <p:cNvGrpSpPr/>
+          <p:nvPr/>
+        </p:nvGrpSpPr>
+        <p:grpSpPr>
+          <a:xfrm>
+            <a:off x="2699792" y="1808820"/>
+            <a:ext cx="2592288" cy="2178242"/>
+            <a:chOff x="2699792" y="1808820"/>
+            <a:chExt cx="2592288" cy="2178242"/>
+          </a:xfrm>
+        </p:grpSpPr>
+        <p:sp>
+          <p:nvSpPr>
+            <p:cNvPr id="6" name="Rounded Rectangle 5"/>
+            <p:cNvSpPr/>
+            <p:nvPr/>
+          </p:nvSpPr>
+          <p:spPr>
+            <a:xfrm>
+              <a:off x="4139952" y="3158970"/>
+              <a:ext cx="1152128" cy="828092"/>
+            </a:xfrm>
+            <a:prstGeom prst="roundRect">
+              <a:avLst/>
+            </a:prstGeom>
+            <a:solidFill>
+              <a:schemeClr val="accent1">
+                <a:lumMod val="40000"/>
+                <a:lumOff val="60000"/>
+              </a:schemeClr>
+            </a:solidFill>
+          </p:spPr>
+          <p:style>
+            <a:lnRef idx="2">
+              <a:schemeClr val="accent1">
+                <a:shade val="50000"/>
+              </a:schemeClr>
+            </a:lnRef>
+            <a:fillRef idx="1">
+              <a:schemeClr val="accent1"/>
+            </a:fillRef>
+            <a:effectRef idx="0">
+              <a:schemeClr val="accent1"/>
+            </a:effectRef>
+            <a:fontRef idx="minor">
+              <a:schemeClr val="lt1"/>
+            </a:fontRef>
+          </p:style>
+          <p:txBody>
+            <a:bodyPr rtlCol="0" anchor="ctr"/>
+            <a:lstStyle/>
+            <a:p>
+              <a:pPr algn="ctr"/>
+              <a:r>
+                <a:rPr lang="en-CA" sz="1400" b="1" dirty="0" smtClean="0">
+                  <a:solidFill>
+                    <a:schemeClr val="tx1"/>
+                  </a:solidFill>
+                  <a:latin typeface="Courier New" panose="02070309020205020404" pitchFamily="49" charset="0"/>
+                  <a:cs typeface="Courier New" panose="02070309020205020404" pitchFamily="49" charset="0"/>
+                </a:rPr>
+                <a:t>d448487</a:t>
+              </a:r>
+              <a:endParaRPr lang="en-CA" sz="1400" b="1" dirty="0">
+                <a:solidFill>
+                  <a:schemeClr val="tx1"/>
+                </a:solidFill>
+                <a:latin typeface="Courier New" panose="02070309020205020404" pitchFamily="49" charset="0"/>
+                <a:cs typeface="Courier New" panose="02070309020205020404" pitchFamily="49" charset="0"/>
+              </a:endParaRPr>
+            </a:p>
+          </p:txBody>
+        </p:sp>
+        <p:sp>
+          <p:nvSpPr>
+            <p:cNvPr id="8" name="Rounded Rectangle 7"/>
+            <p:cNvSpPr/>
+            <p:nvPr/>
+          </p:nvSpPr>
+          <p:spPr>
+            <a:xfrm>
+              <a:off x="4139952" y="1808820"/>
+              <a:ext cx="1152128" cy="828092"/>
+            </a:xfrm>
+            <a:prstGeom prst="roundRect">
+              <a:avLst/>
+            </a:prstGeom>
+            <a:solidFill>
+              <a:schemeClr val="accent1">
+                <a:lumMod val="40000"/>
+                <a:lumOff val="60000"/>
+              </a:schemeClr>
+            </a:solidFill>
+          </p:spPr>
+          <p:style>
+            <a:lnRef idx="2">
+              <a:schemeClr val="accent1">
+                <a:shade val="50000"/>
+              </a:schemeClr>
+            </a:lnRef>
+            <a:fillRef idx="1">
+              <a:schemeClr val="accent1"/>
+            </a:fillRef>
+            <a:effectRef idx="0">
+              <a:schemeClr val="accent1"/>
+            </a:effectRef>
+            <a:fontRef idx="minor">
+              <a:schemeClr val="lt1"/>
+            </a:fontRef>
+          </p:style>
+          <p:txBody>
+            <a:bodyPr rtlCol="0" anchor="ctr"/>
+            <a:lstStyle/>
+            <a:p>
+              <a:pPr algn="ctr"/>
+              <a:r>
+                <a:rPr lang="en-CA" sz="1400" b="1" dirty="0" smtClean="0">
+                  <a:solidFill>
+                    <a:schemeClr val="tx1"/>
+                  </a:solidFill>
+                  <a:latin typeface="Courier New" panose="02070309020205020404" pitchFamily="49" charset="0"/>
+                  <a:cs typeface="Courier New" panose="02070309020205020404" pitchFamily="49" charset="0"/>
+                </a:rPr>
+                <a:t>a5c64ca</a:t>
+              </a:r>
+              <a:endParaRPr lang="en-CA" sz="1400" b="1" dirty="0">
+                <a:solidFill>
+                  <a:schemeClr val="tx1"/>
+                </a:solidFill>
+                <a:latin typeface="Courier New" panose="02070309020205020404" pitchFamily="49" charset="0"/>
+                <a:cs typeface="Courier New" panose="02070309020205020404" pitchFamily="49" charset="0"/>
+              </a:endParaRPr>
+            </a:p>
+          </p:txBody>
+        </p:sp>
+        <p:sp>
+          <p:nvSpPr>
+            <p:cNvPr id="12" name="Right Arrow 11"/>
+            <p:cNvSpPr/>
+            <p:nvPr/>
+          </p:nvSpPr>
+          <p:spPr>
+            <a:xfrm>
+              <a:off x="3491880" y="3429000"/>
+              <a:ext cx="504056" cy="216024"/>
+            </a:xfrm>
+            <a:prstGeom prst="rightArrow">
+              <a:avLst/>
+            </a:prstGeom>
+          </p:spPr>
+          <p:style>
+            <a:lnRef idx="2">
+              <a:schemeClr val="accent1">
+                <a:shade val="50000"/>
+              </a:schemeClr>
+            </a:lnRef>
+            <a:fillRef idx="1">
+              <a:schemeClr val="accent1"/>
+            </a:fillRef>
+            <a:effectRef idx="0">
+              <a:schemeClr val="accent1"/>
+            </a:effectRef>
+            <a:fontRef idx="minor">
+              <a:schemeClr val="lt1"/>
+            </a:fontRef>
+          </p:style>
+          <p:txBody>
+            <a:bodyPr rtlCol="0" anchor="ctr"/>
+            <a:lstStyle/>
+            <a:p>
+              <a:pPr algn="ctr"/>
+              <a:endParaRPr lang="en-CA"/>
+            </a:p>
+          </p:txBody>
+        </p:sp>
+        <p:sp>
+          <p:nvSpPr>
+            <p:cNvPr id="16" name="Right Arrow 15"/>
+            <p:cNvSpPr/>
+            <p:nvPr/>
+          </p:nvSpPr>
+          <p:spPr>
+            <a:xfrm rot="19044843">
+              <a:off x="3413249" y="2638868"/>
+              <a:ext cx="504056" cy="216024"/>
+            </a:xfrm>
+            <a:prstGeom prst="rightArrow">
+              <a:avLst/>
+            </a:prstGeom>
+          </p:spPr>
+          <p:style>
+            <a:lnRef idx="2">
+              <a:schemeClr val="accent1">
+                <a:shade val="50000"/>
+              </a:schemeClr>
+            </a:lnRef>
+            <a:fillRef idx="1">
+              <a:schemeClr val="accent1"/>
+            </a:fillRef>
+            <a:effectRef idx="0">
+              <a:schemeClr val="accent1"/>
+            </a:effectRef>
+            <a:fontRef idx="minor">
+              <a:schemeClr val="lt1"/>
+            </a:fontRef>
+          </p:style>
+          <p:txBody>
+            <a:bodyPr rtlCol="0" anchor="ctr"/>
+            <a:lstStyle/>
+            <a:p>
+              <a:pPr algn="ctr"/>
+              <a:endParaRPr lang="en-CA"/>
+            </a:p>
+          </p:txBody>
+        </p:sp>
+        <p:sp>
+          <p:nvSpPr>
+            <p:cNvPr id="19" name="TextBox 18"/>
+            <p:cNvSpPr txBox="1"/>
+            <p:nvPr/>
+          </p:nvSpPr>
+          <p:spPr>
+            <a:xfrm>
+              <a:off x="2699792" y="2204864"/>
+              <a:ext cx="1192334" cy="369332"/>
+            </a:xfrm>
+            <a:prstGeom prst="rect">
+              <a:avLst/>
+            </a:prstGeom>
+            <a:noFill/>
+          </p:spPr>
+          <p:txBody>
+            <a:bodyPr wrap="square" rtlCol="0">
+              <a:spAutoFit/>
+            </a:bodyPr>
+            <a:lstStyle/>
+            <a:p>
+              <a:r>
+                <a:rPr lang="en-CA" b="1" dirty="0" smtClean="0"/>
+                <a:t>branch</a:t>
+              </a:r>
+              <a:endParaRPr lang="en-CA" b="1" dirty="0"/>
+            </a:p>
+          </p:txBody>
+        </p:sp>
+      </p:grpSp>
+      <p:sp>
+        <p:nvSpPr>
+          <p:cNvPr id="20" name="TextBox 19"/>
+          <p:cNvSpPr txBox="1"/>
+          <p:nvPr/>
+        </p:nvSpPr>
+        <p:spPr>
+          <a:xfrm>
+            <a:off x="4387778" y="2636912"/>
+            <a:ext cx="760286" cy="369332"/>
+          </a:xfrm>
+          <a:prstGeom prst="rect">
+            <a:avLst/>
+          </a:prstGeom>
+          <a:noFill/>
+        </p:spPr>
+        <p:txBody>
+          <a:bodyPr wrap="square" rtlCol="0">
+            <a:spAutoFit/>
+          </a:bodyPr>
+          <a:lstStyle/>
+          <a:p>
+            <a:r>
+              <a:rPr lang="en-CA" b="1" dirty="0" smtClean="0"/>
+              <a:t>HEAD</a:t>
+            </a:r>
+            <a:endParaRPr lang="en-CA" b="1" dirty="0"/>
+          </a:p>
+        </p:txBody>
+      </p:sp>
+    </p:spTree>
+    <p:extLst>
+      <p:ext uri="{BB962C8B-B14F-4D97-AF65-F5344CB8AC3E}">
+        <p14:creationId xmlns:p14="http://schemas.microsoft.com/office/powerpoint/2010/main" val="697868524"/>
+      </p:ext>
+    </p:extLst>
+  </p:cSld>
+  <p:clrMapOvr>
+    <a:masterClrMapping/>
+  </p:clrMapOvr>
+  <p:timing>
+    <p:tnLst>
+      <p:par>
+        <p:cTn id="1" dur="indefinite" restart="never" nodeType="tmRoot"/>
+      </p:par>
+    </p:tnLst>
+  </p:timing>
+</p:sld>
+</file>
+
+<file path=ppt/slides/slide12.xml><?xml version="1.0" encoding="utf-8"?>
+<p:sld xmlns:a="http://schemas.openxmlformats.org/drawingml/2006/main" xmlns:r="http://schemas.openxmlformats.org/officeDocument/2006/relationships" xmlns:p="http://schemas.openxmlformats.org/presentationml/2006/main">
+  <p:cSld>
+    <p:spTree>
+      <p:nvGrpSpPr>
+        <p:cNvPr id="1" name=""/>
+        <p:cNvGrpSpPr/>
+        <p:nvPr/>
+      </p:nvGrpSpPr>
+      <p:grpSpPr>
+        <a:xfrm>
+          <a:off x="0" y="0"/>
+          <a:ext cx="0" cy="0"/>
+          <a:chOff x="0" y="0"/>
+          <a:chExt cx="0" cy="0"/>
+        </a:xfrm>
+      </p:grpSpPr>
+      <p:sp>
+        <p:nvSpPr>
+          <p:cNvPr id="4" name="Rounded Rectangle 3"/>
+          <p:cNvSpPr/>
+          <p:nvPr/>
+        </p:nvSpPr>
+        <p:spPr>
+          <a:xfrm>
+            <a:off x="323528" y="3158970"/>
+            <a:ext cx="1152128" cy="828092"/>
+          </a:xfrm>
+          <a:prstGeom prst="roundRect">
+            <a:avLst/>
+          </a:prstGeom>
+          <a:solidFill>
+            <a:schemeClr val="accent1">
+              <a:lumMod val="40000"/>
+              <a:lumOff val="60000"/>
+            </a:schemeClr>
+          </a:solidFill>
+        </p:spPr>
+        <p:style>
+          <a:lnRef idx="2">
+            <a:schemeClr val="accent1">
+              <a:shade val="50000"/>
+            </a:schemeClr>
+          </a:lnRef>
+          <a:fillRef idx="1">
+            <a:schemeClr val="accent1"/>
+          </a:fillRef>
+          <a:effectRef idx="0">
+            <a:schemeClr val="accent1"/>
+          </a:effectRef>
+          <a:fontRef idx="minor">
+            <a:schemeClr val="lt1"/>
+          </a:fontRef>
+        </p:style>
+        <p:txBody>
+          <a:bodyPr rtlCol="0" anchor="ctr"/>
+          <a:lstStyle/>
+          <a:p>
+            <a:pPr algn="ctr"/>
+            <a:r>
+              <a:rPr lang="en-CA" sz="1400" b="1" dirty="0" smtClean="0">
+                <a:solidFill>
+                  <a:schemeClr val="tx1"/>
+                </a:solidFill>
+                <a:latin typeface="Courier New" panose="02070309020205020404" pitchFamily="49" charset="0"/>
+                <a:cs typeface="Courier New" panose="02070309020205020404" pitchFamily="49" charset="0"/>
+              </a:rPr>
+              <a:t>2eabdd2</a:t>
+            </a:r>
+            <a:endParaRPr lang="en-CA" sz="1400" b="1" dirty="0">
+              <a:solidFill>
+                <a:schemeClr val="tx1"/>
+              </a:solidFill>
+              <a:latin typeface="Courier New" panose="02070309020205020404" pitchFamily="49" charset="0"/>
+              <a:cs typeface="Courier New" panose="02070309020205020404" pitchFamily="49" charset="0"/>
+            </a:endParaRPr>
+          </a:p>
+        </p:txBody>
+      </p:sp>
+      <p:sp>
+        <p:nvSpPr>
+          <p:cNvPr id="5" name="Rounded Rectangle 4"/>
+          <p:cNvSpPr/>
+          <p:nvPr/>
+        </p:nvSpPr>
+        <p:spPr>
+          <a:xfrm>
+            <a:off x="2231740" y="3158970"/>
+            <a:ext cx="1152128" cy="828092"/>
+          </a:xfrm>
+          <a:prstGeom prst="roundRect">
+            <a:avLst/>
+          </a:prstGeom>
+          <a:solidFill>
+            <a:schemeClr val="accent1">
+              <a:lumMod val="40000"/>
+              <a:lumOff val="60000"/>
+            </a:schemeClr>
+          </a:solidFill>
+        </p:spPr>
+        <p:style>
+          <a:lnRef idx="2">
+            <a:schemeClr val="accent1">
+              <a:shade val="50000"/>
+            </a:schemeClr>
+          </a:lnRef>
+          <a:fillRef idx="1">
+            <a:schemeClr val="accent1"/>
+          </a:fillRef>
+          <a:effectRef idx="0">
+            <a:schemeClr val="accent1"/>
+          </a:effectRef>
+          <a:fontRef idx="minor">
+            <a:schemeClr val="lt1"/>
+          </a:fontRef>
+        </p:style>
+        <p:txBody>
+          <a:bodyPr rtlCol="0" anchor="ctr"/>
+          <a:lstStyle/>
+          <a:p>
+            <a:pPr algn="ctr"/>
+            <a:r>
+              <a:rPr lang="en-CA" sz="1400" b="1" dirty="0" smtClean="0">
+                <a:solidFill>
+                  <a:schemeClr val="tx1"/>
+                </a:solidFill>
+                <a:latin typeface="Courier New" panose="02070309020205020404" pitchFamily="49" charset="0"/>
+                <a:cs typeface="Courier New" panose="02070309020205020404" pitchFamily="49" charset="0"/>
+              </a:rPr>
+              <a:t>fef4257</a:t>
+            </a:r>
+            <a:endParaRPr lang="en-CA" sz="1400" b="1" dirty="0">
+              <a:solidFill>
+                <a:schemeClr val="tx1"/>
+              </a:solidFill>
+              <a:latin typeface="Courier New" panose="02070309020205020404" pitchFamily="49" charset="0"/>
+              <a:cs typeface="Courier New" panose="02070309020205020404" pitchFamily="49" charset="0"/>
+            </a:endParaRPr>
+          </a:p>
+        </p:txBody>
+      </p:sp>
+      <p:sp>
+        <p:nvSpPr>
+          <p:cNvPr id="6" name="Rounded Rectangle 5"/>
+          <p:cNvSpPr/>
+          <p:nvPr/>
+        </p:nvSpPr>
+        <p:spPr>
+          <a:xfrm>
+            <a:off x="4139952" y="3158970"/>
+            <a:ext cx="1152128" cy="828092"/>
+          </a:xfrm>
+          <a:prstGeom prst="roundRect">
+            <a:avLst/>
+          </a:prstGeom>
+          <a:solidFill>
+            <a:schemeClr val="accent1">
+              <a:lumMod val="40000"/>
+              <a:lumOff val="60000"/>
+            </a:schemeClr>
+          </a:solidFill>
+        </p:spPr>
+        <p:style>
+          <a:lnRef idx="2">
+            <a:schemeClr val="accent1">
+              <a:shade val="50000"/>
+            </a:schemeClr>
+          </a:lnRef>
+          <a:fillRef idx="1">
+            <a:schemeClr val="accent1"/>
+          </a:fillRef>
+          <a:effectRef idx="0">
+            <a:schemeClr val="accent1"/>
+          </a:effectRef>
+          <a:fontRef idx="minor">
+            <a:schemeClr val="lt1"/>
+          </a:fontRef>
+        </p:style>
+        <p:txBody>
+          <a:bodyPr rtlCol="0" anchor="ctr"/>
+          <a:lstStyle/>
+          <a:p>
+            <a:pPr algn="ctr"/>
+            <a:r>
+              <a:rPr lang="en-CA" sz="1400" b="1" dirty="0" smtClean="0">
+                <a:solidFill>
+                  <a:schemeClr val="tx1"/>
+                </a:solidFill>
+                <a:latin typeface="Courier New" panose="02070309020205020404" pitchFamily="49" charset="0"/>
+                <a:cs typeface="Courier New" panose="02070309020205020404" pitchFamily="49" charset="0"/>
+              </a:rPr>
+              <a:t>d448487</a:t>
+            </a:r>
+            <a:endParaRPr lang="en-CA" sz="1400" b="1" dirty="0">
+              <a:solidFill>
+                <a:schemeClr val="tx1"/>
+              </a:solidFill>
+              <a:latin typeface="Courier New" panose="02070309020205020404" pitchFamily="49" charset="0"/>
+              <a:cs typeface="Courier New" panose="02070309020205020404" pitchFamily="49" charset="0"/>
+            </a:endParaRPr>
+          </a:p>
+        </p:txBody>
+      </p:sp>
+      <p:sp>
+        <p:nvSpPr>
+          <p:cNvPr id="8" name="Rounded Rectangle 7"/>
+          <p:cNvSpPr/>
+          <p:nvPr/>
+        </p:nvSpPr>
+        <p:spPr>
+          <a:xfrm>
+            <a:off x="4139952" y="1808820"/>
+            <a:ext cx="1152128" cy="828092"/>
+          </a:xfrm>
+          <a:prstGeom prst="roundRect">
+            <a:avLst/>
+          </a:prstGeom>
+          <a:solidFill>
+            <a:schemeClr val="accent1">
+              <a:lumMod val="40000"/>
+              <a:lumOff val="60000"/>
+            </a:schemeClr>
+          </a:solidFill>
+        </p:spPr>
+        <p:style>
+          <a:lnRef idx="2">
+            <a:schemeClr val="accent1">
+              <a:shade val="50000"/>
+            </a:schemeClr>
+          </a:lnRef>
+          <a:fillRef idx="1">
+            <a:schemeClr val="accent1"/>
+          </a:fillRef>
+          <a:effectRef idx="0">
+            <a:schemeClr val="accent1"/>
+          </a:effectRef>
+          <a:fontRef idx="minor">
+            <a:schemeClr val="lt1"/>
+          </a:fontRef>
+        </p:style>
+        <p:txBody>
+          <a:bodyPr rtlCol="0" anchor="ctr"/>
+          <a:lstStyle/>
+          <a:p>
+            <a:pPr algn="ctr"/>
+            <a:r>
+              <a:rPr lang="en-CA" sz="1400" b="1" dirty="0" smtClean="0">
+                <a:solidFill>
+                  <a:schemeClr val="tx1"/>
+                </a:solidFill>
+                <a:latin typeface="Courier New" panose="02070309020205020404" pitchFamily="49" charset="0"/>
+                <a:cs typeface="Courier New" panose="02070309020205020404" pitchFamily="49" charset="0"/>
+              </a:rPr>
+              <a:t>a5c64ca</a:t>
+            </a:r>
+            <a:endParaRPr lang="en-CA" sz="1400" b="1" dirty="0">
+              <a:solidFill>
+                <a:schemeClr val="tx1"/>
+              </a:solidFill>
+              <a:latin typeface="Courier New" panose="02070309020205020404" pitchFamily="49" charset="0"/>
+              <a:cs typeface="Courier New" panose="02070309020205020404" pitchFamily="49" charset="0"/>
+            </a:endParaRPr>
+          </a:p>
+        </p:txBody>
+      </p:sp>
+      <p:sp>
+        <p:nvSpPr>
+          <p:cNvPr id="9" name="Rounded Rectangle 8"/>
+          <p:cNvSpPr/>
+          <p:nvPr/>
+        </p:nvSpPr>
+        <p:spPr>
+          <a:xfrm>
+            <a:off x="6012160" y="1808820"/>
+            <a:ext cx="1152128" cy="828092"/>
+          </a:xfrm>
+          <a:prstGeom prst="roundRect">
+            <a:avLst/>
+          </a:prstGeom>
+          <a:solidFill>
+            <a:schemeClr val="accent1">
+              <a:lumMod val="40000"/>
+              <a:lumOff val="60000"/>
+            </a:schemeClr>
+          </a:solidFill>
+        </p:spPr>
+        <p:style>
+          <a:lnRef idx="2">
+            <a:schemeClr val="accent1">
+              <a:shade val="50000"/>
+            </a:schemeClr>
+          </a:lnRef>
+          <a:fillRef idx="1">
+            <a:schemeClr val="accent1"/>
+          </a:fillRef>
+          <a:effectRef idx="0">
+            <a:schemeClr val="accent1"/>
+          </a:effectRef>
+          <a:fontRef idx="minor">
+            <a:schemeClr val="lt1"/>
+          </a:fontRef>
+        </p:style>
+        <p:txBody>
+          <a:bodyPr rtlCol="0" anchor="ctr"/>
+          <a:lstStyle/>
+          <a:p>
+            <a:pPr algn="ctr"/>
+            <a:r>
+              <a:rPr lang="en-CA" sz="1400" b="1" dirty="0" smtClean="0">
+                <a:solidFill>
+                  <a:schemeClr val="tx1"/>
+                </a:solidFill>
+                <a:latin typeface="Courier New" panose="02070309020205020404" pitchFamily="49" charset="0"/>
+                <a:cs typeface="Courier New" panose="02070309020205020404" pitchFamily="49" charset="0"/>
+              </a:rPr>
+              <a:t>fb0e936</a:t>
+            </a:r>
+            <a:endParaRPr lang="en-CA" sz="1400" b="1" dirty="0">
+              <a:solidFill>
+                <a:schemeClr val="tx1"/>
+              </a:solidFill>
+              <a:latin typeface="Courier New" panose="02070309020205020404" pitchFamily="49" charset="0"/>
+              <a:cs typeface="Courier New" panose="02070309020205020404" pitchFamily="49" charset="0"/>
+            </a:endParaRPr>
+          </a:p>
+        </p:txBody>
+      </p:sp>
+      <p:sp>
+        <p:nvSpPr>
+          <p:cNvPr id="11" name="Right Arrow 10"/>
+          <p:cNvSpPr/>
+          <p:nvPr/>
+        </p:nvSpPr>
+        <p:spPr>
+          <a:xfrm>
+            <a:off x="1619672" y="3429000"/>
+            <a:ext cx="504056" cy="216024"/>
+          </a:xfrm>
+          <a:prstGeom prst="rightArrow">
+            <a:avLst/>
+          </a:prstGeom>
+        </p:spPr>
+        <p:style>
+          <a:lnRef idx="2">
+            <a:schemeClr val="accent1">
+              <a:shade val="50000"/>
+            </a:schemeClr>
+          </a:lnRef>
+          <a:fillRef idx="1">
+            <a:schemeClr val="accent1"/>
+          </a:fillRef>
+          <a:effectRef idx="0">
+            <a:schemeClr val="accent1"/>
+          </a:effectRef>
+          <a:fontRef idx="minor">
+            <a:schemeClr val="lt1"/>
+          </a:fontRef>
+        </p:style>
+        <p:txBody>
+          <a:bodyPr rtlCol="0" anchor="ctr"/>
+          <a:lstStyle/>
+          <a:p>
+            <a:pPr algn="ctr"/>
+            <a:endParaRPr lang="en-CA"/>
+          </a:p>
+        </p:txBody>
+      </p:sp>
+      <p:sp>
+        <p:nvSpPr>
+          <p:cNvPr id="12" name="Right Arrow 11"/>
+          <p:cNvSpPr/>
+          <p:nvPr/>
+        </p:nvSpPr>
+        <p:spPr>
+          <a:xfrm>
+            <a:off x="3491880" y="3429000"/>
+            <a:ext cx="504056" cy="216024"/>
+          </a:xfrm>
+          <a:prstGeom prst="rightArrow">
+            <a:avLst/>
+          </a:prstGeom>
+        </p:spPr>
+        <p:style>
+          <a:lnRef idx="2">
+            <a:schemeClr val="accent1">
+              <a:shade val="50000"/>
+            </a:schemeClr>
+          </a:lnRef>
+          <a:fillRef idx="1">
+            <a:schemeClr val="accent1"/>
+          </a:fillRef>
+          <a:effectRef idx="0">
+            <a:schemeClr val="accent1"/>
+          </a:effectRef>
+          <a:fontRef idx="minor">
+            <a:schemeClr val="lt1"/>
+          </a:fontRef>
+        </p:style>
+        <p:txBody>
+          <a:bodyPr rtlCol="0" anchor="ctr"/>
+          <a:lstStyle/>
+          <a:p>
+            <a:pPr algn="ctr"/>
+            <a:endParaRPr lang="en-CA"/>
+          </a:p>
+        </p:txBody>
+      </p:sp>
+      <p:sp>
+        <p:nvSpPr>
+          <p:cNvPr id="15" name="Right Arrow 14"/>
+          <p:cNvSpPr/>
+          <p:nvPr/>
+        </p:nvSpPr>
+        <p:spPr>
+          <a:xfrm>
+            <a:off x="5436096" y="2168860"/>
+            <a:ext cx="504056" cy="216024"/>
+          </a:xfrm>
+          <a:prstGeom prst="rightArrow">
+            <a:avLst/>
+          </a:prstGeom>
+        </p:spPr>
+        <p:style>
+          <a:lnRef idx="2">
+            <a:schemeClr val="accent1">
+              <a:shade val="50000"/>
+            </a:schemeClr>
+          </a:lnRef>
+          <a:fillRef idx="1">
+            <a:schemeClr val="accent1"/>
+          </a:fillRef>
+          <a:effectRef idx="0">
+            <a:schemeClr val="accent1"/>
+          </a:effectRef>
+          <a:fontRef idx="minor">
+            <a:schemeClr val="lt1"/>
+          </a:fontRef>
+        </p:style>
+        <p:txBody>
+          <a:bodyPr rtlCol="0" anchor="ctr"/>
+          <a:lstStyle/>
+          <a:p>
+            <a:pPr algn="ctr"/>
+            <a:endParaRPr lang="en-CA"/>
+          </a:p>
+        </p:txBody>
+      </p:sp>
+      <p:sp>
+        <p:nvSpPr>
+          <p:cNvPr id="16" name="Right Arrow 15"/>
+          <p:cNvSpPr/>
+          <p:nvPr/>
+        </p:nvSpPr>
+        <p:spPr>
+          <a:xfrm rot="19044843">
+            <a:off x="3413249" y="2638868"/>
+            <a:ext cx="504056" cy="216024"/>
+          </a:xfrm>
+          <a:prstGeom prst="rightArrow">
+            <a:avLst/>
+          </a:prstGeom>
+        </p:spPr>
+        <p:style>
+          <a:lnRef idx="2">
+            <a:schemeClr val="accent1">
+              <a:shade val="50000"/>
+            </a:schemeClr>
+          </a:lnRef>
+          <a:fillRef idx="1">
+            <a:schemeClr val="accent1"/>
+          </a:fillRef>
+          <a:effectRef idx="0">
+            <a:schemeClr val="accent1"/>
+          </a:effectRef>
+          <a:fontRef idx="minor">
+            <a:schemeClr val="lt1"/>
+          </a:fontRef>
+        </p:style>
+        <p:txBody>
+          <a:bodyPr rtlCol="0" anchor="ctr"/>
+          <a:lstStyle/>
+          <a:p>
+            <a:pPr algn="ctr"/>
+            <a:endParaRPr lang="en-CA"/>
+          </a:p>
+        </p:txBody>
+      </p:sp>
+      <p:sp>
+        <p:nvSpPr>
+          <p:cNvPr id="19" name="TextBox 18"/>
+          <p:cNvSpPr txBox="1"/>
+          <p:nvPr/>
+        </p:nvSpPr>
+        <p:spPr>
+          <a:xfrm>
+            <a:off x="2699792" y="2204864"/>
+            <a:ext cx="1192334" cy="369332"/>
+          </a:xfrm>
+          <a:prstGeom prst="rect">
+            <a:avLst/>
+          </a:prstGeom>
+          <a:noFill/>
+        </p:spPr>
+        <p:txBody>
+          <a:bodyPr wrap="square" rtlCol="0">
+            <a:spAutoFit/>
+          </a:bodyPr>
+          <a:lstStyle/>
+          <a:p>
+            <a:r>
+              <a:rPr lang="en-CA" b="1" dirty="0" smtClean="0"/>
+              <a:t>branch</a:t>
+            </a:r>
+            <a:endParaRPr lang="en-CA" b="1" dirty="0"/>
+          </a:p>
+        </p:txBody>
+      </p:sp>
+      <p:sp>
+        <p:nvSpPr>
+          <p:cNvPr id="21" name="TextBox 20"/>
+          <p:cNvSpPr txBox="1"/>
+          <p:nvPr/>
+        </p:nvSpPr>
+        <p:spPr>
+          <a:xfrm>
+            <a:off x="6238042" y="2636912"/>
+            <a:ext cx="760286" cy="369332"/>
+          </a:xfrm>
+          <a:prstGeom prst="rect">
+            <a:avLst/>
+          </a:prstGeom>
+          <a:noFill/>
+        </p:spPr>
+        <p:txBody>
+          <a:bodyPr wrap="square" rtlCol="0">
+            <a:spAutoFit/>
+          </a:bodyPr>
+          <a:lstStyle/>
+          <a:p>
+            <a:r>
+              <a:rPr lang="en-CA" b="1" dirty="0" smtClean="0"/>
+              <a:t>HEAD</a:t>
+            </a:r>
+            <a:endParaRPr lang="en-CA" b="1" dirty="0"/>
+          </a:p>
+        </p:txBody>
+      </p:sp>
+    </p:spTree>
+    <p:extLst>
+      <p:ext uri="{BB962C8B-B14F-4D97-AF65-F5344CB8AC3E}">
+        <p14:creationId xmlns:p14="http://schemas.microsoft.com/office/powerpoint/2010/main" val="3702266385"/>
+      </p:ext>
+    </p:extLst>
+  </p:cSld>
+  <p:clrMapOvr>
+    <a:masterClrMapping/>
+  </p:clrMapOvr>
+  <p:timing>
+    <p:tnLst>
+      <p:par>
+        <p:cTn id="1" dur="indefinite" restart="never" nodeType="tmRoot"/>
+      </p:par>
+    </p:tnLst>
+  </p:timing>
+</p:sld>
+</file>
+
+<file path=ppt/slides/slide13.xml><?xml version="1.0" encoding="utf-8"?>
+<p:sld xmlns:a="http://schemas.openxmlformats.org/drawingml/2006/main" xmlns:r="http://schemas.openxmlformats.org/officeDocument/2006/relationships" xmlns:p="http://schemas.openxmlformats.org/presentationml/2006/main">
+  <p:cSld>
+    <p:spTree>
+      <p:nvGrpSpPr>
+        <p:cNvPr id="1" name=""/>
+        <p:cNvGrpSpPr/>
+        <p:nvPr/>
+      </p:nvGrpSpPr>
+      <p:grpSpPr>
+        <a:xfrm>
+          <a:off x="0" y="0"/>
+          <a:ext cx="0" cy="0"/>
+          <a:chOff x="0" y="0"/>
+          <a:chExt cx="0" cy="0"/>
+        </a:xfrm>
+      </p:grpSpPr>
+      <p:sp>
+        <p:nvSpPr>
+          <p:cNvPr id="4" name="Rounded Rectangle 3"/>
+          <p:cNvSpPr/>
+          <p:nvPr/>
+        </p:nvSpPr>
+        <p:spPr>
+          <a:xfrm>
+            <a:off x="323528" y="3158970"/>
+            <a:ext cx="1152128" cy="828092"/>
+          </a:xfrm>
+          <a:prstGeom prst="roundRect">
+            <a:avLst/>
+          </a:prstGeom>
+          <a:solidFill>
+            <a:schemeClr val="accent1">
+              <a:lumMod val="40000"/>
+              <a:lumOff val="60000"/>
+            </a:schemeClr>
+          </a:solidFill>
+        </p:spPr>
+        <p:style>
+          <a:lnRef idx="2">
+            <a:schemeClr val="accent1">
+              <a:shade val="50000"/>
+            </a:schemeClr>
+          </a:lnRef>
+          <a:fillRef idx="1">
+            <a:schemeClr val="accent1"/>
+          </a:fillRef>
+          <a:effectRef idx="0">
+            <a:schemeClr val="accent1"/>
+          </a:effectRef>
+          <a:fontRef idx="minor">
+            <a:schemeClr val="lt1"/>
+          </a:fontRef>
+        </p:style>
+        <p:txBody>
+          <a:bodyPr rtlCol="0" anchor="ctr"/>
+          <a:lstStyle/>
+          <a:p>
+            <a:pPr algn="ctr"/>
+            <a:r>
+              <a:rPr lang="en-CA" sz="1400" b="1" dirty="0" smtClean="0">
+                <a:solidFill>
+                  <a:schemeClr val="tx1"/>
+                </a:solidFill>
+                <a:latin typeface="Courier New" panose="02070309020205020404" pitchFamily="49" charset="0"/>
+                <a:cs typeface="Courier New" panose="02070309020205020404" pitchFamily="49" charset="0"/>
+              </a:rPr>
+              <a:t>2eabdd2</a:t>
+            </a:r>
+            <a:endParaRPr lang="en-CA" sz="1400" b="1" dirty="0">
+              <a:solidFill>
+                <a:schemeClr val="tx1"/>
+              </a:solidFill>
+              <a:latin typeface="Courier New" panose="02070309020205020404" pitchFamily="49" charset="0"/>
+              <a:cs typeface="Courier New" panose="02070309020205020404" pitchFamily="49" charset="0"/>
+            </a:endParaRPr>
+          </a:p>
+        </p:txBody>
+      </p:sp>
+      <p:sp>
+        <p:nvSpPr>
+          <p:cNvPr id="5" name="Rounded Rectangle 4"/>
+          <p:cNvSpPr/>
+          <p:nvPr/>
+        </p:nvSpPr>
+        <p:spPr>
+          <a:xfrm>
+            <a:off x="2231740" y="3158970"/>
+            <a:ext cx="1152128" cy="828092"/>
+          </a:xfrm>
+          <a:prstGeom prst="roundRect">
+            <a:avLst/>
+          </a:prstGeom>
+          <a:solidFill>
+            <a:schemeClr val="accent1">
+              <a:lumMod val="40000"/>
+              <a:lumOff val="60000"/>
+            </a:schemeClr>
+          </a:solidFill>
+        </p:spPr>
+        <p:style>
+          <a:lnRef idx="2">
+            <a:schemeClr val="accent1">
+              <a:shade val="50000"/>
+            </a:schemeClr>
+          </a:lnRef>
+          <a:fillRef idx="1">
+            <a:schemeClr val="accent1"/>
+          </a:fillRef>
+          <a:effectRef idx="0">
+            <a:schemeClr val="accent1"/>
+          </a:effectRef>
+          <a:fontRef idx="minor">
+            <a:schemeClr val="lt1"/>
+          </a:fontRef>
+        </p:style>
+        <p:txBody>
+          <a:bodyPr rtlCol="0" anchor="ctr"/>
+          <a:lstStyle/>
+          <a:p>
+            <a:pPr algn="ctr"/>
+            <a:r>
+              <a:rPr lang="en-CA" sz="1400" b="1" dirty="0" smtClean="0">
+                <a:solidFill>
+                  <a:schemeClr val="tx1"/>
+                </a:solidFill>
+                <a:latin typeface="Courier New" panose="02070309020205020404" pitchFamily="49" charset="0"/>
+                <a:cs typeface="Courier New" panose="02070309020205020404" pitchFamily="49" charset="0"/>
+              </a:rPr>
+              <a:t>fef4257</a:t>
+            </a:r>
+            <a:endParaRPr lang="en-CA" sz="1400" b="1" dirty="0">
+              <a:solidFill>
+                <a:schemeClr val="tx1"/>
+              </a:solidFill>
+              <a:latin typeface="Courier New" panose="02070309020205020404" pitchFamily="49" charset="0"/>
+              <a:cs typeface="Courier New" panose="02070309020205020404" pitchFamily="49" charset="0"/>
+            </a:endParaRPr>
+          </a:p>
+        </p:txBody>
+      </p:sp>
+      <p:sp>
+        <p:nvSpPr>
+          <p:cNvPr id="6" name="Rounded Rectangle 5"/>
+          <p:cNvSpPr/>
+          <p:nvPr/>
+        </p:nvSpPr>
+        <p:spPr>
+          <a:xfrm>
+            <a:off x="4139952" y="3158970"/>
+            <a:ext cx="1152128" cy="828092"/>
+          </a:xfrm>
+          <a:prstGeom prst="roundRect">
+            <a:avLst/>
+          </a:prstGeom>
+          <a:solidFill>
+            <a:schemeClr val="accent1">
+              <a:lumMod val="40000"/>
+              <a:lumOff val="60000"/>
+            </a:schemeClr>
+          </a:solidFill>
+        </p:spPr>
+        <p:style>
+          <a:lnRef idx="2">
+            <a:schemeClr val="accent1">
+              <a:shade val="50000"/>
+            </a:schemeClr>
+          </a:lnRef>
+          <a:fillRef idx="1">
+            <a:schemeClr val="accent1"/>
+          </a:fillRef>
+          <a:effectRef idx="0">
+            <a:schemeClr val="accent1"/>
+          </a:effectRef>
+          <a:fontRef idx="minor">
+            <a:schemeClr val="lt1"/>
+          </a:fontRef>
+        </p:style>
+        <p:txBody>
+          <a:bodyPr rtlCol="0" anchor="ctr"/>
+          <a:lstStyle/>
+          <a:p>
+            <a:pPr algn="ctr"/>
+            <a:r>
+              <a:rPr lang="en-CA" sz="1400" b="1" dirty="0" smtClean="0">
+                <a:solidFill>
+                  <a:schemeClr val="tx1"/>
+                </a:solidFill>
+                <a:latin typeface="Courier New" panose="02070309020205020404" pitchFamily="49" charset="0"/>
+                <a:cs typeface="Courier New" panose="02070309020205020404" pitchFamily="49" charset="0"/>
+              </a:rPr>
+              <a:t>d448487</a:t>
+            </a:r>
+            <a:endParaRPr lang="en-CA" sz="1400" b="1" dirty="0">
+              <a:solidFill>
+                <a:schemeClr val="tx1"/>
+              </a:solidFill>
+              <a:latin typeface="Courier New" panose="02070309020205020404" pitchFamily="49" charset="0"/>
+              <a:cs typeface="Courier New" panose="02070309020205020404" pitchFamily="49" charset="0"/>
+            </a:endParaRPr>
+          </a:p>
+        </p:txBody>
+      </p:sp>
+      <p:sp>
+        <p:nvSpPr>
+          <p:cNvPr id="7" name="Rounded Rectangle 6"/>
+          <p:cNvSpPr/>
+          <p:nvPr/>
+        </p:nvSpPr>
+        <p:spPr>
+          <a:xfrm>
+            <a:off x="6048164" y="3158970"/>
+            <a:ext cx="1152128" cy="828092"/>
+          </a:xfrm>
+          <a:prstGeom prst="roundRect">
+            <a:avLst/>
+          </a:prstGeom>
+          <a:solidFill>
+            <a:schemeClr val="accent1">
+              <a:lumMod val="40000"/>
+              <a:lumOff val="60000"/>
+            </a:schemeClr>
+          </a:solidFill>
+        </p:spPr>
+        <p:style>
+          <a:lnRef idx="2">
+            <a:schemeClr val="accent1">
+              <a:shade val="50000"/>
+            </a:schemeClr>
+          </a:lnRef>
+          <a:fillRef idx="1">
+            <a:schemeClr val="accent1"/>
+          </a:fillRef>
+          <a:effectRef idx="0">
+            <a:schemeClr val="accent1"/>
+          </a:effectRef>
+          <a:fontRef idx="minor">
+            <a:schemeClr val="lt1"/>
+          </a:fontRef>
+        </p:style>
+        <p:txBody>
+          <a:bodyPr rtlCol="0" anchor="ctr"/>
+          <a:lstStyle/>
+          <a:p>
+            <a:pPr algn="ctr"/>
+            <a:r>
+              <a:rPr lang="en-CA" sz="1400" b="1" dirty="0" smtClean="0">
+                <a:solidFill>
+                  <a:schemeClr val="tx1"/>
+                </a:solidFill>
+                <a:latin typeface="Courier New" panose="02070309020205020404" pitchFamily="49" charset="0"/>
+                <a:cs typeface="Courier New" panose="02070309020205020404" pitchFamily="49" charset="0"/>
+              </a:rPr>
+              <a:t>5565a92</a:t>
+            </a:r>
+            <a:endParaRPr lang="en-CA" sz="1400" b="1" dirty="0">
+              <a:solidFill>
+                <a:schemeClr val="tx1"/>
+              </a:solidFill>
+              <a:latin typeface="Courier New" panose="02070309020205020404" pitchFamily="49" charset="0"/>
+              <a:cs typeface="Courier New" panose="02070309020205020404" pitchFamily="49" charset="0"/>
+            </a:endParaRPr>
+          </a:p>
+        </p:txBody>
+      </p:sp>
+      <p:sp>
+        <p:nvSpPr>
+          <p:cNvPr id="8" name="Rounded Rectangle 7"/>
+          <p:cNvSpPr/>
+          <p:nvPr/>
+        </p:nvSpPr>
+        <p:spPr>
+          <a:xfrm>
+            <a:off x="4139952" y="1808820"/>
+            <a:ext cx="1152128" cy="828092"/>
+          </a:xfrm>
+          <a:prstGeom prst="roundRect">
+            <a:avLst/>
+          </a:prstGeom>
+          <a:solidFill>
+            <a:schemeClr val="accent1">
+              <a:lumMod val="40000"/>
+              <a:lumOff val="60000"/>
+            </a:schemeClr>
+          </a:solidFill>
+        </p:spPr>
+        <p:style>
+          <a:lnRef idx="2">
+            <a:schemeClr val="accent1">
+              <a:shade val="50000"/>
+            </a:schemeClr>
+          </a:lnRef>
+          <a:fillRef idx="1">
+            <a:schemeClr val="accent1"/>
+          </a:fillRef>
+          <a:effectRef idx="0">
+            <a:schemeClr val="accent1"/>
+          </a:effectRef>
+          <a:fontRef idx="minor">
+            <a:schemeClr val="lt1"/>
+          </a:fontRef>
+        </p:style>
+        <p:txBody>
+          <a:bodyPr rtlCol="0" anchor="ctr"/>
+          <a:lstStyle/>
+          <a:p>
+            <a:pPr algn="ctr"/>
+            <a:r>
+              <a:rPr lang="en-CA" sz="1400" b="1" dirty="0" smtClean="0">
+                <a:solidFill>
+                  <a:schemeClr val="tx1"/>
+                </a:solidFill>
+                <a:latin typeface="Courier New" panose="02070309020205020404" pitchFamily="49" charset="0"/>
+                <a:cs typeface="Courier New" panose="02070309020205020404" pitchFamily="49" charset="0"/>
+              </a:rPr>
+              <a:t>a5c64ca</a:t>
+            </a:r>
+            <a:endParaRPr lang="en-CA" sz="1400" b="1" dirty="0">
+              <a:solidFill>
+                <a:schemeClr val="tx1"/>
+              </a:solidFill>
+              <a:latin typeface="Courier New" panose="02070309020205020404" pitchFamily="49" charset="0"/>
+              <a:cs typeface="Courier New" panose="02070309020205020404" pitchFamily="49" charset="0"/>
+            </a:endParaRPr>
+          </a:p>
+        </p:txBody>
+      </p:sp>
+      <p:sp>
+        <p:nvSpPr>
+          <p:cNvPr id="9" name="Rounded Rectangle 8"/>
+          <p:cNvSpPr/>
+          <p:nvPr/>
+        </p:nvSpPr>
+        <p:spPr>
+          <a:xfrm>
+            <a:off x="6012160" y="1808820"/>
+            <a:ext cx="1152128" cy="828092"/>
+          </a:xfrm>
+          <a:prstGeom prst="roundRect">
+            <a:avLst/>
+          </a:prstGeom>
+          <a:solidFill>
+            <a:schemeClr val="accent1">
+              <a:lumMod val="40000"/>
+              <a:lumOff val="60000"/>
+            </a:schemeClr>
+          </a:solidFill>
+        </p:spPr>
+        <p:style>
+          <a:lnRef idx="2">
+            <a:schemeClr val="accent1">
+              <a:shade val="50000"/>
+            </a:schemeClr>
+          </a:lnRef>
+          <a:fillRef idx="1">
+            <a:schemeClr val="accent1"/>
+          </a:fillRef>
+          <a:effectRef idx="0">
+            <a:schemeClr val="accent1"/>
+          </a:effectRef>
+          <a:fontRef idx="minor">
+            <a:schemeClr val="lt1"/>
+          </a:fontRef>
+        </p:style>
+        <p:txBody>
+          <a:bodyPr rtlCol="0" anchor="ctr"/>
+          <a:lstStyle/>
+          <a:p>
+            <a:pPr algn="ctr"/>
+            <a:r>
+              <a:rPr lang="en-CA" sz="1400" b="1" dirty="0" smtClean="0">
+                <a:solidFill>
+                  <a:schemeClr val="tx1"/>
+                </a:solidFill>
+                <a:latin typeface="Courier New" panose="02070309020205020404" pitchFamily="49" charset="0"/>
+                <a:cs typeface="Courier New" panose="02070309020205020404" pitchFamily="49" charset="0"/>
+              </a:rPr>
+              <a:t>fb0e936</a:t>
+            </a:r>
+            <a:endParaRPr lang="en-CA" sz="1400" b="1" dirty="0">
+              <a:solidFill>
+                <a:schemeClr val="tx1"/>
+              </a:solidFill>
+              <a:latin typeface="Courier New" panose="02070309020205020404" pitchFamily="49" charset="0"/>
+              <a:cs typeface="Courier New" panose="02070309020205020404" pitchFamily="49" charset="0"/>
+            </a:endParaRPr>
+          </a:p>
+        </p:txBody>
+      </p:sp>
+      <p:sp>
+        <p:nvSpPr>
+          <p:cNvPr id="11" name="Right Arrow 10"/>
+          <p:cNvSpPr/>
+          <p:nvPr/>
+        </p:nvSpPr>
+        <p:spPr>
+          <a:xfrm>
+            <a:off x="1619672" y="3429000"/>
+            <a:ext cx="504056" cy="216024"/>
+          </a:xfrm>
+          <a:prstGeom prst="rightArrow">
+            <a:avLst/>
+          </a:prstGeom>
+        </p:spPr>
+        <p:style>
+          <a:lnRef idx="2">
+            <a:schemeClr val="accent1">
+              <a:shade val="50000"/>
+            </a:schemeClr>
+          </a:lnRef>
+          <a:fillRef idx="1">
+            <a:schemeClr val="accent1"/>
+          </a:fillRef>
+          <a:effectRef idx="0">
+            <a:schemeClr val="accent1"/>
+          </a:effectRef>
+          <a:fontRef idx="minor">
+            <a:schemeClr val="lt1"/>
+          </a:fontRef>
+        </p:style>
+        <p:txBody>
+          <a:bodyPr rtlCol="0" anchor="ctr"/>
+          <a:lstStyle/>
+          <a:p>
+            <a:pPr algn="ctr"/>
+            <a:endParaRPr lang="en-CA"/>
+          </a:p>
+        </p:txBody>
+      </p:sp>
+      <p:sp>
+        <p:nvSpPr>
+          <p:cNvPr id="12" name="Right Arrow 11"/>
+          <p:cNvSpPr/>
+          <p:nvPr/>
+        </p:nvSpPr>
+        <p:spPr>
+          <a:xfrm>
+            <a:off x="3491880" y="3429000"/>
+            <a:ext cx="504056" cy="216024"/>
+          </a:xfrm>
+          <a:prstGeom prst="rightArrow">
+            <a:avLst/>
+          </a:prstGeom>
+        </p:spPr>
+        <p:style>
+          <a:lnRef idx="2">
+            <a:schemeClr val="accent1">
+              <a:shade val="50000"/>
+            </a:schemeClr>
+          </a:lnRef>
+          <a:fillRef idx="1">
+            <a:schemeClr val="accent1"/>
+          </a:fillRef>
+          <a:effectRef idx="0">
+            <a:schemeClr val="accent1"/>
+          </a:effectRef>
+          <a:fontRef idx="minor">
+            <a:schemeClr val="lt1"/>
+          </a:fontRef>
+        </p:style>
+        <p:txBody>
+          <a:bodyPr rtlCol="0" anchor="ctr"/>
+          <a:lstStyle/>
+          <a:p>
+            <a:pPr algn="ctr"/>
+            <a:endParaRPr lang="en-CA"/>
+          </a:p>
+        </p:txBody>
+      </p:sp>
+      <p:sp>
+        <p:nvSpPr>
+          <p:cNvPr id="13" name="Right Arrow 12"/>
+          <p:cNvSpPr/>
+          <p:nvPr/>
+        </p:nvSpPr>
+        <p:spPr>
+          <a:xfrm>
+            <a:off x="5436096" y="3501008"/>
+            <a:ext cx="504056" cy="216024"/>
+          </a:xfrm>
+          <a:prstGeom prst="rightArrow">
+            <a:avLst/>
+          </a:prstGeom>
+        </p:spPr>
+        <p:style>
+          <a:lnRef idx="2">
+            <a:schemeClr val="accent1">
+              <a:shade val="50000"/>
+            </a:schemeClr>
+          </a:lnRef>
+          <a:fillRef idx="1">
+            <a:schemeClr val="accent1"/>
+          </a:fillRef>
+          <a:effectRef idx="0">
+            <a:schemeClr val="accent1"/>
+          </a:effectRef>
+          <a:fontRef idx="minor">
+            <a:schemeClr val="lt1"/>
+          </a:fontRef>
+        </p:style>
+        <p:txBody>
+          <a:bodyPr rtlCol="0" anchor="ctr"/>
+          <a:lstStyle/>
+          <a:p>
+            <a:pPr algn="ctr"/>
+            <a:endParaRPr lang="en-CA"/>
+          </a:p>
+        </p:txBody>
+      </p:sp>
+      <p:sp>
+        <p:nvSpPr>
+          <p:cNvPr id="15" name="Right Arrow 14"/>
+          <p:cNvSpPr/>
+          <p:nvPr/>
+        </p:nvSpPr>
+        <p:spPr>
+          <a:xfrm>
+            <a:off x="5436096" y="2168860"/>
+            <a:ext cx="504056" cy="216024"/>
+          </a:xfrm>
+          <a:prstGeom prst="rightArrow">
+            <a:avLst/>
+          </a:prstGeom>
+        </p:spPr>
+        <p:style>
+          <a:lnRef idx="2">
+            <a:schemeClr val="accent1">
+              <a:shade val="50000"/>
+            </a:schemeClr>
+          </a:lnRef>
+          <a:fillRef idx="1">
+            <a:schemeClr val="accent1"/>
+          </a:fillRef>
+          <a:effectRef idx="0">
+            <a:schemeClr val="accent1"/>
+          </a:effectRef>
+          <a:fontRef idx="minor">
+            <a:schemeClr val="lt1"/>
+          </a:fontRef>
+        </p:style>
+        <p:txBody>
+          <a:bodyPr rtlCol="0" anchor="ctr"/>
+          <a:lstStyle/>
+          <a:p>
+            <a:pPr algn="ctr"/>
+            <a:endParaRPr lang="en-CA"/>
+          </a:p>
+        </p:txBody>
+      </p:sp>
+      <p:sp>
+        <p:nvSpPr>
+          <p:cNvPr id="16" name="Right Arrow 15"/>
+          <p:cNvSpPr/>
+          <p:nvPr/>
+        </p:nvSpPr>
+        <p:spPr>
+          <a:xfrm rot="19044843">
+            <a:off x="3413249" y="2638868"/>
+            <a:ext cx="504056" cy="216024"/>
+          </a:xfrm>
+          <a:prstGeom prst="rightArrow">
+            <a:avLst/>
+          </a:prstGeom>
+        </p:spPr>
+        <p:style>
+          <a:lnRef idx="2">
+            <a:schemeClr val="accent1">
+              <a:shade val="50000"/>
+            </a:schemeClr>
+          </a:lnRef>
+          <a:fillRef idx="1">
+            <a:schemeClr val="accent1"/>
+          </a:fillRef>
+          <a:effectRef idx="0">
+            <a:schemeClr val="accent1"/>
+          </a:effectRef>
+          <a:fontRef idx="minor">
+            <a:schemeClr val="lt1"/>
+          </a:fontRef>
+        </p:style>
+        <p:txBody>
+          <a:bodyPr rtlCol="0" anchor="ctr"/>
+          <a:lstStyle/>
+          <a:p>
+            <a:pPr algn="ctr"/>
+            <a:endParaRPr lang="en-CA"/>
+          </a:p>
+        </p:txBody>
+      </p:sp>
+      <p:sp>
+        <p:nvSpPr>
+          <p:cNvPr id="19" name="TextBox 18"/>
+          <p:cNvSpPr txBox="1"/>
+          <p:nvPr/>
+        </p:nvSpPr>
+        <p:spPr>
+          <a:xfrm>
+            <a:off x="2699792" y="2204864"/>
+            <a:ext cx="1192334" cy="369332"/>
+          </a:xfrm>
+          <a:prstGeom prst="rect">
+            <a:avLst/>
+          </a:prstGeom>
+          <a:noFill/>
+        </p:spPr>
+        <p:txBody>
+          <a:bodyPr wrap="square" rtlCol="0">
+            <a:spAutoFit/>
+          </a:bodyPr>
+          <a:lstStyle/>
+          <a:p>
+            <a:r>
+              <a:rPr lang="en-CA" b="1" dirty="0" smtClean="0"/>
+              <a:t>branch</a:t>
+            </a:r>
+            <a:endParaRPr lang="en-CA" b="1" dirty="0"/>
+          </a:p>
+        </p:txBody>
+      </p:sp>
+      <p:sp>
+        <p:nvSpPr>
+          <p:cNvPr id="21" name="TextBox 20"/>
+          <p:cNvSpPr txBox="1"/>
+          <p:nvPr/>
+        </p:nvSpPr>
+        <p:spPr>
+          <a:xfrm>
+            <a:off x="6244085" y="3989145"/>
+            <a:ext cx="760286" cy="369332"/>
+          </a:xfrm>
+          <a:prstGeom prst="rect">
+            <a:avLst/>
+          </a:prstGeom>
+          <a:noFill/>
+        </p:spPr>
+        <p:txBody>
+          <a:bodyPr wrap="square" rtlCol="0">
+            <a:spAutoFit/>
+          </a:bodyPr>
+          <a:lstStyle/>
+          <a:p>
+            <a:r>
+              <a:rPr lang="en-CA" b="1" dirty="0" smtClean="0"/>
+              <a:t>HEAD</a:t>
+            </a:r>
+            <a:endParaRPr lang="en-CA" b="1" dirty="0"/>
+          </a:p>
+        </p:txBody>
+      </p:sp>
+    </p:spTree>
+    <p:extLst>
+      <p:ext uri="{BB962C8B-B14F-4D97-AF65-F5344CB8AC3E}">
+        <p14:creationId xmlns:p14="http://schemas.microsoft.com/office/powerpoint/2010/main" val="1802841101"/>
+      </p:ext>
+    </p:extLst>
+  </p:cSld>
+  <p:clrMapOvr>
+    <a:masterClrMapping/>
+  </p:clrMapOvr>
+  <p:timing>
+    <p:tnLst>
+      <p:par>
+        <p:cTn id="1" dur="indefinite" restart="never" nodeType="tmRoot"/>
+      </p:par>
+    </p:tnLst>
+  </p:timing>
+</p:sld>
+</file>
+
+<file path=ppt/slides/slide14.xml><?xml version="1.0" encoding="utf-8"?>
+<p:sld xmlns:a="http://schemas.openxmlformats.org/drawingml/2006/main" xmlns:r="http://schemas.openxmlformats.org/officeDocument/2006/relationships" xmlns:p="http://schemas.openxmlformats.org/presentationml/2006/main">
+  <p:cSld>
+    <p:spTree>
+      <p:nvGrpSpPr>
+        <p:cNvPr id="1" name=""/>
+        <p:cNvGrpSpPr/>
+        <p:nvPr/>
+      </p:nvGrpSpPr>
+      <p:grpSpPr>
+        <a:xfrm>
+          <a:off x="0" y="0"/>
+          <a:ext cx="0" cy="0"/>
+          <a:chOff x="0" y="0"/>
+          <a:chExt cx="0" cy="0"/>
+        </a:xfrm>
+      </p:grpSpPr>
+      <p:sp>
+        <p:nvSpPr>
+          <p:cNvPr id="4" name="Rounded Rectangle 3"/>
+          <p:cNvSpPr/>
+          <p:nvPr/>
+        </p:nvSpPr>
+        <p:spPr>
+          <a:xfrm>
+            <a:off x="323528" y="3158970"/>
+            <a:ext cx="1152128" cy="828092"/>
+          </a:xfrm>
+          <a:prstGeom prst="roundRect">
+            <a:avLst/>
+          </a:prstGeom>
+          <a:solidFill>
+            <a:schemeClr val="accent1">
+              <a:lumMod val="40000"/>
+              <a:lumOff val="60000"/>
+            </a:schemeClr>
+          </a:solidFill>
+        </p:spPr>
+        <p:style>
+          <a:lnRef idx="2">
+            <a:schemeClr val="accent1">
+              <a:shade val="50000"/>
+            </a:schemeClr>
+          </a:lnRef>
+          <a:fillRef idx="1">
+            <a:schemeClr val="accent1"/>
+          </a:fillRef>
+          <a:effectRef idx="0">
+            <a:schemeClr val="accent1"/>
+          </a:effectRef>
+          <a:fontRef idx="minor">
+            <a:schemeClr val="lt1"/>
+          </a:fontRef>
+        </p:style>
+        <p:txBody>
+          <a:bodyPr rtlCol="0" anchor="ctr"/>
+          <a:lstStyle/>
+          <a:p>
+            <a:pPr algn="ctr"/>
+            <a:r>
+              <a:rPr lang="en-CA" sz="1400" b="1" dirty="0" smtClean="0">
+                <a:solidFill>
+                  <a:schemeClr val="tx1"/>
+                </a:solidFill>
+                <a:latin typeface="Courier New" panose="02070309020205020404" pitchFamily="49" charset="0"/>
+                <a:cs typeface="Courier New" panose="02070309020205020404" pitchFamily="49" charset="0"/>
+              </a:rPr>
+              <a:t>2eabdd2</a:t>
+            </a:r>
+            <a:endParaRPr lang="en-CA" sz="1400" b="1" dirty="0">
+              <a:solidFill>
+                <a:schemeClr val="tx1"/>
+              </a:solidFill>
+              <a:latin typeface="Courier New" panose="02070309020205020404" pitchFamily="49" charset="0"/>
+              <a:cs typeface="Courier New" panose="02070309020205020404" pitchFamily="49" charset="0"/>
+            </a:endParaRPr>
+          </a:p>
+        </p:txBody>
+      </p:sp>
+      <p:sp>
+        <p:nvSpPr>
+          <p:cNvPr id="5" name="Rounded Rectangle 4"/>
+          <p:cNvSpPr/>
+          <p:nvPr/>
+        </p:nvSpPr>
+        <p:spPr>
+          <a:xfrm>
+            <a:off x="2231740" y="3158970"/>
+            <a:ext cx="1152128" cy="828092"/>
+          </a:xfrm>
+          <a:prstGeom prst="roundRect">
+            <a:avLst/>
+          </a:prstGeom>
+          <a:solidFill>
+            <a:schemeClr val="accent1">
+              <a:lumMod val="40000"/>
+              <a:lumOff val="60000"/>
+            </a:schemeClr>
+          </a:solidFill>
+        </p:spPr>
+        <p:style>
+          <a:lnRef idx="2">
+            <a:schemeClr val="accent1">
+              <a:shade val="50000"/>
+            </a:schemeClr>
+          </a:lnRef>
+          <a:fillRef idx="1">
+            <a:schemeClr val="accent1"/>
+          </a:fillRef>
+          <a:effectRef idx="0">
+            <a:schemeClr val="accent1"/>
+          </a:effectRef>
+          <a:fontRef idx="minor">
+            <a:schemeClr val="lt1"/>
+          </a:fontRef>
+        </p:style>
+        <p:txBody>
+          <a:bodyPr rtlCol="0" anchor="ctr"/>
+          <a:lstStyle/>
+          <a:p>
+            <a:pPr algn="ctr"/>
+            <a:r>
+              <a:rPr lang="en-CA" sz="1400" b="1" dirty="0" smtClean="0">
+                <a:solidFill>
+                  <a:schemeClr val="tx1"/>
+                </a:solidFill>
+                <a:latin typeface="Courier New" panose="02070309020205020404" pitchFamily="49" charset="0"/>
+                <a:cs typeface="Courier New" panose="02070309020205020404" pitchFamily="49" charset="0"/>
+              </a:rPr>
+              <a:t>fef4257</a:t>
+            </a:r>
+            <a:endParaRPr lang="en-CA" sz="1400" b="1" dirty="0">
+              <a:solidFill>
+                <a:schemeClr val="tx1"/>
+              </a:solidFill>
+              <a:latin typeface="Courier New" panose="02070309020205020404" pitchFamily="49" charset="0"/>
+              <a:cs typeface="Courier New" panose="02070309020205020404" pitchFamily="49" charset="0"/>
+            </a:endParaRPr>
+          </a:p>
+        </p:txBody>
+      </p:sp>
+      <p:sp>
+        <p:nvSpPr>
+          <p:cNvPr id="6" name="Rounded Rectangle 5"/>
+          <p:cNvSpPr/>
+          <p:nvPr/>
+        </p:nvSpPr>
+        <p:spPr>
+          <a:xfrm>
+            <a:off x="4139952" y="3158970"/>
+            <a:ext cx="1152128" cy="828092"/>
+          </a:xfrm>
+          <a:prstGeom prst="roundRect">
+            <a:avLst/>
+          </a:prstGeom>
+          <a:solidFill>
+            <a:schemeClr val="accent1">
+              <a:lumMod val="40000"/>
+              <a:lumOff val="60000"/>
+            </a:schemeClr>
+          </a:solidFill>
+        </p:spPr>
+        <p:style>
+          <a:lnRef idx="2">
+            <a:schemeClr val="accent1">
+              <a:shade val="50000"/>
+            </a:schemeClr>
+          </a:lnRef>
+          <a:fillRef idx="1">
+            <a:schemeClr val="accent1"/>
+          </a:fillRef>
+          <a:effectRef idx="0">
+            <a:schemeClr val="accent1"/>
+          </a:effectRef>
+          <a:fontRef idx="minor">
+            <a:schemeClr val="lt1"/>
+          </a:fontRef>
+        </p:style>
+        <p:txBody>
+          <a:bodyPr rtlCol="0" anchor="ctr"/>
+          <a:lstStyle/>
+          <a:p>
+            <a:pPr algn="ctr"/>
+            <a:r>
+              <a:rPr lang="en-CA" sz="1400" b="1" dirty="0" smtClean="0">
+                <a:solidFill>
+                  <a:schemeClr val="tx1"/>
+                </a:solidFill>
+                <a:latin typeface="Courier New" panose="02070309020205020404" pitchFamily="49" charset="0"/>
+                <a:cs typeface="Courier New" panose="02070309020205020404" pitchFamily="49" charset="0"/>
+              </a:rPr>
+              <a:t>d448487</a:t>
+            </a:r>
+            <a:endParaRPr lang="en-CA" sz="1400" b="1" dirty="0">
+              <a:solidFill>
+                <a:schemeClr val="tx1"/>
+              </a:solidFill>
+              <a:latin typeface="Courier New" panose="02070309020205020404" pitchFamily="49" charset="0"/>
+              <a:cs typeface="Courier New" panose="02070309020205020404" pitchFamily="49" charset="0"/>
+            </a:endParaRPr>
+          </a:p>
+        </p:txBody>
+      </p:sp>
+      <p:sp>
+        <p:nvSpPr>
+          <p:cNvPr id="7" name="Rounded Rectangle 6"/>
+          <p:cNvSpPr/>
+          <p:nvPr/>
+        </p:nvSpPr>
+        <p:spPr>
+          <a:xfrm>
+            <a:off x="6048164" y="3158970"/>
+            <a:ext cx="1152128" cy="828092"/>
+          </a:xfrm>
+          <a:prstGeom prst="roundRect">
+            <a:avLst/>
+          </a:prstGeom>
+          <a:solidFill>
+            <a:schemeClr val="accent1">
+              <a:lumMod val="40000"/>
+              <a:lumOff val="60000"/>
+            </a:schemeClr>
+          </a:solidFill>
+        </p:spPr>
+        <p:style>
+          <a:lnRef idx="2">
+            <a:schemeClr val="accent1">
+              <a:shade val="50000"/>
+            </a:schemeClr>
+          </a:lnRef>
+          <a:fillRef idx="1">
+            <a:schemeClr val="accent1"/>
+          </a:fillRef>
+          <a:effectRef idx="0">
+            <a:schemeClr val="accent1"/>
+          </a:effectRef>
+          <a:fontRef idx="minor">
+            <a:schemeClr val="lt1"/>
+          </a:fontRef>
+        </p:style>
+        <p:txBody>
+          <a:bodyPr rtlCol="0" anchor="ctr"/>
+          <a:lstStyle/>
+          <a:p>
+            <a:pPr algn="ctr"/>
+            <a:r>
+              <a:rPr lang="en-CA" sz="1400" b="1" dirty="0" smtClean="0">
+                <a:solidFill>
+                  <a:schemeClr val="tx1"/>
+                </a:solidFill>
+                <a:latin typeface="Courier New" panose="02070309020205020404" pitchFamily="49" charset="0"/>
+                <a:cs typeface="Courier New" panose="02070309020205020404" pitchFamily="49" charset="0"/>
+              </a:rPr>
+              <a:t>5565a92</a:t>
+            </a:r>
+            <a:endParaRPr lang="en-CA" sz="1400" b="1" dirty="0">
+              <a:solidFill>
+                <a:schemeClr val="tx1"/>
+              </a:solidFill>
+              <a:latin typeface="Courier New" panose="02070309020205020404" pitchFamily="49" charset="0"/>
+              <a:cs typeface="Courier New" panose="02070309020205020404" pitchFamily="49" charset="0"/>
+            </a:endParaRPr>
+          </a:p>
+        </p:txBody>
+      </p:sp>
+      <p:sp>
+        <p:nvSpPr>
+          <p:cNvPr id="8" name="Rounded Rectangle 7"/>
+          <p:cNvSpPr/>
+          <p:nvPr/>
+        </p:nvSpPr>
+        <p:spPr>
+          <a:xfrm>
+            <a:off x="4139952" y="1808820"/>
+            <a:ext cx="1152128" cy="828092"/>
+          </a:xfrm>
+          <a:prstGeom prst="roundRect">
+            <a:avLst/>
+          </a:prstGeom>
+          <a:solidFill>
+            <a:schemeClr val="accent1">
+              <a:lumMod val="40000"/>
+              <a:lumOff val="60000"/>
+            </a:schemeClr>
+          </a:solidFill>
+        </p:spPr>
+        <p:style>
+          <a:lnRef idx="2">
+            <a:schemeClr val="accent1">
+              <a:shade val="50000"/>
+            </a:schemeClr>
+          </a:lnRef>
+          <a:fillRef idx="1">
+            <a:schemeClr val="accent1"/>
+          </a:fillRef>
+          <a:effectRef idx="0">
+            <a:schemeClr val="accent1"/>
+          </a:effectRef>
+          <a:fontRef idx="minor">
+            <a:schemeClr val="lt1"/>
+          </a:fontRef>
+        </p:style>
+        <p:txBody>
+          <a:bodyPr rtlCol="0" anchor="ctr"/>
+          <a:lstStyle/>
+          <a:p>
+            <a:pPr algn="ctr"/>
+            <a:r>
+              <a:rPr lang="en-CA" sz="1400" b="1" dirty="0" smtClean="0">
+                <a:solidFill>
+                  <a:schemeClr val="tx1"/>
+                </a:solidFill>
+                <a:latin typeface="Courier New" panose="02070309020205020404" pitchFamily="49" charset="0"/>
+                <a:cs typeface="Courier New" panose="02070309020205020404" pitchFamily="49" charset="0"/>
+              </a:rPr>
+              <a:t>a5c64ca</a:t>
+            </a:r>
+            <a:endParaRPr lang="en-CA" sz="1400" b="1" dirty="0">
+              <a:solidFill>
+                <a:schemeClr val="tx1"/>
+              </a:solidFill>
+              <a:latin typeface="Courier New" panose="02070309020205020404" pitchFamily="49" charset="0"/>
+              <a:cs typeface="Courier New" panose="02070309020205020404" pitchFamily="49" charset="0"/>
+            </a:endParaRPr>
+          </a:p>
+        </p:txBody>
+      </p:sp>
+      <p:sp>
+        <p:nvSpPr>
+          <p:cNvPr id="9" name="Rounded Rectangle 8"/>
+          <p:cNvSpPr/>
+          <p:nvPr/>
+        </p:nvSpPr>
+        <p:spPr>
+          <a:xfrm>
+            <a:off x="6012160" y="1808820"/>
+            <a:ext cx="1152128" cy="828092"/>
+          </a:xfrm>
+          <a:prstGeom prst="roundRect">
+            <a:avLst/>
+          </a:prstGeom>
+          <a:solidFill>
+            <a:schemeClr val="accent1">
+              <a:lumMod val="40000"/>
+              <a:lumOff val="60000"/>
+            </a:schemeClr>
+          </a:solidFill>
+        </p:spPr>
+        <p:style>
+          <a:lnRef idx="2">
+            <a:schemeClr val="accent1">
+              <a:shade val="50000"/>
+            </a:schemeClr>
+          </a:lnRef>
+          <a:fillRef idx="1">
+            <a:schemeClr val="accent1"/>
+          </a:fillRef>
+          <a:effectRef idx="0">
+            <a:schemeClr val="accent1"/>
+          </a:effectRef>
+          <a:fontRef idx="minor">
+            <a:schemeClr val="lt1"/>
+          </a:fontRef>
+        </p:style>
+        <p:txBody>
+          <a:bodyPr rtlCol="0" anchor="ctr"/>
+          <a:lstStyle/>
+          <a:p>
+            <a:pPr algn="ctr"/>
+            <a:r>
+              <a:rPr lang="en-CA" sz="1400" b="1" dirty="0" smtClean="0">
+                <a:solidFill>
+                  <a:schemeClr val="tx1"/>
+                </a:solidFill>
+                <a:latin typeface="Courier New" panose="02070309020205020404" pitchFamily="49" charset="0"/>
+                <a:cs typeface="Courier New" panose="02070309020205020404" pitchFamily="49" charset="0"/>
+              </a:rPr>
+              <a:t>fb0e936</a:t>
+            </a:r>
+            <a:endParaRPr lang="en-CA" sz="1400" b="1" dirty="0">
+              <a:solidFill>
+                <a:schemeClr val="tx1"/>
+              </a:solidFill>
+              <a:latin typeface="Courier New" panose="02070309020205020404" pitchFamily="49" charset="0"/>
+              <a:cs typeface="Courier New" panose="02070309020205020404" pitchFamily="49" charset="0"/>
+            </a:endParaRPr>
+          </a:p>
+        </p:txBody>
+      </p:sp>
+      <p:sp>
+        <p:nvSpPr>
+          <p:cNvPr id="10" name="Rounded Rectangle 9"/>
+          <p:cNvSpPr/>
+          <p:nvPr/>
+        </p:nvSpPr>
+        <p:spPr>
+          <a:xfrm>
+            <a:off x="7956376" y="3158970"/>
+            <a:ext cx="1152128" cy="828092"/>
+          </a:xfrm>
+          <a:prstGeom prst="roundRect">
+            <a:avLst/>
+          </a:prstGeom>
+          <a:solidFill>
+            <a:schemeClr val="accent1">
+              <a:lumMod val="40000"/>
+              <a:lumOff val="60000"/>
+            </a:schemeClr>
+          </a:solidFill>
+        </p:spPr>
+        <p:style>
+          <a:lnRef idx="2">
+            <a:schemeClr val="accent1">
+              <a:shade val="50000"/>
+            </a:schemeClr>
+          </a:lnRef>
+          <a:fillRef idx="1">
+            <a:schemeClr val="accent1"/>
+          </a:fillRef>
+          <a:effectRef idx="0">
+            <a:schemeClr val="accent1"/>
+          </a:effectRef>
+          <a:fontRef idx="minor">
+            <a:schemeClr val="lt1"/>
+          </a:fontRef>
+        </p:style>
+        <p:txBody>
+          <a:bodyPr rtlCol="0" anchor="ctr"/>
+          <a:lstStyle/>
+          <a:p>
+            <a:pPr algn="ctr"/>
+            <a:r>
+              <a:rPr lang="en-CA" sz="1400" b="1" dirty="0" smtClean="0">
+                <a:solidFill>
+                  <a:schemeClr val="tx1"/>
+                </a:solidFill>
+                <a:latin typeface="Courier New" panose="02070309020205020404" pitchFamily="49" charset="0"/>
+                <a:cs typeface="Courier New" panose="02070309020205020404" pitchFamily="49" charset="0"/>
+              </a:rPr>
+              <a:t>96e1c1b</a:t>
+            </a:r>
+            <a:endParaRPr lang="en-CA" sz="1400" b="1" dirty="0">
+              <a:solidFill>
+                <a:schemeClr val="tx1"/>
+              </a:solidFill>
+              <a:latin typeface="Courier New" panose="02070309020205020404" pitchFamily="49" charset="0"/>
+              <a:cs typeface="Courier New" panose="02070309020205020404" pitchFamily="49" charset="0"/>
+            </a:endParaRPr>
+          </a:p>
+        </p:txBody>
+      </p:sp>
+      <p:sp>
+        <p:nvSpPr>
+          <p:cNvPr id="11" name="Right Arrow 10"/>
+          <p:cNvSpPr/>
+          <p:nvPr/>
+        </p:nvSpPr>
+        <p:spPr>
+          <a:xfrm>
+            <a:off x="1619672" y="3429000"/>
+            <a:ext cx="504056" cy="216024"/>
+          </a:xfrm>
+          <a:prstGeom prst="rightArrow">
+            <a:avLst/>
+          </a:prstGeom>
+        </p:spPr>
+        <p:style>
+          <a:lnRef idx="2">
+            <a:schemeClr val="accent1">
+              <a:shade val="50000"/>
+            </a:schemeClr>
+          </a:lnRef>
+          <a:fillRef idx="1">
+            <a:schemeClr val="accent1"/>
+          </a:fillRef>
+          <a:effectRef idx="0">
+            <a:schemeClr val="accent1"/>
+          </a:effectRef>
+          <a:fontRef idx="minor">
+            <a:schemeClr val="lt1"/>
+          </a:fontRef>
+        </p:style>
+        <p:txBody>
+          <a:bodyPr rtlCol="0" anchor="ctr"/>
+          <a:lstStyle/>
+          <a:p>
+            <a:pPr algn="ctr"/>
+            <a:endParaRPr lang="en-CA"/>
+          </a:p>
+        </p:txBody>
+      </p:sp>
+      <p:sp>
+        <p:nvSpPr>
+          <p:cNvPr id="12" name="Right Arrow 11"/>
+          <p:cNvSpPr/>
+          <p:nvPr/>
+        </p:nvSpPr>
+        <p:spPr>
+          <a:xfrm>
+            <a:off x="3491880" y="3429000"/>
+            <a:ext cx="504056" cy="216024"/>
+          </a:xfrm>
+          <a:prstGeom prst="rightArrow">
+            <a:avLst/>
+          </a:prstGeom>
+        </p:spPr>
+        <p:style>
+          <a:lnRef idx="2">
+            <a:schemeClr val="accent1">
+              <a:shade val="50000"/>
+            </a:schemeClr>
+          </a:lnRef>
+          <a:fillRef idx="1">
+            <a:schemeClr val="accent1"/>
+          </a:fillRef>
+          <a:effectRef idx="0">
+            <a:schemeClr val="accent1"/>
+          </a:effectRef>
+          <a:fontRef idx="minor">
+            <a:schemeClr val="lt1"/>
+          </a:fontRef>
+        </p:style>
+        <p:txBody>
+          <a:bodyPr rtlCol="0" anchor="ctr"/>
+          <a:lstStyle/>
+          <a:p>
+            <a:pPr algn="ctr"/>
+            <a:endParaRPr lang="en-CA"/>
+          </a:p>
+        </p:txBody>
+      </p:sp>
+      <p:sp>
+        <p:nvSpPr>
+          <p:cNvPr id="13" name="Right Arrow 12"/>
+          <p:cNvSpPr/>
+          <p:nvPr/>
+        </p:nvSpPr>
+        <p:spPr>
+          <a:xfrm>
+            <a:off x="5436096" y="3501008"/>
+            <a:ext cx="504056" cy="216024"/>
+          </a:xfrm>
+          <a:prstGeom prst="rightArrow">
+            <a:avLst/>
+          </a:prstGeom>
+        </p:spPr>
+        <p:style>
+          <a:lnRef idx="2">
+            <a:schemeClr val="accent1">
+              <a:shade val="50000"/>
+            </a:schemeClr>
+          </a:lnRef>
+          <a:fillRef idx="1">
+            <a:schemeClr val="accent1"/>
+          </a:fillRef>
+          <a:effectRef idx="0">
+            <a:schemeClr val="accent1"/>
+          </a:effectRef>
+          <a:fontRef idx="minor">
+            <a:schemeClr val="lt1"/>
+          </a:fontRef>
+        </p:style>
+        <p:txBody>
+          <a:bodyPr rtlCol="0" anchor="ctr"/>
+          <a:lstStyle/>
+          <a:p>
+            <a:pPr algn="ctr"/>
+            <a:endParaRPr lang="en-CA"/>
+          </a:p>
+        </p:txBody>
+      </p:sp>
+      <p:sp>
+        <p:nvSpPr>
+          <p:cNvPr id="14" name="Right Arrow 13"/>
+          <p:cNvSpPr/>
+          <p:nvPr/>
+        </p:nvSpPr>
+        <p:spPr>
+          <a:xfrm>
+            <a:off x="7380312" y="3501008"/>
+            <a:ext cx="504056" cy="216024"/>
+          </a:xfrm>
+          <a:prstGeom prst="rightArrow">
+            <a:avLst/>
+          </a:prstGeom>
+        </p:spPr>
+        <p:style>
+          <a:lnRef idx="2">
+            <a:schemeClr val="accent1">
+              <a:shade val="50000"/>
+            </a:schemeClr>
+          </a:lnRef>
+          <a:fillRef idx="1">
+            <a:schemeClr val="accent1"/>
+          </a:fillRef>
+          <a:effectRef idx="0">
+            <a:schemeClr val="accent1"/>
+          </a:effectRef>
+          <a:fontRef idx="minor">
+            <a:schemeClr val="lt1"/>
+          </a:fontRef>
+        </p:style>
+        <p:txBody>
+          <a:bodyPr rtlCol="0" anchor="ctr"/>
+          <a:lstStyle/>
+          <a:p>
+            <a:pPr algn="ctr"/>
+            <a:endParaRPr lang="en-CA"/>
+          </a:p>
+        </p:txBody>
+      </p:sp>
+      <p:sp>
+        <p:nvSpPr>
+          <p:cNvPr id="15" name="Right Arrow 14"/>
+          <p:cNvSpPr/>
+          <p:nvPr/>
+        </p:nvSpPr>
+        <p:spPr>
+          <a:xfrm>
+            <a:off x="5436096" y="2168860"/>
+            <a:ext cx="504056" cy="216024"/>
+          </a:xfrm>
+          <a:prstGeom prst="rightArrow">
+            <a:avLst/>
+          </a:prstGeom>
+        </p:spPr>
+        <p:style>
+          <a:lnRef idx="2">
+            <a:schemeClr val="accent1">
+              <a:shade val="50000"/>
+            </a:schemeClr>
+          </a:lnRef>
+          <a:fillRef idx="1">
+            <a:schemeClr val="accent1"/>
+          </a:fillRef>
+          <a:effectRef idx="0">
+            <a:schemeClr val="accent1"/>
+          </a:effectRef>
+          <a:fontRef idx="minor">
+            <a:schemeClr val="lt1"/>
+          </a:fontRef>
+        </p:style>
+        <p:txBody>
+          <a:bodyPr rtlCol="0" anchor="ctr"/>
+          <a:lstStyle/>
+          <a:p>
+            <a:pPr algn="ctr"/>
+            <a:endParaRPr lang="en-CA"/>
+          </a:p>
+        </p:txBody>
+      </p:sp>
+      <p:sp>
+        <p:nvSpPr>
+          <p:cNvPr id="16" name="Right Arrow 15"/>
+          <p:cNvSpPr/>
+          <p:nvPr/>
+        </p:nvSpPr>
+        <p:spPr>
+          <a:xfrm rot="19044843">
+            <a:off x="3413249" y="2638868"/>
+            <a:ext cx="504056" cy="216024"/>
+          </a:xfrm>
+          <a:prstGeom prst="rightArrow">
+            <a:avLst/>
+          </a:prstGeom>
+        </p:spPr>
+        <p:style>
+          <a:lnRef idx="2">
+            <a:schemeClr val="accent1">
+              <a:shade val="50000"/>
+            </a:schemeClr>
+          </a:lnRef>
+          <a:fillRef idx="1">
+            <a:schemeClr val="accent1"/>
+          </a:fillRef>
+          <a:effectRef idx="0">
+            <a:schemeClr val="accent1"/>
+          </a:effectRef>
+          <a:fontRef idx="minor">
+            <a:schemeClr val="lt1"/>
+          </a:fontRef>
+        </p:style>
+        <p:txBody>
+          <a:bodyPr rtlCol="0" anchor="ctr"/>
+          <a:lstStyle/>
+          <a:p>
+            <a:pPr algn="ctr"/>
+            <a:endParaRPr lang="en-CA"/>
+          </a:p>
+        </p:txBody>
+      </p:sp>
+      <p:sp>
+        <p:nvSpPr>
+          <p:cNvPr id="17" name="Right Arrow 16"/>
+          <p:cNvSpPr/>
+          <p:nvPr/>
+        </p:nvSpPr>
+        <p:spPr>
+          <a:xfrm rot="2912051">
+            <a:off x="7448118" y="2645265"/>
+            <a:ext cx="504056" cy="216024"/>
+          </a:xfrm>
+          <a:prstGeom prst="rightArrow">
+            <a:avLst/>
+          </a:prstGeom>
+        </p:spPr>
+        <p:style>
+          <a:lnRef idx="2">
+            <a:schemeClr val="accent1">
+              <a:shade val="50000"/>
+            </a:schemeClr>
+          </a:lnRef>
+          <a:fillRef idx="1">
+            <a:schemeClr val="accent1"/>
+          </a:fillRef>
+          <a:effectRef idx="0">
+            <a:schemeClr val="accent1"/>
+          </a:effectRef>
+          <a:fontRef idx="minor">
+            <a:schemeClr val="lt1"/>
+          </a:fontRef>
+        </p:style>
+        <p:txBody>
+          <a:bodyPr rtlCol="0" anchor="ctr"/>
+          <a:lstStyle/>
+          <a:p>
+            <a:pPr algn="ctr"/>
+            <a:endParaRPr lang="en-CA"/>
+          </a:p>
+        </p:txBody>
+      </p:sp>
+      <p:sp>
+        <p:nvSpPr>
+          <p:cNvPr id="18" name="TextBox 17"/>
+          <p:cNvSpPr txBox="1"/>
+          <p:nvPr/>
+        </p:nvSpPr>
+        <p:spPr>
+          <a:xfrm>
+            <a:off x="7812360" y="2195572"/>
+            <a:ext cx="1192334" cy="369332"/>
+          </a:xfrm>
+          <a:prstGeom prst="rect">
+            <a:avLst/>
+          </a:prstGeom>
+          <a:noFill/>
+        </p:spPr>
+        <p:txBody>
+          <a:bodyPr wrap="square" rtlCol="0">
+            <a:spAutoFit/>
+          </a:bodyPr>
+          <a:lstStyle/>
+          <a:p>
+            <a:r>
+              <a:rPr lang="en-CA" b="1" dirty="0" smtClean="0"/>
+              <a:t>merge</a:t>
+            </a:r>
+            <a:endParaRPr lang="en-CA" b="1" dirty="0"/>
+          </a:p>
+        </p:txBody>
+      </p:sp>
+      <p:sp>
+        <p:nvSpPr>
+          <p:cNvPr id="19" name="TextBox 18"/>
+          <p:cNvSpPr txBox="1"/>
+          <p:nvPr/>
+        </p:nvSpPr>
+        <p:spPr>
+          <a:xfrm>
+            <a:off x="2699792" y="2204864"/>
+            <a:ext cx="1192334" cy="369332"/>
+          </a:xfrm>
+          <a:prstGeom prst="rect">
+            <a:avLst/>
+          </a:prstGeom>
+          <a:noFill/>
+        </p:spPr>
+        <p:txBody>
+          <a:bodyPr wrap="square" rtlCol="0">
+            <a:spAutoFit/>
+          </a:bodyPr>
+          <a:lstStyle/>
+          <a:p>
+            <a:r>
+              <a:rPr lang="en-CA" b="1" dirty="0" smtClean="0"/>
+              <a:t>branch</a:t>
+            </a:r>
+            <a:endParaRPr lang="en-CA" b="1" dirty="0"/>
+          </a:p>
+        </p:txBody>
+      </p:sp>
+      <p:sp>
+        <p:nvSpPr>
+          <p:cNvPr id="21" name="TextBox 20"/>
+          <p:cNvSpPr txBox="1"/>
+          <p:nvPr/>
+        </p:nvSpPr>
+        <p:spPr>
+          <a:xfrm>
+            <a:off x="8276210" y="3987062"/>
+            <a:ext cx="760286" cy="369332"/>
+          </a:xfrm>
+          <a:prstGeom prst="rect">
+            <a:avLst/>
+          </a:prstGeom>
+          <a:noFill/>
+        </p:spPr>
+        <p:txBody>
+          <a:bodyPr wrap="square" rtlCol="0">
+            <a:spAutoFit/>
+          </a:bodyPr>
+          <a:lstStyle/>
+          <a:p>
+            <a:r>
+              <a:rPr lang="en-CA" b="1" dirty="0" smtClean="0"/>
+              <a:t>HEAD</a:t>
+            </a:r>
+            <a:endParaRPr lang="en-CA" b="1" dirty="0"/>
+          </a:p>
+        </p:txBody>
+      </p:sp>
+    </p:spTree>
+    <p:extLst>
+      <p:ext uri="{BB962C8B-B14F-4D97-AF65-F5344CB8AC3E}">
+        <p14:creationId xmlns:p14="http://schemas.microsoft.com/office/powerpoint/2010/main" val="2865281940"/>
+      </p:ext>
+    </p:extLst>
+  </p:cSld>
+  <p:clrMapOvr>
+    <a:masterClrMapping/>
+  </p:clrMapOvr>
+  <p:timing>
+    <p:tnLst>
+      <p:par>
+        <p:cTn id="1" dur="indefinite" restart="never" nodeType="tmRoot"/>
+      </p:par>
+    </p:tnLst>
+  </p:timing>
+</p:sld>
+</file>
+
 <file path=ppt/slides/slide2.xml><?xml version="1.0" encoding="utf-8"?>
 <p:sld xmlns:a="http://schemas.openxmlformats.org/drawingml/2006/main" xmlns:r="http://schemas.openxmlformats.org/officeDocument/2006/relationships" xmlns:p="http://schemas.openxmlformats.org/presentationml/2006/main">
   <p:cSld>
@@ -6935,666 +9831,14 @@
       </p:sp>
       <p:sp>
         <p:nvSpPr>
-          <p:cNvPr id="5" name="Rounded Rectangle 4"/>
-          <p:cNvSpPr/>
-          <p:nvPr/>
-        </p:nvSpPr>
-        <p:spPr>
-          <a:xfrm>
-            <a:off x="2231740" y="3158970"/>
-            <a:ext cx="1152128" cy="828092"/>
-          </a:xfrm>
-          <a:prstGeom prst="roundRect">
-            <a:avLst/>
-          </a:prstGeom>
-          <a:solidFill>
-            <a:schemeClr val="accent1">
-              <a:lumMod val="40000"/>
-              <a:lumOff val="60000"/>
-            </a:schemeClr>
-          </a:solidFill>
-        </p:spPr>
-        <p:style>
-          <a:lnRef idx="2">
-            <a:schemeClr val="accent1">
-              <a:shade val="50000"/>
-            </a:schemeClr>
-          </a:lnRef>
-          <a:fillRef idx="1">
-            <a:schemeClr val="accent1"/>
-          </a:fillRef>
-          <a:effectRef idx="0">
-            <a:schemeClr val="accent1"/>
-          </a:effectRef>
-          <a:fontRef idx="minor">
-            <a:schemeClr val="lt1"/>
-          </a:fontRef>
-        </p:style>
-        <p:txBody>
-          <a:bodyPr rtlCol="0" anchor="ctr"/>
-          <a:lstStyle/>
-          <a:p>
-            <a:pPr algn="ctr"/>
-            <a:r>
-              <a:rPr lang="en-CA" sz="1400" b="1" dirty="0" smtClean="0">
-                <a:solidFill>
-                  <a:schemeClr val="tx1"/>
-                </a:solidFill>
-                <a:latin typeface="Courier New" panose="02070309020205020404" pitchFamily="49" charset="0"/>
-                <a:cs typeface="Courier New" panose="02070309020205020404" pitchFamily="49" charset="0"/>
-              </a:rPr>
-              <a:t>fef4257</a:t>
-            </a:r>
-            <a:endParaRPr lang="en-CA" sz="1400" b="1" dirty="0">
-              <a:solidFill>
-                <a:schemeClr val="tx1"/>
-              </a:solidFill>
-              <a:latin typeface="Courier New" panose="02070309020205020404" pitchFamily="49" charset="0"/>
-              <a:cs typeface="Courier New" panose="02070309020205020404" pitchFamily="49" charset="0"/>
-            </a:endParaRPr>
-          </a:p>
-        </p:txBody>
-      </p:sp>
-      <p:sp>
-        <p:nvSpPr>
-          <p:cNvPr id="6" name="Rounded Rectangle 5"/>
-          <p:cNvSpPr/>
-          <p:nvPr/>
-        </p:nvSpPr>
-        <p:spPr>
-          <a:xfrm>
-            <a:off x="4139952" y="3158970"/>
-            <a:ext cx="1152128" cy="828092"/>
-          </a:xfrm>
-          <a:prstGeom prst="roundRect">
-            <a:avLst/>
-          </a:prstGeom>
-          <a:solidFill>
-            <a:schemeClr val="accent1">
-              <a:lumMod val="40000"/>
-              <a:lumOff val="60000"/>
-            </a:schemeClr>
-          </a:solidFill>
-        </p:spPr>
-        <p:style>
-          <a:lnRef idx="2">
-            <a:schemeClr val="accent1">
-              <a:shade val="50000"/>
-            </a:schemeClr>
-          </a:lnRef>
-          <a:fillRef idx="1">
-            <a:schemeClr val="accent1"/>
-          </a:fillRef>
-          <a:effectRef idx="0">
-            <a:schemeClr val="accent1"/>
-          </a:effectRef>
-          <a:fontRef idx="minor">
-            <a:schemeClr val="lt1"/>
-          </a:fontRef>
-        </p:style>
-        <p:txBody>
-          <a:bodyPr rtlCol="0" anchor="ctr"/>
-          <a:lstStyle/>
-          <a:p>
-            <a:pPr algn="ctr"/>
-            <a:r>
-              <a:rPr lang="en-CA" sz="1400" b="1" dirty="0" smtClean="0">
-                <a:solidFill>
-                  <a:schemeClr val="tx1"/>
-                </a:solidFill>
-                <a:latin typeface="Courier New" panose="02070309020205020404" pitchFamily="49" charset="0"/>
-                <a:cs typeface="Courier New" panose="02070309020205020404" pitchFamily="49" charset="0"/>
-              </a:rPr>
-              <a:t>d448487</a:t>
-            </a:r>
-            <a:endParaRPr lang="en-CA" sz="1400" b="1" dirty="0">
-              <a:solidFill>
-                <a:schemeClr val="tx1"/>
-              </a:solidFill>
-              <a:latin typeface="Courier New" panose="02070309020205020404" pitchFamily="49" charset="0"/>
-              <a:cs typeface="Courier New" panose="02070309020205020404" pitchFamily="49" charset="0"/>
-            </a:endParaRPr>
-          </a:p>
-        </p:txBody>
-      </p:sp>
-      <p:sp>
-        <p:nvSpPr>
-          <p:cNvPr id="7" name="Rounded Rectangle 6"/>
-          <p:cNvSpPr/>
-          <p:nvPr/>
-        </p:nvSpPr>
-        <p:spPr>
-          <a:xfrm>
-            <a:off x="6048164" y="3158970"/>
-            <a:ext cx="1152128" cy="828092"/>
-          </a:xfrm>
-          <a:prstGeom prst="roundRect">
-            <a:avLst/>
-          </a:prstGeom>
-          <a:solidFill>
-            <a:schemeClr val="accent1">
-              <a:lumMod val="40000"/>
-              <a:lumOff val="60000"/>
-            </a:schemeClr>
-          </a:solidFill>
-        </p:spPr>
-        <p:style>
-          <a:lnRef idx="2">
-            <a:schemeClr val="accent1">
-              <a:shade val="50000"/>
-            </a:schemeClr>
-          </a:lnRef>
-          <a:fillRef idx="1">
-            <a:schemeClr val="accent1"/>
-          </a:fillRef>
-          <a:effectRef idx="0">
-            <a:schemeClr val="accent1"/>
-          </a:effectRef>
-          <a:fontRef idx="minor">
-            <a:schemeClr val="lt1"/>
-          </a:fontRef>
-        </p:style>
-        <p:txBody>
-          <a:bodyPr rtlCol="0" anchor="ctr"/>
-          <a:lstStyle/>
-          <a:p>
-            <a:pPr algn="ctr"/>
-            <a:r>
-              <a:rPr lang="en-CA" sz="1400" b="1" dirty="0" smtClean="0">
-                <a:solidFill>
-                  <a:schemeClr val="tx1"/>
-                </a:solidFill>
-                <a:latin typeface="Courier New" panose="02070309020205020404" pitchFamily="49" charset="0"/>
-                <a:cs typeface="Courier New" panose="02070309020205020404" pitchFamily="49" charset="0"/>
-              </a:rPr>
-              <a:t>5565a92</a:t>
-            </a:r>
-            <a:endParaRPr lang="en-CA" sz="1400" b="1" dirty="0">
-              <a:solidFill>
-                <a:schemeClr val="tx1"/>
-              </a:solidFill>
-              <a:latin typeface="Courier New" panose="02070309020205020404" pitchFamily="49" charset="0"/>
-              <a:cs typeface="Courier New" panose="02070309020205020404" pitchFamily="49" charset="0"/>
-            </a:endParaRPr>
-          </a:p>
-        </p:txBody>
-      </p:sp>
-      <p:sp>
-        <p:nvSpPr>
-          <p:cNvPr id="8" name="Rounded Rectangle 7"/>
-          <p:cNvSpPr/>
-          <p:nvPr/>
-        </p:nvSpPr>
-        <p:spPr>
-          <a:xfrm>
-            <a:off x="4139952" y="1808820"/>
-            <a:ext cx="1152128" cy="828092"/>
-          </a:xfrm>
-          <a:prstGeom prst="roundRect">
-            <a:avLst/>
-          </a:prstGeom>
-          <a:solidFill>
-            <a:schemeClr val="accent1">
-              <a:lumMod val="40000"/>
-              <a:lumOff val="60000"/>
-            </a:schemeClr>
-          </a:solidFill>
-        </p:spPr>
-        <p:style>
-          <a:lnRef idx="2">
-            <a:schemeClr val="accent1">
-              <a:shade val="50000"/>
-            </a:schemeClr>
-          </a:lnRef>
-          <a:fillRef idx="1">
-            <a:schemeClr val="accent1"/>
-          </a:fillRef>
-          <a:effectRef idx="0">
-            <a:schemeClr val="accent1"/>
-          </a:effectRef>
-          <a:fontRef idx="minor">
-            <a:schemeClr val="lt1"/>
-          </a:fontRef>
-        </p:style>
-        <p:txBody>
-          <a:bodyPr rtlCol="0" anchor="ctr"/>
-          <a:lstStyle/>
-          <a:p>
-            <a:pPr algn="ctr"/>
-            <a:r>
-              <a:rPr lang="en-CA" sz="1400" b="1" dirty="0" smtClean="0">
-                <a:solidFill>
-                  <a:schemeClr val="tx1"/>
-                </a:solidFill>
-                <a:latin typeface="Courier New" panose="02070309020205020404" pitchFamily="49" charset="0"/>
-                <a:cs typeface="Courier New" panose="02070309020205020404" pitchFamily="49" charset="0"/>
-              </a:rPr>
-              <a:t>a5c64ca</a:t>
-            </a:r>
-            <a:endParaRPr lang="en-CA" sz="1400" b="1" dirty="0">
-              <a:solidFill>
-                <a:schemeClr val="tx1"/>
-              </a:solidFill>
-              <a:latin typeface="Courier New" panose="02070309020205020404" pitchFamily="49" charset="0"/>
-              <a:cs typeface="Courier New" panose="02070309020205020404" pitchFamily="49" charset="0"/>
-            </a:endParaRPr>
-          </a:p>
-        </p:txBody>
-      </p:sp>
-      <p:sp>
-        <p:nvSpPr>
-          <p:cNvPr id="9" name="Rounded Rectangle 8"/>
-          <p:cNvSpPr/>
-          <p:nvPr/>
-        </p:nvSpPr>
-        <p:spPr>
-          <a:xfrm>
-            <a:off x="6012160" y="1808820"/>
-            <a:ext cx="1152128" cy="828092"/>
-          </a:xfrm>
-          <a:prstGeom prst="roundRect">
-            <a:avLst/>
-          </a:prstGeom>
-          <a:solidFill>
-            <a:schemeClr val="accent1">
-              <a:lumMod val="40000"/>
-              <a:lumOff val="60000"/>
-            </a:schemeClr>
-          </a:solidFill>
-        </p:spPr>
-        <p:style>
-          <a:lnRef idx="2">
-            <a:schemeClr val="accent1">
-              <a:shade val="50000"/>
-            </a:schemeClr>
-          </a:lnRef>
-          <a:fillRef idx="1">
-            <a:schemeClr val="accent1"/>
-          </a:fillRef>
-          <a:effectRef idx="0">
-            <a:schemeClr val="accent1"/>
-          </a:effectRef>
-          <a:fontRef idx="minor">
-            <a:schemeClr val="lt1"/>
-          </a:fontRef>
-        </p:style>
-        <p:txBody>
-          <a:bodyPr rtlCol="0" anchor="ctr"/>
-          <a:lstStyle/>
-          <a:p>
-            <a:pPr algn="ctr"/>
-            <a:r>
-              <a:rPr lang="en-CA" sz="1400" b="1" dirty="0" smtClean="0">
-                <a:solidFill>
-                  <a:schemeClr val="tx1"/>
-                </a:solidFill>
-                <a:latin typeface="Courier New" panose="02070309020205020404" pitchFamily="49" charset="0"/>
-                <a:cs typeface="Courier New" panose="02070309020205020404" pitchFamily="49" charset="0"/>
-              </a:rPr>
-              <a:t>fb0e936</a:t>
-            </a:r>
-            <a:endParaRPr lang="en-CA" sz="1400" b="1" dirty="0">
-              <a:solidFill>
-                <a:schemeClr val="tx1"/>
-              </a:solidFill>
-              <a:latin typeface="Courier New" panose="02070309020205020404" pitchFamily="49" charset="0"/>
-              <a:cs typeface="Courier New" panose="02070309020205020404" pitchFamily="49" charset="0"/>
-            </a:endParaRPr>
-          </a:p>
-        </p:txBody>
-      </p:sp>
-      <p:sp>
-        <p:nvSpPr>
-          <p:cNvPr id="10" name="Rounded Rectangle 9"/>
-          <p:cNvSpPr/>
-          <p:nvPr/>
-        </p:nvSpPr>
-        <p:spPr>
-          <a:xfrm>
-            <a:off x="7956376" y="3158970"/>
-            <a:ext cx="1152128" cy="828092"/>
-          </a:xfrm>
-          <a:prstGeom prst="roundRect">
-            <a:avLst/>
-          </a:prstGeom>
-          <a:solidFill>
-            <a:schemeClr val="accent1">
-              <a:lumMod val="40000"/>
-              <a:lumOff val="60000"/>
-            </a:schemeClr>
-          </a:solidFill>
-        </p:spPr>
-        <p:style>
-          <a:lnRef idx="2">
-            <a:schemeClr val="accent1">
-              <a:shade val="50000"/>
-            </a:schemeClr>
-          </a:lnRef>
-          <a:fillRef idx="1">
-            <a:schemeClr val="accent1"/>
-          </a:fillRef>
-          <a:effectRef idx="0">
-            <a:schemeClr val="accent1"/>
-          </a:effectRef>
-          <a:fontRef idx="minor">
-            <a:schemeClr val="lt1"/>
-          </a:fontRef>
-        </p:style>
-        <p:txBody>
-          <a:bodyPr rtlCol="0" anchor="ctr"/>
-          <a:lstStyle/>
-          <a:p>
-            <a:pPr algn="ctr"/>
-            <a:r>
-              <a:rPr lang="en-CA" sz="1400" b="1" dirty="0" smtClean="0">
-                <a:solidFill>
-                  <a:schemeClr val="tx1"/>
-                </a:solidFill>
-                <a:latin typeface="Courier New" panose="02070309020205020404" pitchFamily="49" charset="0"/>
-                <a:cs typeface="Courier New" panose="02070309020205020404" pitchFamily="49" charset="0"/>
-              </a:rPr>
-              <a:t>96e1c1b</a:t>
-            </a:r>
-            <a:endParaRPr lang="en-CA" sz="1400" b="1" dirty="0">
-              <a:solidFill>
-                <a:schemeClr val="tx1"/>
-              </a:solidFill>
-              <a:latin typeface="Courier New" panose="02070309020205020404" pitchFamily="49" charset="0"/>
-              <a:cs typeface="Courier New" panose="02070309020205020404" pitchFamily="49" charset="0"/>
-            </a:endParaRPr>
-          </a:p>
-        </p:txBody>
-      </p:sp>
-      <p:sp>
-        <p:nvSpPr>
-          <p:cNvPr id="11" name="Right Arrow 10"/>
-          <p:cNvSpPr/>
-          <p:nvPr/>
-        </p:nvSpPr>
-        <p:spPr>
-          <a:xfrm>
-            <a:off x="1619672" y="3429000"/>
-            <a:ext cx="504056" cy="216024"/>
-          </a:xfrm>
-          <a:prstGeom prst="rightArrow">
-            <a:avLst/>
-          </a:prstGeom>
-        </p:spPr>
-        <p:style>
-          <a:lnRef idx="2">
-            <a:schemeClr val="accent1">
-              <a:shade val="50000"/>
-            </a:schemeClr>
-          </a:lnRef>
-          <a:fillRef idx="1">
-            <a:schemeClr val="accent1"/>
-          </a:fillRef>
-          <a:effectRef idx="0">
-            <a:schemeClr val="accent1"/>
-          </a:effectRef>
-          <a:fontRef idx="minor">
-            <a:schemeClr val="lt1"/>
-          </a:fontRef>
-        </p:style>
-        <p:txBody>
-          <a:bodyPr rtlCol="0" anchor="ctr"/>
-          <a:lstStyle/>
-          <a:p>
-            <a:pPr algn="ctr"/>
-            <a:endParaRPr lang="en-CA"/>
-          </a:p>
-        </p:txBody>
-      </p:sp>
-      <p:sp>
-        <p:nvSpPr>
-          <p:cNvPr id="12" name="Right Arrow 11"/>
-          <p:cNvSpPr/>
-          <p:nvPr/>
-        </p:nvSpPr>
-        <p:spPr>
-          <a:xfrm>
-            <a:off x="3491880" y="3429000"/>
-            <a:ext cx="504056" cy="216024"/>
-          </a:xfrm>
-          <a:prstGeom prst="rightArrow">
-            <a:avLst/>
-          </a:prstGeom>
-        </p:spPr>
-        <p:style>
-          <a:lnRef idx="2">
-            <a:schemeClr val="accent1">
-              <a:shade val="50000"/>
-            </a:schemeClr>
-          </a:lnRef>
-          <a:fillRef idx="1">
-            <a:schemeClr val="accent1"/>
-          </a:fillRef>
-          <a:effectRef idx="0">
-            <a:schemeClr val="accent1"/>
-          </a:effectRef>
-          <a:fontRef idx="minor">
-            <a:schemeClr val="lt1"/>
-          </a:fontRef>
-        </p:style>
-        <p:txBody>
-          <a:bodyPr rtlCol="0" anchor="ctr"/>
-          <a:lstStyle/>
-          <a:p>
-            <a:pPr algn="ctr"/>
-            <a:endParaRPr lang="en-CA"/>
-          </a:p>
-        </p:txBody>
-      </p:sp>
-      <p:sp>
-        <p:nvSpPr>
-          <p:cNvPr id="13" name="Right Arrow 12"/>
-          <p:cNvSpPr/>
-          <p:nvPr/>
-        </p:nvSpPr>
-        <p:spPr>
-          <a:xfrm>
-            <a:off x="5436096" y="3501008"/>
-            <a:ext cx="504056" cy="216024"/>
-          </a:xfrm>
-          <a:prstGeom prst="rightArrow">
-            <a:avLst/>
-          </a:prstGeom>
-        </p:spPr>
-        <p:style>
-          <a:lnRef idx="2">
-            <a:schemeClr val="accent1">
-              <a:shade val="50000"/>
-            </a:schemeClr>
-          </a:lnRef>
-          <a:fillRef idx="1">
-            <a:schemeClr val="accent1"/>
-          </a:fillRef>
-          <a:effectRef idx="0">
-            <a:schemeClr val="accent1"/>
-          </a:effectRef>
-          <a:fontRef idx="minor">
-            <a:schemeClr val="lt1"/>
-          </a:fontRef>
-        </p:style>
-        <p:txBody>
-          <a:bodyPr rtlCol="0" anchor="ctr"/>
-          <a:lstStyle/>
-          <a:p>
-            <a:pPr algn="ctr"/>
-            <a:endParaRPr lang="en-CA"/>
-          </a:p>
-        </p:txBody>
-      </p:sp>
-      <p:sp>
-        <p:nvSpPr>
-          <p:cNvPr id="14" name="Right Arrow 13"/>
-          <p:cNvSpPr/>
-          <p:nvPr/>
-        </p:nvSpPr>
-        <p:spPr>
-          <a:xfrm>
-            <a:off x="7380312" y="3501008"/>
-            <a:ext cx="504056" cy="216024"/>
-          </a:xfrm>
-          <a:prstGeom prst="rightArrow">
-            <a:avLst/>
-          </a:prstGeom>
-        </p:spPr>
-        <p:style>
-          <a:lnRef idx="2">
-            <a:schemeClr val="accent1">
-              <a:shade val="50000"/>
-            </a:schemeClr>
-          </a:lnRef>
-          <a:fillRef idx="1">
-            <a:schemeClr val="accent1"/>
-          </a:fillRef>
-          <a:effectRef idx="0">
-            <a:schemeClr val="accent1"/>
-          </a:effectRef>
-          <a:fontRef idx="minor">
-            <a:schemeClr val="lt1"/>
-          </a:fontRef>
-        </p:style>
-        <p:txBody>
-          <a:bodyPr rtlCol="0" anchor="ctr"/>
-          <a:lstStyle/>
-          <a:p>
-            <a:pPr algn="ctr"/>
-            <a:endParaRPr lang="en-CA"/>
-          </a:p>
-        </p:txBody>
-      </p:sp>
-      <p:sp>
-        <p:nvSpPr>
-          <p:cNvPr id="15" name="Right Arrow 14"/>
-          <p:cNvSpPr/>
-          <p:nvPr/>
-        </p:nvSpPr>
-        <p:spPr>
-          <a:xfrm>
-            <a:off x="5436096" y="2168860"/>
-            <a:ext cx="504056" cy="216024"/>
-          </a:xfrm>
-          <a:prstGeom prst="rightArrow">
-            <a:avLst/>
-          </a:prstGeom>
-        </p:spPr>
-        <p:style>
-          <a:lnRef idx="2">
-            <a:schemeClr val="accent1">
-              <a:shade val="50000"/>
-            </a:schemeClr>
-          </a:lnRef>
-          <a:fillRef idx="1">
-            <a:schemeClr val="accent1"/>
-          </a:fillRef>
-          <a:effectRef idx="0">
-            <a:schemeClr val="accent1"/>
-          </a:effectRef>
-          <a:fontRef idx="minor">
-            <a:schemeClr val="lt1"/>
-          </a:fontRef>
-        </p:style>
-        <p:txBody>
-          <a:bodyPr rtlCol="0" anchor="ctr"/>
-          <a:lstStyle/>
-          <a:p>
-            <a:pPr algn="ctr"/>
-            <a:endParaRPr lang="en-CA"/>
-          </a:p>
-        </p:txBody>
-      </p:sp>
-      <p:sp>
-        <p:nvSpPr>
-          <p:cNvPr id="16" name="Right Arrow 15"/>
-          <p:cNvSpPr/>
-          <p:nvPr/>
-        </p:nvSpPr>
-        <p:spPr>
-          <a:xfrm rot="19044843">
-            <a:off x="3413249" y="2638868"/>
-            <a:ext cx="504056" cy="216024"/>
-          </a:xfrm>
-          <a:prstGeom prst="rightArrow">
-            <a:avLst/>
-          </a:prstGeom>
-        </p:spPr>
-        <p:style>
-          <a:lnRef idx="2">
-            <a:schemeClr val="accent1">
-              <a:shade val="50000"/>
-            </a:schemeClr>
-          </a:lnRef>
-          <a:fillRef idx="1">
-            <a:schemeClr val="accent1"/>
-          </a:fillRef>
-          <a:effectRef idx="0">
-            <a:schemeClr val="accent1"/>
-          </a:effectRef>
-          <a:fontRef idx="minor">
-            <a:schemeClr val="lt1"/>
-          </a:fontRef>
-        </p:style>
-        <p:txBody>
-          <a:bodyPr rtlCol="0" anchor="ctr"/>
-          <a:lstStyle/>
-          <a:p>
-            <a:pPr algn="ctr"/>
-            <a:endParaRPr lang="en-CA"/>
-          </a:p>
-        </p:txBody>
-      </p:sp>
-      <p:sp>
-        <p:nvSpPr>
-          <p:cNvPr id="17" name="Right Arrow 16"/>
-          <p:cNvSpPr/>
-          <p:nvPr/>
-        </p:nvSpPr>
-        <p:spPr>
-          <a:xfrm rot="2912051">
-            <a:off x="7448118" y="2645265"/>
-            <a:ext cx="504056" cy="216024"/>
-          </a:xfrm>
-          <a:prstGeom prst="rightArrow">
-            <a:avLst/>
-          </a:prstGeom>
-        </p:spPr>
-        <p:style>
-          <a:lnRef idx="2">
-            <a:schemeClr val="accent1">
-              <a:shade val="50000"/>
-            </a:schemeClr>
-          </a:lnRef>
-          <a:fillRef idx="1">
-            <a:schemeClr val="accent1"/>
-          </a:fillRef>
-          <a:effectRef idx="0">
-            <a:schemeClr val="accent1"/>
-          </a:effectRef>
-          <a:fontRef idx="minor">
-            <a:schemeClr val="lt1"/>
-          </a:fontRef>
-        </p:style>
-        <p:txBody>
-          <a:bodyPr rtlCol="0" anchor="ctr"/>
-          <a:lstStyle/>
-          <a:p>
-            <a:pPr algn="ctr"/>
-            <a:endParaRPr lang="en-CA"/>
-          </a:p>
-        </p:txBody>
-      </p:sp>
-      <p:sp>
-        <p:nvSpPr>
-          <p:cNvPr id="18" name="TextBox 17"/>
+          <p:cNvPr id="21" name="TextBox 20"/>
           <p:cNvSpPr txBox="1"/>
           <p:nvPr/>
         </p:nvSpPr>
         <p:spPr>
           <a:xfrm>
-            <a:off x="7812360" y="2195572"/>
-            <a:ext cx="1192334" cy="369332"/>
+            <a:off x="519449" y="3987062"/>
+            <a:ext cx="760286" cy="369332"/>
           </a:xfrm>
           <a:prstGeom prst="rect">
             <a:avLst/>
@@ -7609,66 +9853,6 @@
           <a:p>
             <a:r>
               <a:rPr lang="en-CA" b="1" dirty="0" smtClean="0"/>
-              <a:t>merge</a:t>
-            </a:r>
-            <a:endParaRPr lang="en-CA" b="1" dirty="0"/>
-          </a:p>
-        </p:txBody>
-      </p:sp>
-      <p:sp>
-        <p:nvSpPr>
-          <p:cNvPr id="19" name="TextBox 18"/>
-          <p:cNvSpPr txBox="1"/>
-          <p:nvPr/>
-        </p:nvSpPr>
-        <p:spPr>
-          <a:xfrm>
-            <a:off x="2699792" y="2204864"/>
-            <a:ext cx="1192334" cy="369332"/>
-          </a:xfrm>
-          <a:prstGeom prst="rect">
-            <a:avLst/>
-          </a:prstGeom>
-          <a:noFill/>
-        </p:spPr>
-        <p:txBody>
-          <a:bodyPr wrap="square" rtlCol="0">
-            <a:spAutoFit/>
-          </a:bodyPr>
-          <a:lstStyle/>
-          <a:p>
-            <a:r>
-              <a:rPr lang="en-CA" b="1" dirty="0" smtClean="0"/>
-              <a:t>branch</a:t>
-            </a:r>
-            <a:endParaRPr lang="en-CA" b="1" dirty="0"/>
-          </a:p>
-        </p:txBody>
-      </p:sp>
-      <p:sp>
-        <p:nvSpPr>
-          <p:cNvPr id="21" name="TextBox 20"/>
-          <p:cNvSpPr txBox="1"/>
-          <p:nvPr/>
-        </p:nvSpPr>
-        <p:spPr>
-          <a:xfrm>
-            <a:off x="8276210" y="4149080"/>
-            <a:ext cx="760286" cy="369332"/>
-          </a:xfrm>
-          <a:prstGeom prst="rect">
-            <a:avLst/>
-          </a:prstGeom>
-          <a:noFill/>
-        </p:spPr>
-        <p:txBody>
-          <a:bodyPr wrap="square" rtlCol="0">
-            <a:spAutoFit/>
-          </a:bodyPr>
-          <a:lstStyle/>
-          <a:p>
-            <a:r>
-              <a:rPr lang="en-CA" b="1" dirty="0" smtClean="0"/>
               <a:t>HEAD</a:t>
             </a:r>
             <a:endParaRPr lang="en-CA" b="1" dirty="0"/>
@@ -7678,7 +9862,7 @@
     </p:spTree>
     <p:extLst>
       <p:ext uri="{BB962C8B-B14F-4D97-AF65-F5344CB8AC3E}">
-        <p14:creationId xmlns:p14="http://schemas.microsoft.com/office/powerpoint/2010/main" val="2865281940"/>
+        <p14:creationId xmlns:p14="http://schemas.microsoft.com/office/powerpoint/2010/main" val="1623644418"/>
       </p:ext>
     </p:extLst>
   </p:cSld>
@@ -7776,13 +9960,115 @@
       </p:sp>
       <p:sp>
         <p:nvSpPr>
+          <p:cNvPr id="5" name="Rounded Rectangle 4"/>
+          <p:cNvSpPr/>
+          <p:nvPr/>
+        </p:nvSpPr>
+        <p:spPr>
+          <a:xfrm>
+            <a:off x="2231740" y="3158970"/>
+            <a:ext cx="1152128" cy="828092"/>
+          </a:xfrm>
+          <a:prstGeom prst="roundRect">
+            <a:avLst/>
+          </a:prstGeom>
+          <a:solidFill>
+            <a:schemeClr val="accent1">
+              <a:lumMod val="40000"/>
+              <a:lumOff val="60000"/>
+            </a:schemeClr>
+          </a:solidFill>
+        </p:spPr>
+        <p:style>
+          <a:lnRef idx="2">
+            <a:schemeClr val="accent1">
+              <a:shade val="50000"/>
+            </a:schemeClr>
+          </a:lnRef>
+          <a:fillRef idx="1">
+            <a:schemeClr val="accent1"/>
+          </a:fillRef>
+          <a:effectRef idx="0">
+            <a:schemeClr val="accent1"/>
+          </a:effectRef>
+          <a:fontRef idx="minor">
+            <a:schemeClr val="lt1"/>
+          </a:fontRef>
+        </p:style>
+        <p:txBody>
+          <a:bodyPr rtlCol="0" anchor="ctr"/>
+          <a:lstStyle/>
+          <a:p>
+            <a:pPr algn="ctr"/>
+            <a:r>
+              <a:rPr lang="en-CA" sz="1400" b="1" dirty="0" smtClean="0">
+                <a:solidFill>
+                  <a:schemeClr val="tx1"/>
+                </a:solidFill>
+                <a:latin typeface="Courier New" panose="02070309020205020404" pitchFamily="49" charset="0"/>
+                <a:cs typeface="Courier New" panose="02070309020205020404" pitchFamily="49" charset="0"/>
+              </a:rPr>
+              <a:t>fef4257</a:t>
+            </a:r>
+            <a:endParaRPr lang="en-CA" sz="1400" b="1" dirty="0">
+              <a:solidFill>
+                <a:schemeClr val="tx1"/>
+              </a:solidFill>
+              <a:latin typeface="Courier New" panose="02070309020205020404" pitchFamily="49" charset="0"/>
+              <a:cs typeface="Courier New" panose="02070309020205020404" pitchFamily="49" charset="0"/>
+            </a:endParaRPr>
+          </a:p>
+        </p:txBody>
+      </p:sp>
+      <p:sp>
+        <p:nvSpPr>
+          <p:cNvPr id="11" name="Right Arrow 10"/>
+          <p:cNvSpPr/>
+          <p:nvPr/>
+        </p:nvSpPr>
+        <p:spPr>
+          <a:xfrm>
+            <a:off x="1619672" y="3429000"/>
+            <a:ext cx="504056" cy="216024"/>
+          </a:xfrm>
+          <a:prstGeom prst="rightArrow">
+            <a:avLst/>
+          </a:prstGeom>
+        </p:spPr>
+        <p:style>
+          <a:lnRef idx="2">
+            <a:schemeClr val="accent1">
+              <a:shade val="50000"/>
+            </a:schemeClr>
+          </a:lnRef>
+          <a:fillRef idx="1">
+            <a:schemeClr val="accent1"/>
+          </a:fillRef>
+          <a:effectRef idx="0">
+            <a:schemeClr val="accent1"/>
+          </a:effectRef>
+          <a:fontRef idx="minor">
+            <a:schemeClr val="lt1"/>
+          </a:fontRef>
+        </p:style>
+        <p:txBody>
+          <a:bodyPr rtlCol="0" anchor="ctr"/>
+          <a:lstStyle/>
+          <a:p>
+            <a:pPr algn="ctr"/>
+            <a:endParaRPr lang="en-CA"/>
+          </a:p>
+        </p:txBody>
+      </p:sp>
+      <p:sp>
+        <p:nvSpPr>
           <p:cNvPr id="21" name="TextBox 20"/>
           <p:cNvSpPr txBox="1"/>
           <p:nvPr/>
         </p:nvSpPr>
         <p:spPr>
           <a:xfrm>
-            <a:off x="519449" y="4149080"/>
+            <a:off x="2427661" y="3987062"/>
             <a:ext cx="760286" cy="369332"/>
           </a:xfrm>
           <a:prstGeom prst="rect">
@@ -7807,7 +10093,340 @@
     </p:spTree>
     <p:extLst>
       <p:ext uri="{BB962C8B-B14F-4D97-AF65-F5344CB8AC3E}">
-        <p14:creationId xmlns:p14="http://schemas.microsoft.com/office/powerpoint/2010/main" val="1623644418"/>
+        <p14:creationId xmlns:p14="http://schemas.microsoft.com/office/powerpoint/2010/main" val="3448473004"/>
+      </p:ext>
+    </p:extLst>
+  </p:cSld>
+  <p:clrMapOvr>
+    <a:masterClrMapping/>
+  </p:clrMapOvr>
+  <p:timing>
+    <p:tnLst>
+      <p:par>
+        <p:cTn id="1" dur="indefinite" restart="never" nodeType="tmRoot"/>
+      </p:par>
+    </p:tnLst>
+  </p:timing>
+</p:sld>
+</file>
+
+<file path=ppt/slides/slide9.xml><?xml version="1.0" encoding="utf-8"?>
+<p:sld xmlns:a="http://schemas.openxmlformats.org/drawingml/2006/main" xmlns:r="http://schemas.openxmlformats.org/officeDocument/2006/relationships" xmlns:p="http://schemas.openxmlformats.org/presentationml/2006/main">
+  <p:cSld>
+    <p:spTree>
+      <p:nvGrpSpPr>
+        <p:cNvPr id="1" name=""/>
+        <p:cNvGrpSpPr/>
+        <p:nvPr/>
+      </p:nvGrpSpPr>
+      <p:grpSpPr>
+        <a:xfrm>
+          <a:off x="0" y="0"/>
+          <a:ext cx="0" cy="0"/>
+          <a:chOff x="0" y="0"/>
+          <a:chExt cx="0" cy="0"/>
+        </a:xfrm>
+      </p:grpSpPr>
+      <p:sp>
+        <p:nvSpPr>
+          <p:cNvPr id="4" name="Rounded Rectangle 3"/>
+          <p:cNvSpPr/>
+          <p:nvPr/>
+        </p:nvSpPr>
+        <p:spPr>
+          <a:xfrm>
+            <a:off x="323528" y="3158970"/>
+            <a:ext cx="1152128" cy="828092"/>
+          </a:xfrm>
+          <a:prstGeom prst="roundRect">
+            <a:avLst/>
+          </a:prstGeom>
+          <a:solidFill>
+            <a:schemeClr val="accent1">
+              <a:lumMod val="40000"/>
+              <a:lumOff val="60000"/>
+            </a:schemeClr>
+          </a:solidFill>
+        </p:spPr>
+        <p:style>
+          <a:lnRef idx="2">
+            <a:schemeClr val="accent1">
+              <a:shade val="50000"/>
+            </a:schemeClr>
+          </a:lnRef>
+          <a:fillRef idx="1">
+            <a:schemeClr val="accent1"/>
+          </a:fillRef>
+          <a:effectRef idx="0">
+            <a:schemeClr val="accent1"/>
+          </a:effectRef>
+          <a:fontRef idx="minor">
+            <a:schemeClr val="lt1"/>
+          </a:fontRef>
+        </p:style>
+        <p:txBody>
+          <a:bodyPr rtlCol="0" anchor="ctr"/>
+          <a:lstStyle/>
+          <a:p>
+            <a:pPr algn="ctr"/>
+            <a:r>
+              <a:rPr lang="en-CA" sz="1400" b="1" dirty="0" smtClean="0">
+                <a:solidFill>
+                  <a:schemeClr val="tx1"/>
+                </a:solidFill>
+                <a:latin typeface="Courier New" panose="02070309020205020404" pitchFamily="49" charset="0"/>
+                <a:cs typeface="Courier New" panose="02070309020205020404" pitchFamily="49" charset="0"/>
+              </a:rPr>
+              <a:t>2eabdd2</a:t>
+            </a:r>
+            <a:endParaRPr lang="en-CA" sz="1400" b="1" dirty="0">
+              <a:solidFill>
+                <a:schemeClr val="tx1"/>
+              </a:solidFill>
+              <a:latin typeface="Courier New" panose="02070309020205020404" pitchFamily="49" charset="0"/>
+              <a:cs typeface="Courier New" panose="02070309020205020404" pitchFamily="49" charset="0"/>
+            </a:endParaRPr>
+          </a:p>
+        </p:txBody>
+      </p:sp>
+      <p:sp>
+        <p:nvSpPr>
+          <p:cNvPr id="5" name="Rounded Rectangle 4"/>
+          <p:cNvSpPr/>
+          <p:nvPr/>
+        </p:nvSpPr>
+        <p:spPr>
+          <a:xfrm>
+            <a:off x="2231740" y="3158970"/>
+            <a:ext cx="1152128" cy="828092"/>
+          </a:xfrm>
+          <a:prstGeom prst="roundRect">
+            <a:avLst/>
+          </a:prstGeom>
+          <a:solidFill>
+            <a:schemeClr val="accent1">
+              <a:lumMod val="40000"/>
+              <a:lumOff val="60000"/>
+            </a:schemeClr>
+          </a:solidFill>
+        </p:spPr>
+        <p:style>
+          <a:lnRef idx="2">
+            <a:schemeClr val="accent1">
+              <a:shade val="50000"/>
+            </a:schemeClr>
+          </a:lnRef>
+          <a:fillRef idx="1">
+            <a:schemeClr val="accent1"/>
+          </a:fillRef>
+          <a:effectRef idx="0">
+            <a:schemeClr val="accent1"/>
+          </a:effectRef>
+          <a:fontRef idx="minor">
+            <a:schemeClr val="lt1"/>
+          </a:fontRef>
+        </p:style>
+        <p:txBody>
+          <a:bodyPr rtlCol="0" anchor="ctr"/>
+          <a:lstStyle/>
+          <a:p>
+            <a:pPr algn="ctr"/>
+            <a:r>
+              <a:rPr lang="en-CA" sz="1400" b="1" dirty="0" smtClean="0">
+                <a:solidFill>
+                  <a:schemeClr val="tx1"/>
+                </a:solidFill>
+                <a:latin typeface="Courier New" panose="02070309020205020404" pitchFamily="49" charset="0"/>
+                <a:cs typeface="Courier New" panose="02070309020205020404" pitchFamily="49" charset="0"/>
+              </a:rPr>
+              <a:t>fef4257</a:t>
+            </a:r>
+            <a:endParaRPr lang="en-CA" sz="1400" b="1" dirty="0">
+              <a:solidFill>
+                <a:schemeClr val="tx1"/>
+              </a:solidFill>
+              <a:latin typeface="Courier New" panose="02070309020205020404" pitchFamily="49" charset="0"/>
+              <a:cs typeface="Courier New" panose="02070309020205020404" pitchFamily="49" charset="0"/>
+            </a:endParaRPr>
+          </a:p>
+        </p:txBody>
+      </p:sp>
+      <p:sp>
+        <p:nvSpPr>
+          <p:cNvPr id="6" name="Rounded Rectangle 5"/>
+          <p:cNvSpPr/>
+          <p:nvPr/>
+        </p:nvSpPr>
+        <p:spPr>
+          <a:xfrm>
+            <a:off x="4139952" y="3158970"/>
+            <a:ext cx="1152128" cy="828092"/>
+          </a:xfrm>
+          <a:prstGeom prst="roundRect">
+            <a:avLst/>
+          </a:prstGeom>
+          <a:solidFill>
+            <a:schemeClr val="accent1">
+              <a:lumMod val="40000"/>
+              <a:lumOff val="60000"/>
+            </a:schemeClr>
+          </a:solidFill>
+        </p:spPr>
+        <p:style>
+          <a:lnRef idx="2">
+            <a:schemeClr val="accent1">
+              <a:shade val="50000"/>
+            </a:schemeClr>
+          </a:lnRef>
+          <a:fillRef idx="1">
+            <a:schemeClr val="accent1"/>
+          </a:fillRef>
+          <a:effectRef idx="0">
+            <a:schemeClr val="accent1"/>
+          </a:effectRef>
+          <a:fontRef idx="minor">
+            <a:schemeClr val="lt1"/>
+          </a:fontRef>
+        </p:style>
+        <p:txBody>
+          <a:bodyPr rtlCol="0" anchor="ctr"/>
+          <a:lstStyle/>
+          <a:p>
+            <a:pPr algn="ctr"/>
+            <a:r>
+              <a:rPr lang="en-CA" sz="1400" b="1" dirty="0" smtClean="0">
+                <a:solidFill>
+                  <a:schemeClr val="tx1"/>
+                </a:solidFill>
+                <a:latin typeface="Courier New" panose="02070309020205020404" pitchFamily="49" charset="0"/>
+                <a:cs typeface="Courier New" panose="02070309020205020404" pitchFamily="49" charset="0"/>
+              </a:rPr>
+              <a:t>d448487</a:t>
+            </a:r>
+            <a:endParaRPr lang="en-CA" sz="1400" b="1" dirty="0">
+              <a:solidFill>
+                <a:schemeClr val="tx1"/>
+              </a:solidFill>
+              <a:latin typeface="Courier New" panose="02070309020205020404" pitchFamily="49" charset="0"/>
+              <a:cs typeface="Courier New" panose="02070309020205020404" pitchFamily="49" charset="0"/>
+            </a:endParaRPr>
+          </a:p>
+        </p:txBody>
+      </p:sp>
+      <p:sp>
+        <p:nvSpPr>
+          <p:cNvPr id="11" name="Right Arrow 10"/>
+          <p:cNvSpPr/>
+          <p:nvPr/>
+        </p:nvSpPr>
+        <p:spPr>
+          <a:xfrm>
+            <a:off x="1619672" y="3429000"/>
+            <a:ext cx="504056" cy="216024"/>
+          </a:xfrm>
+          <a:prstGeom prst="rightArrow">
+            <a:avLst/>
+          </a:prstGeom>
+        </p:spPr>
+        <p:style>
+          <a:lnRef idx="2">
+            <a:schemeClr val="accent1">
+              <a:shade val="50000"/>
+            </a:schemeClr>
+          </a:lnRef>
+          <a:fillRef idx="1">
+            <a:schemeClr val="accent1"/>
+          </a:fillRef>
+          <a:effectRef idx="0">
+            <a:schemeClr val="accent1"/>
+          </a:effectRef>
+          <a:fontRef idx="minor">
+            <a:schemeClr val="lt1"/>
+          </a:fontRef>
+        </p:style>
+        <p:txBody>
+          <a:bodyPr rtlCol="0" anchor="ctr"/>
+          <a:lstStyle/>
+          <a:p>
+            <a:pPr algn="ctr"/>
+            <a:endParaRPr lang="en-CA"/>
+          </a:p>
+        </p:txBody>
+      </p:sp>
+      <p:sp>
+        <p:nvSpPr>
+          <p:cNvPr id="12" name="Right Arrow 11"/>
+          <p:cNvSpPr/>
+          <p:nvPr/>
+        </p:nvSpPr>
+        <p:spPr>
+          <a:xfrm>
+            <a:off x="3491880" y="3429000"/>
+            <a:ext cx="504056" cy="216024"/>
+          </a:xfrm>
+          <a:prstGeom prst="rightArrow">
+            <a:avLst/>
+          </a:prstGeom>
+        </p:spPr>
+        <p:style>
+          <a:lnRef idx="2">
+            <a:schemeClr val="accent1">
+              <a:shade val="50000"/>
+            </a:schemeClr>
+          </a:lnRef>
+          <a:fillRef idx="1">
+            <a:schemeClr val="accent1"/>
+          </a:fillRef>
+          <a:effectRef idx="0">
+            <a:schemeClr val="accent1"/>
+          </a:effectRef>
+          <a:fontRef idx="minor">
+            <a:schemeClr val="lt1"/>
+          </a:fontRef>
+        </p:style>
+        <p:txBody>
+          <a:bodyPr rtlCol="0" anchor="ctr"/>
+          <a:lstStyle/>
+          <a:p>
+            <a:pPr algn="ctr"/>
+            <a:endParaRPr lang="en-CA"/>
+          </a:p>
+        </p:txBody>
+      </p:sp>
+      <p:sp>
+        <p:nvSpPr>
+          <p:cNvPr id="21" name="TextBox 20"/>
+          <p:cNvSpPr txBox="1"/>
+          <p:nvPr/>
+        </p:nvSpPr>
+        <p:spPr>
+          <a:xfrm>
+            <a:off x="4335873" y="3989145"/>
+            <a:ext cx="760286" cy="369332"/>
+          </a:xfrm>
+          <a:prstGeom prst="rect">
+            <a:avLst/>
+          </a:prstGeom>
+          <a:noFill/>
+        </p:spPr>
+        <p:txBody>
+          <a:bodyPr wrap="square" rtlCol="0">
+            <a:spAutoFit/>
+          </a:bodyPr>
+          <a:lstStyle/>
+          <a:p>
+            <a:r>
+              <a:rPr lang="en-CA" b="1" dirty="0" smtClean="0"/>
+              <a:t>HEAD</a:t>
+            </a:r>
+            <a:endParaRPr lang="en-CA" b="1" dirty="0"/>
+          </a:p>
+        </p:txBody>
+      </p:sp>
+    </p:spTree>
+    <p:extLst>
+      <p:ext uri="{BB962C8B-B14F-4D97-AF65-F5344CB8AC3E}">
+        <p14:creationId xmlns:p14="http://schemas.microsoft.com/office/powerpoint/2010/main" val="3884441461"/>
       </p:ext>
     </p:extLst>
   </p:cSld>

</xml_diff>

<commit_message>
Final updates to presentations.
Populated recap slides and animated points where appropriate/possible.
</commit_message>
<xml_diff>
--- a/PresentationFigures.pptx
+++ b/PresentationFigures.pptx
@@ -19,9 +19,10 @@
     <p:sldId id="268" r:id="rId13"/>
     <p:sldId id="269" r:id="rId14"/>
     <p:sldId id="262" r:id="rId15"/>
+    <p:sldId id="270" r:id="rId16"/>
   </p:sldIdLst>
   <p:sldSz cx="9144000" cy="6858000" type="screen4x3"/>
-  <p:notesSz cx="6858000" cy="9144000"/>
+  <p:notesSz cx="7010400" cy="9236075"/>
   <p:defaultTextStyle>
     <a:defPPr>
       <a:defRPr lang="en-US"/>
@@ -7332,6 +7333,81 @@
 </p:sld>
 </file>
 
+<file path=ppt/slides/slide15.xml><?xml version="1.0" encoding="utf-8"?>
+<p:sld xmlns:a="http://schemas.openxmlformats.org/drawingml/2006/main" xmlns:r="http://schemas.openxmlformats.org/officeDocument/2006/relationships" xmlns:p="http://schemas.openxmlformats.org/presentationml/2006/main">
+  <p:cSld>
+    <p:spTree>
+      <p:nvGrpSpPr>
+        <p:cNvPr id="1" name=""/>
+        <p:cNvGrpSpPr/>
+        <p:nvPr/>
+      </p:nvGrpSpPr>
+      <p:grpSpPr>
+        <a:xfrm>
+          <a:off x="0" y="0"/>
+          <a:ext cx="0" cy="0"/>
+          <a:chOff x="0" y="0"/>
+          <a:chExt cx="0" cy="0"/>
+        </a:xfrm>
+      </p:grpSpPr>
+      <p:sp>
+        <p:nvSpPr>
+          <p:cNvPr id="2" name="Title 1"/>
+          <p:cNvSpPr>
+            <a:spLocks noGrp="1"/>
+          </p:cNvSpPr>
+          <p:nvPr>
+            <p:ph type="title"/>
+          </p:nvPr>
+        </p:nvSpPr>
+        <p:spPr/>
+        <p:txBody>
+          <a:bodyPr/>
+          <a:lstStyle/>
+          <a:p>
+            <a:endParaRPr lang="en-CA"/>
+          </a:p>
+        </p:txBody>
+      </p:sp>
+      <p:sp>
+        <p:nvSpPr>
+          <p:cNvPr id="3" name="Content Placeholder 2"/>
+          <p:cNvSpPr>
+            <a:spLocks noGrp="1"/>
+          </p:cNvSpPr>
+          <p:nvPr>
+            <p:ph idx="1"/>
+          </p:nvPr>
+        </p:nvSpPr>
+        <p:spPr/>
+        <p:txBody>
+          <a:bodyPr/>
+          <a:lstStyle/>
+          <a:p>
+            <a:endParaRPr lang="en-CA" dirty="0"/>
+          </a:p>
+        </p:txBody>
+      </p:sp>
+    </p:spTree>
+    <p:extLst>
+      <p:ext uri="{BB962C8B-B14F-4D97-AF65-F5344CB8AC3E}">
+        <p14:creationId xmlns:p14="http://schemas.microsoft.com/office/powerpoint/2010/main" val="3837996460"/>
+      </p:ext>
+    </p:extLst>
+  </p:cSld>
+  <p:clrMapOvr>
+    <a:masterClrMapping/>
+  </p:clrMapOvr>
+  <p:timing>
+    <p:tnLst>
+      <p:par>
+        <p:cTn id="1" dur="indefinite" restart="never" nodeType="tmRoot"/>
+      </p:par>
+    </p:tnLst>
+  </p:timing>
+</p:sld>
+</file>
+
 <file path=ppt/slides/slide2.xml><?xml version="1.0" encoding="utf-8"?>
 <p:sld xmlns:a="http://schemas.openxmlformats.org/drawingml/2006/main" xmlns:r="http://schemas.openxmlformats.org/officeDocument/2006/relationships" xmlns:p="http://schemas.openxmlformats.org/presentationml/2006/main">
   <p:cSld>

</xml_diff>